<commit_message>
finish yarnClient.java, need to find new breach point
</commit_message>
<xml_diff>
--- a/SamzaStructure.pptx
+++ b/SamzaStructure.pptx
@@ -5,13 +5,15 @@
     <p:sldMasterId id="2147483648" r:id="rId1"/>
   </p:sldMasterIdLst>
   <p:notesMasterIdLst>
-    <p:notesMasterId r:id="rId6"/>
+    <p:notesMasterId r:id="rId8"/>
   </p:notesMasterIdLst>
   <p:sldIdLst>
     <p:sldId id="256" r:id="rId2"/>
     <p:sldId id="259" r:id="rId3"/>
-    <p:sldId id="257" r:id="rId4"/>
-    <p:sldId id="258" r:id="rId5"/>
+    <p:sldId id="260" r:id="rId4"/>
+    <p:sldId id="257" r:id="rId5"/>
+    <p:sldId id="258" r:id="rId6"/>
+    <p:sldId id="261" r:id="rId7"/>
   </p:sldIdLst>
   <p:sldSz cx="12192000" cy="6858000"/>
   <p:notesSz cx="6858000" cy="9144000"/>
@@ -533,7 +535,7 @@
           <a:p>
             <a:fld id="{EE557081-4441-41AE-98F2-955032B04A0D}" type="slidenum">
               <a:rPr lang="en-US" smtClean="0"/>
-              <a:t>3</a:t>
+              <a:t>4</a:t>
             </a:fld>
             <a:endParaRPr lang="en-US"/>
           </a:p>
@@ -3904,6 +3906,87 @@
       </p:grpSpPr>
       <p:sp>
         <p:nvSpPr>
+          <p:cNvPr id="2" name="Title 1"/>
+          <p:cNvSpPr>
+            <a:spLocks noGrp="1"/>
+          </p:cNvSpPr>
+          <p:nvPr>
+            <p:ph type="title"/>
+          </p:nvPr>
+        </p:nvSpPr>
+        <p:spPr/>
+        <p:txBody>
+          <a:bodyPr/>
+          <a:lstStyle/>
+          <a:p>
+            <a:r>
+              <a:rPr lang="en-US" dirty="0" smtClean="0"/>
+              <a:t>Category</a:t>
+            </a:r>
+            <a:endParaRPr lang="en-US" dirty="0"/>
+          </a:p>
+        </p:txBody>
+      </p:sp>
+      <p:sp>
+        <p:nvSpPr>
+          <p:cNvPr id="3" name="Content Placeholder 2"/>
+          <p:cNvSpPr>
+            <a:spLocks noGrp="1"/>
+          </p:cNvSpPr>
+          <p:nvPr>
+            <p:ph idx="1"/>
+          </p:nvPr>
+        </p:nvSpPr>
+        <p:spPr/>
+        <p:txBody>
+          <a:bodyPr/>
+          <a:lstStyle/>
+          <a:p>
+            <a:r>
+              <a:rPr lang="en-US" dirty="0" smtClean="0">
+                <a:hlinkClick r:id="rId2" action="ppaction://hlinksldjump"/>
+              </a:rPr>
+              <a:t>Run a job</a:t>
+            </a:r>
+            <a:endParaRPr lang="en-US" dirty="0" smtClean="0"/>
+          </a:p>
+          <a:p>
+            <a:endParaRPr lang="en-US" dirty="0"/>
+          </a:p>
+        </p:txBody>
+      </p:sp>
+    </p:spTree>
+    <p:extLst>
+      <p:ext uri="{BB962C8B-B14F-4D97-AF65-F5344CB8AC3E}">
+        <p14:creationId xmlns:p14="http://schemas.microsoft.com/office/powerpoint/2010/main" val="2783696352"/>
+      </p:ext>
+    </p:extLst>
+  </p:cSld>
+  <p:clrMapOvr>
+    <a:masterClrMapping/>
+  </p:clrMapOvr>
+</p:sld>
+</file>
+
+<file path=ppt/slides/slide4.xml><?xml version="1.0" encoding="utf-8"?>
+<p:sld xmlns:a="http://schemas.openxmlformats.org/drawingml/2006/main" xmlns:r="http://schemas.openxmlformats.org/officeDocument/2006/relationships" xmlns:p="http://schemas.openxmlformats.org/presentationml/2006/main">
+  <p:cSld>
+    <p:spTree>
+      <p:nvGrpSpPr>
+        <p:cNvPr id="1" name=""/>
+        <p:cNvGrpSpPr/>
+        <p:nvPr/>
+      </p:nvGrpSpPr>
+      <p:grpSpPr>
+        <a:xfrm>
+          <a:off x="0" y="0"/>
+          <a:ext cx="0" cy="0"/>
+          <a:chOff x="0" y="0"/>
+          <a:chExt cx="0" cy="0"/>
+        </a:xfrm>
+      </p:grpSpPr>
+      <p:sp>
+        <p:nvSpPr>
           <p:cNvPr id="4" name="Rectangle 3"/>
           <p:cNvSpPr/>
           <p:nvPr/>
@@ -4723,10 +4806,10 @@
           <a:p>
             <a:pPr algn="ctr"/>
             <a:r>
-              <a:rPr lang="en-US" dirty="0" err="1" smtClean="0"/>
+              <a:rPr lang="en-US" b="1" dirty="0" err="1" smtClean="0"/>
               <a:t>ClientHelper.scala</a:t>
             </a:r>
-            <a:endParaRPr lang="en-US" dirty="0" smtClean="0"/>
+            <a:endParaRPr lang="en-US" b="1" dirty="0" smtClean="0"/>
           </a:p>
           <a:p>
             <a:pPr algn="ctr"/>
@@ -4779,7 +4862,7 @@
           <a:p>
             <a:pPr algn="ctr"/>
             <a:r>
-              <a:rPr lang="en-US" dirty="0" smtClean="0"/>
+              <a:rPr lang="en-US" b="1" dirty="0" smtClean="0"/>
               <a:t>YarnClient.java</a:t>
             </a:r>
           </a:p>
@@ -4945,10 +5028,10 @@
           <a:p>
             <a:pPr algn="ctr"/>
             <a:r>
-              <a:rPr lang="en-US" dirty="0" err="1" smtClean="0"/>
+              <a:rPr lang="en-US" b="1" dirty="0" err="1" smtClean="0"/>
               <a:t>YarnJobUtil.scala</a:t>
             </a:r>
-            <a:endParaRPr lang="en-US" dirty="0" smtClean="0"/>
+            <a:endParaRPr lang="en-US" b="1" dirty="0" smtClean="0"/>
           </a:p>
           <a:p>
             <a:pPr algn="ctr"/>
@@ -5095,7 +5178,7 @@
         <p:spPr>
           <a:xfrm>
             <a:off x="3705665" y="5546629"/>
-            <a:ext cx="5482006" cy="602440"/>
+            <a:ext cx="5482006" cy="602439"/>
           </a:xfrm>
           <a:prstGeom prst="straightConnector1">
             <a:avLst/>
@@ -5127,8 +5210,8 @@
         </p:nvSpPr>
         <p:spPr>
           <a:xfrm>
-            <a:off x="8350180" y="6149069"/>
-            <a:ext cx="1674982" cy="590588"/>
+            <a:off x="8350180" y="6149068"/>
+            <a:ext cx="1674982" cy="793134"/>
           </a:xfrm>
           <a:prstGeom prst="rect">
             <a:avLst/>
@@ -5154,8 +5237,12 @@
           <a:p>
             <a:pPr algn="ctr"/>
             <a:r>
+              <a:rPr lang="en-US" b="1" dirty="0" smtClean="0"/>
+              <a:t>LocalizerResourceMapper.java</a:t>
+            </a:r>
+            <a:r>
               <a:rPr lang="en-US" dirty="0" smtClean="0"/>
-              <a:t>LocalizerResourceMapper.java</a:t>
+              <a:t>???</a:t>
             </a:r>
             <a:endParaRPr lang="en-US" dirty="0"/>
           </a:p>
@@ -5238,7 +5325,7 @@
           <a:p>
             <a:pPr algn="ctr"/>
             <a:r>
-              <a:rPr lang="en-US" dirty="0" smtClean="0"/>
+              <a:rPr lang="en-US" b="1" dirty="0" smtClean="0"/>
               <a:t>YarnClient.java</a:t>
             </a:r>
           </a:p>
@@ -5335,7 +5422,7 @@
               <a:t>Interact with </a:t>
             </a:r>
             <a:r>
-              <a:rPr lang="en-US" dirty="0" err="1" smtClean="0"/>
+              <a:rPr lang="en-US" b="1" dirty="0" err="1" smtClean="0"/>
               <a:t>Hadoop.security</a:t>
             </a:r>
             <a:r>
@@ -5387,10 +5474,10 @@
           <a:p>
             <a:pPr algn="ctr"/>
             <a:r>
-              <a:rPr lang="en-US" altLang="zh-CN" dirty="0" smtClean="0"/>
-              <a:t>ContainerLaunchContext.java</a:t>
-            </a:r>
-            <a:endParaRPr lang="en-US" dirty="0"/>
+              <a:rPr lang="en-US" altLang="zh-CN" b="1" dirty="0" smtClean="0"/>
+              <a:t>ContainerLaunchContext.java???</a:t>
+            </a:r>
+            <a:endParaRPr lang="en-US" b="1" dirty="0"/>
           </a:p>
         </p:txBody>
       </p:sp>
@@ -5434,7 +5521,7 @@
           <a:p>
             <a:pPr algn="ctr"/>
             <a:r>
-              <a:rPr lang="en-US" dirty="0" smtClean="0"/>
+              <a:rPr lang="en-US" b="1" dirty="0" smtClean="0"/>
               <a:t>YarnClientImpl.java</a:t>
             </a:r>
           </a:p>
@@ -5492,10 +5579,12 @@
           <a:p>
             <a:pPr algn="ctr"/>
             <a:r>
-              <a:rPr lang="en-US" dirty="0" smtClean="0"/>
+              <a:rPr lang="en-US" b="1" dirty="0" smtClean="0">
+                <a:hlinkClick r:id="rId3" action="ppaction://hlinksldjump"/>
+              </a:rPr>
               <a:t>YarnClientImpl.java</a:t>
             </a:r>
-            <a:endParaRPr lang="en-US" dirty="0"/>
+            <a:endParaRPr lang="en-US" b="1" dirty="0"/>
           </a:p>
         </p:txBody>
       </p:sp>
@@ -5746,19 +5835,28 @@
           <a:p>
             <a:pPr algn="ctr"/>
             <a:r>
-              <a:rPr lang="en-US" dirty="0" err="1" smtClean="0"/>
+              <a:rPr lang="en-US" b="1" dirty="0" err="1" smtClean="0"/>
               <a:t>YarnJob.scala</a:t>
             </a:r>
             <a:r>
               <a:rPr lang="en-US" dirty="0" smtClean="0"/>
-              <a:t> ???</a:t>
-            </a:r>
+              <a:t>???</a:t>
+            </a:r>
+            <a:endParaRPr lang="en-US" dirty="0" smtClean="0"/>
           </a:p>
           <a:p>
             <a:pPr algn="ctr"/>
             <a:r>
               <a:rPr lang="en-US" dirty="0" smtClean="0"/>
-              <a:t>Start Application Manager</a:t>
+              <a:t>Start </a:t>
+            </a:r>
+            <a:r>
+              <a:rPr lang="en-US" dirty="0" smtClean="0"/>
+              <a:t>Application </a:t>
+            </a:r>
+            <a:r>
+              <a:rPr lang="en-US" dirty="0" smtClean="0"/>
+              <a:t>Manager</a:t>
             </a:r>
             <a:endParaRPr lang="en-US" dirty="0"/>
           </a:p>
@@ -5844,7 +5942,7 @@
           <a:p>
             <a:pPr algn="ctr"/>
             <a:r>
-              <a:rPr lang="en-US" dirty="0" smtClean="0"/>
+              <a:rPr lang="en-US" b="1" dirty="0" smtClean="0"/>
               <a:t>Path.java</a:t>
             </a:r>
           </a:p>
@@ -5971,7 +6069,7 @@
           <a:p>
             <a:pPr algn="ctr"/>
             <a:r>
-              <a:rPr lang="en-US" dirty="0" smtClean="0"/>
+              <a:rPr lang="en-US" b="1" dirty="0" smtClean="0"/>
               <a:t>Resource.java</a:t>
             </a:r>
           </a:p>
@@ -6072,8 +6170,12 @@
           <a:p>
             <a:pPr algn="ctr"/>
             <a:r>
+              <a:rPr lang="en-US" b="1" dirty="0" smtClean="0"/>
+              <a:t>LocalResource.java</a:t>
+            </a:r>
+            <a:r>
               <a:rPr lang="en-US" dirty="0" smtClean="0"/>
-              <a:t>LocalResource.java???</a:t>
+              <a:t>???</a:t>
             </a:r>
             <a:endParaRPr lang="en-US" dirty="0"/>
           </a:p>
@@ -6123,7 +6225,7 @@
         </p:nvSpPr>
         <p:spPr>
           <a:xfrm>
-            <a:off x="8274962" y="6735528"/>
+            <a:off x="8312571" y="6930722"/>
             <a:ext cx="1750200" cy="942195"/>
           </a:xfrm>
           <a:prstGeom prst="roundRect">
@@ -6333,6 +6435,34 @@
             <a:r>
               <a:rPr lang="en-US" dirty="0" smtClean="0"/>
               <a:t>Information for node manager.</a:t>
+            </a:r>
+            <a:endParaRPr lang="en-US" dirty="0"/>
+          </a:p>
+        </p:txBody>
+      </p:sp>
+      <p:sp>
+        <p:nvSpPr>
+          <p:cNvPr id="11" name="Title 10"/>
+          <p:cNvSpPr>
+            <a:spLocks noGrp="1"/>
+          </p:cNvSpPr>
+          <p:nvPr>
+            <p:ph type="title"/>
+          </p:nvPr>
+        </p:nvSpPr>
+        <p:spPr>
+          <a:xfrm>
+            <a:off x="27531" y="30919"/>
+            <a:ext cx="3992947" cy="1325563"/>
+          </a:xfrm>
+        </p:spPr>
+        <p:txBody>
+          <a:bodyPr/>
+          <a:lstStyle/>
+          <a:p>
+            <a:r>
+              <a:rPr lang="en-US" dirty="0" smtClean="0"/>
+              <a:t>Run a job</a:t>
             </a:r>
             <a:endParaRPr lang="en-US" dirty="0"/>
           </a:p>
@@ -6348,10 +6478,17 @@
   <p:clrMapOvr>
     <a:masterClrMapping/>
   </p:clrMapOvr>
+  <p:timing>
+    <p:tnLst>
+      <p:par>
+        <p:cTn id="1" dur="indefinite" restart="never" nodeType="tmRoot"/>
+      </p:par>
+    </p:tnLst>
+  </p:timing>
 </p:sld>
 </file>
 
-<file path=ppt/slides/slide4.xml><?xml version="1.0" encoding="utf-8"?>
+<file path=ppt/slides/slide5.xml><?xml version="1.0" encoding="utf-8"?>
 <p:sld xmlns:a="http://schemas.openxmlformats.org/drawingml/2006/main" xmlns:r="http://schemas.openxmlformats.org/officeDocument/2006/relationships" xmlns:p="http://schemas.openxmlformats.org/presentationml/2006/main">
   <p:cSld>
     <p:spTree>
@@ -6376,7 +6513,7 @@
         </p:nvSpPr>
         <p:spPr>
           <a:xfrm>
-            <a:off x="1553028" y="130629"/>
+            <a:off x="4237473" y="1259794"/>
             <a:ext cx="2032000" cy="638628"/>
           </a:xfrm>
           <a:prstGeom prst="rect">
@@ -6408,12 +6545,693 @@
           <a:p>
             <a:pPr algn="ctr"/>
             <a:r>
+              <a:rPr lang="en-US" b="1" dirty="0" smtClean="0"/>
+              <a:t>YarnClientImpl.java</a:t>
+            </a:r>
+          </a:p>
+          <a:p>
+            <a:pPr algn="ctr"/>
+            <a:r>
+              <a:rPr lang="en-US" dirty="0" err="1" smtClean="0"/>
+              <a:t>submitApplication</a:t>
+            </a:r>
+            <a:endParaRPr lang="en-US" dirty="0"/>
+          </a:p>
+        </p:txBody>
+      </p:sp>
+      <p:sp>
+        <p:nvSpPr>
+          <p:cNvPr id="3" name="Rectangle 2"/>
+          <p:cNvSpPr/>
+          <p:nvPr/>
+        </p:nvSpPr>
+        <p:spPr>
+          <a:xfrm>
+            <a:off x="4273131" y="617956"/>
+            <a:ext cx="1960684" cy="641838"/>
+          </a:xfrm>
+          <a:prstGeom prst="rect">
+            <a:avLst/>
+          </a:prstGeom>
+          <a:ln>
+            <a:solidFill>
+              <a:srgbClr val="FF0000"/>
+            </a:solidFill>
+            <a:prstDash val="dash"/>
+          </a:ln>
+        </p:spPr>
+        <p:style>
+          <a:lnRef idx="2">
+            <a:schemeClr val="accent1"/>
+          </a:lnRef>
+          <a:fillRef idx="1">
+            <a:schemeClr val="lt1"/>
+          </a:fillRef>
+          <a:effectRef idx="0">
+            <a:schemeClr val="accent1"/>
+          </a:effectRef>
+          <a:fontRef idx="minor">
+            <a:schemeClr val="dk1"/>
+          </a:fontRef>
+        </p:style>
+        <p:txBody>
+          <a:bodyPr rtlCol="0" anchor="ctr"/>
+          <a:lstStyle/>
+          <a:p>
+            <a:pPr algn="ctr"/>
+            <a:r>
+              <a:rPr lang="en-US" b="1" dirty="0" smtClean="0"/>
+              <a:t>YarnClient.java</a:t>
+            </a:r>
+          </a:p>
+          <a:p>
+            <a:pPr algn="ctr"/>
+            <a:r>
+              <a:rPr lang="en-US" dirty="0" err="1" smtClean="0"/>
+              <a:t>submitApplication</a:t>
+            </a:r>
+            <a:endParaRPr lang="en-US" dirty="0"/>
+          </a:p>
+        </p:txBody>
+      </p:sp>
+      <p:sp>
+        <p:nvSpPr>
+          <p:cNvPr id="4" name="Title 3"/>
+          <p:cNvSpPr>
+            <a:spLocks noGrp="1"/>
+          </p:cNvSpPr>
+          <p:nvPr>
+            <p:ph type="title"/>
+          </p:nvPr>
+        </p:nvSpPr>
+        <p:spPr>
+          <a:xfrm>
+            <a:off x="0" y="287756"/>
+            <a:ext cx="3541486" cy="1325563"/>
+          </a:xfrm>
+        </p:spPr>
+        <p:txBody>
+          <a:bodyPr/>
+          <a:lstStyle/>
+          <a:p>
+            <a:r>
               <a:rPr lang="en-US" dirty="0" smtClean="0"/>
-              <a:t>YarnClientImpl.java</a:t>
-            </a:r>
-          </a:p>
+              <a:t>YarnClient.java</a:t>
+            </a:r>
+            <a:endParaRPr lang="en-US" dirty="0"/>
+          </a:p>
+        </p:txBody>
+      </p:sp>
+      <p:cxnSp>
+        <p:nvCxnSpPr>
+          <p:cNvPr id="7" name="Straight Arrow Connector 6"/>
+          <p:cNvCxnSpPr>
+            <a:stCxn id="2" idx="2"/>
+            <a:endCxn id="8" idx="0"/>
+          </p:cNvCxnSpPr>
+          <p:nvPr/>
+        </p:nvCxnSpPr>
+        <p:spPr>
+          <a:xfrm flipH="1">
+            <a:off x="1783444" y="1898422"/>
+            <a:ext cx="3470029" cy="412978"/>
+          </a:xfrm>
+          <a:prstGeom prst="straightConnector1">
+            <a:avLst/>
+          </a:prstGeom>
+          <a:ln>
+            <a:tailEnd type="triangle"/>
+          </a:ln>
+        </p:spPr>
+        <p:style>
+          <a:lnRef idx="1">
+            <a:schemeClr val="accent1"/>
+          </a:lnRef>
+          <a:fillRef idx="0">
+            <a:schemeClr val="accent1"/>
+          </a:fillRef>
+          <a:effectRef idx="0">
+            <a:schemeClr val="accent1"/>
+          </a:effectRef>
+          <a:fontRef idx="minor">
+            <a:schemeClr val="tx1"/>
+          </a:fontRef>
+        </p:style>
+      </p:cxnSp>
+      <p:sp>
+        <p:nvSpPr>
+          <p:cNvPr id="8" name="Rectangle 7"/>
+          <p:cNvSpPr/>
+          <p:nvPr/>
+        </p:nvSpPr>
+        <p:spPr>
+          <a:xfrm>
+            <a:off x="800101" y="2311400"/>
+            <a:ext cx="1966686" cy="800100"/>
+          </a:xfrm>
+          <a:prstGeom prst="rect">
+            <a:avLst/>
+          </a:prstGeom>
+          <a:ln>
+            <a:solidFill>
+              <a:srgbClr val="FF0000"/>
+            </a:solidFill>
+            <a:prstDash val="dash"/>
+          </a:ln>
+        </p:spPr>
+        <p:style>
+          <a:lnRef idx="2">
+            <a:schemeClr val="accent1"/>
+          </a:lnRef>
+          <a:fillRef idx="1">
+            <a:schemeClr val="lt1"/>
+          </a:fillRef>
+          <a:effectRef idx="0">
+            <a:schemeClr val="accent1"/>
+          </a:effectRef>
+          <a:fontRef idx="minor">
+            <a:schemeClr val="dk1"/>
+          </a:fontRef>
+        </p:style>
+        <p:txBody>
+          <a:bodyPr rtlCol="0" anchor="ctr"/>
+          <a:lstStyle/>
           <a:p>
             <a:pPr algn="ctr"/>
+            <a:r>
+              <a:rPr lang="en-US" b="1" dirty="0" smtClean="0"/>
+              <a:t>SubmitApplicationRequest.java???</a:t>
+            </a:r>
+            <a:endParaRPr lang="en-US" b="1" dirty="0"/>
+          </a:p>
+        </p:txBody>
+      </p:sp>
+      <p:cxnSp>
+        <p:nvCxnSpPr>
+          <p:cNvPr id="11" name="Straight Arrow Connector 10"/>
+          <p:cNvCxnSpPr>
+            <a:stCxn id="2" idx="2"/>
+            <a:endCxn id="12" idx="0"/>
+          </p:cNvCxnSpPr>
+          <p:nvPr/>
+        </p:nvCxnSpPr>
+        <p:spPr>
+          <a:xfrm flipH="1">
+            <a:off x="4415623" y="1898422"/>
+            <a:ext cx="837850" cy="412978"/>
+          </a:xfrm>
+          <a:prstGeom prst="straightConnector1">
+            <a:avLst/>
+          </a:prstGeom>
+          <a:ln>
+            <a:tailEnd type="triangle"/>
+          </a:ln>
+        </p:spPr>
+        <p:style>
+          <a:lnRef idx="1">
+            <a:schemeClr val="accent1"/>
+          </a:lnRef>
+          <a:fillRef idx="0">
+            <a:schemeClr val="accent1"/>
+          </a:fillRef>
+          <a:effectRef idx="0">
+            <a:schemeClr val="accent1"/>
+          </a:effectRef>
+          <a:fontRef idx="minor">
+            <a:schemeClr val="tx1"/>
+          </a:fontRef>
+        </p:style>
+      </p:cxnSp>
+      <p:sp>
+        <p:nvSpPr>
+          <p:cNvPr id="12" name="Rounded Rectangle 11"/>
+          <p:cNvSpPr/>
+          <p:nvPr/>
+        </p:nvSpPr>
+        <p:spPr>
+          <a:xfrm>
+            <a:off x="2882900" y="2311400"/>
+            <a:ext cx="3065445" cy="800100"/>
+          </a:xfrm>
+          <a:prstGeom prst="roundRect">
+            <a:avLst/>
+          </a:prstGeom>
+          <a:ln>
+            <a:solidFill>
+              <a:srgbClr val="FF0000"/>
+            </a:solidFill>
+          </a:ln>
+        </p:spPr>
+        <p:style>
+          <a:lnRef idx="2">
+            <a:schemeClr val="accent1"/>
+          </a:lnRef>
+          <a:fillRef idx="1">
+            <a:schemeClr val="lt1"/>
+          </a:fillRef>
+          <a:effectRef idx="0">
+            <a:schemeClr val="accent1"/>
+          </a:effectRef>
+          <a:fontRef idx="minor">
+            <a:schemeClr val="dk1"/>
+          </a:fontRef>
+        </p:style>
+        <p:txBody>
+          <a:bodyPr rtlCol="0" anchor="ctr"/>
+          <a:lstStyle/>
+          <a:p>
+            <a:pPr algn="ctr"/>
+            <a:r>
+              <a:rPr lang="en-US" i="1" dirty="0" err="1" smtClean="0"/>
+              <a:t>addTimelineDelegationToken</a:t>
+            </a:r>
+            <a:endParaRPr lang="en-US" i="1" dirty="0" smtClean="0"/>
+          </a:p>
+          <a:p>
+            <a:pPr algn="ctr"/>
+            <a:r>
+              <a:rPr lang="en-US" dirty="0" smtClean="0"/>
+              <a:t>When security enabled</a:t>
+            </a:r>
+            <a:endParaRPr lang="en-US" dirty="0"/>
+          </a:p>
+        </p:txBody>
+      </p:sp>
+      <p:cxnSp>
+        <p:nvCxnSpPr>
+          <p:cNvPr id="17" name="Straight Arrow Connector 16"/>
+          <p:cNvCxnSpPr>
+            <a:stCxn id="2" idx="2"/>
+            <a:endCxn id="18" idx="0"/>
+          </p:cNvCxnSpPr>
+          <p:nvPr/>
+        </p:nvCxnSpPr>
+        <p:spPr>
+          <a:xfrm>
+            <a:off x="5253473" y="1898422"/>
+            <a:ext cx="1918050" cy="412978"/>
+          </a:xfrm>
+          <a:prstGeom prst="straightConnector1">
+            <a:avLst/>
+          </a:prstGeom>
+          <a:ln>
+            <a:tailEnd type="triangle"/>
+          </a:ln>
+        </p:spPr>
+        <p:style>
+          <a:lnRef idx="1">
+            <a:schemeClr val="accent1"/>
+          </a:lnRef>
+          <a:fillRef idx="0">
+            <a:schemeClr val="accent1"/>
+          </a:fillRef>
+          <a:effectRef idx="0">
+            <a:schemeClr val="accent1"/>
+          </a:effectRef>
+          <a:fontRef idx="minor">
+            <a:schemeClr val="tx1"/>
+          </a:fontRef>
+        </p:style>
+      </p:cxnSp>
+      <p:sp>
+        <p:nvSpPr>
+          <p:cNvPr id="18" name="Rectangle 17"/>
+          <p:cNvSpPr/>
+          <p:nvPr/>
+        </p:nvSpPr>
+        <p:spPr>
+          <a:xfrm>
+            <a:off x="6138845" y="2311400"/>
+            <a:ext cx="2065355" cy="800100"/>
+          </a:xfrm>
+          <a:prstGeom prst="rect">
+            <a:avLst/>
+          </a:prstGeom>
+          <a:ln>
+            <a:solidFill>
+              <a:srgbClr val="FF0000"/>
+            </a:solidFill>
+            <a:prstDash val="dash"/>
+          </a:ln>
+        </p:spPr>
+        <p:style>
+          <a:lnRef idx="2">
+            <a:schemeClr val="accent1"/>
+          </a:lnRef>
+          <a:fillRef idx="1">
+            <a:schemeClr val="lt1"/>
+          </a:fillRef>
+          <a:effectRef idx="0">
+            <a:schemeClr val="accent1"/>
+          </a:effectRef>
+          <a:fontRef idx="minor">
+            <a:schemeClr val="dk1"/>
+          </a:fontRef>
+        </p:style>
+        <p:txBody>
+          <a:bodyPr rtlCol="0" anchor="ctr"/>
+          <a:lstStyle/>
+          <a:p>
+            <a:pPr algn="ctr"/>
+            <a:r>
+              <a:rPr lang="en-US" b="1" dirty="0" smtClean="0"/>
+              <a:t>ApplicationClientProtocol.java???</a:t>
+            </a:r>
+          </a:p>
+          <a:p>
+            <a:pPr algn="ctr"/>
+            <a:r>
+              <a:rPr lang="en-US" dirty="0" err="1" smtClean="0"/>
+              <a:t>submitApplication</a:t>
+            </a:r>
+            <a:endParaRPr lang="en-US" dirty="0"/>
+          </a:p>
+        </p:txBody>
+      </p:sp>
+      <p:sp>
+        <p:nvSpPr>
+          <p:cNvPr id="21" name="Rounded Rectangle 20"/>
+          <p:cNvSpPr/>
+          <p:nvPr/>
+        </p:nvSpPr>
+        <p:spPr>
+          <a:xfrm>
+            <a:off x="6120860" y="3111500"/>
+            <a:ext cx="2160886" cy="1270000"/>
+          </a:xfrm>
+          <a:prstGeom prst="roundRect">
+            <a:avLst/>
+          </a:prstGeom>
+          <a:ln>
+            <a:solidFill>
+              <a:srgbClr val="FF0000"/>
+            </a:solidFill>
+          </a:ln>
+        </p:spPr>
+        <p:style>
+          <a:lnRef idx="2">
+            <a:schemeClr val="accent1"/>
+          </a:lnRef>
+          <a:fillRef idx="1">
+            <a:schemeClr val="lt1"/>
+          </a:fillRef>
+          <a:effectRef idx="0">
+            <a:schemeClr val="accent1"/>
+          </a:effectRef>
+          <a:fontRef idx="minor">
+            <a:schemeClr val="dk1"/>
+          </a:fontRef>
+        </p:style>
+        <p:txBody>
+          <a:bodyPr rtlCol="0" anchor="ctr"/>
+          <a:lstStyle/>
+          <a:p>
+            <a:pPr algn="ctr"/>
+            <a:r>
+              <a:rPr lang="en-US" dirty="0" smtClean="0"/>
+              <a:t>Protocol between clients and </a:t>
+            </a:r>
+            <a:r>
+              <a:rPr lang="en-US" dirty="0" err="1" smtClean="0"/>
+              <a:t>ResourceManager</a:t>
+            </a:r>
+            <a:endParaRPr lang="en-US" dirty="0" smtClean="0"/>
+          </a:p>
+          <a:p>
+            <a:pPr algn="ctr"/>
+            <a:r>
+              <a:rPr lang="en-US" dirty="0" err="1" smtClean="0"/>
+              <a:t>ResourceManager</a:t>
+            </a:r>
+            <a:r>
+              <a:rPr lang="en-US" dirty="0" smtClean="0"/>
+              <a:t> reflect immediately. </a:t>
+            </a:r>
+          </a:p>
+        </p:txBody>
+      </p:sp>
+      <p:cxnSp>
+        <p:nvCxnSpPr>
+          <p:cNvPr id="28" name="Straight Arrow Connector 27"/>
+          <p:cNvCxnSpPr>
+            <a:stCxn id="2" idx="2"/>
+            <a:endCxn id="29" idx="0"/>
+          </p:cNvCxnSpPr>
+          <p:nvPr/>
+        </p:nvCxnSpPr>
+        <p:spPr>
+          <a:xfrm>
+            <a:off x="5253473" y="1898422"/>
+            <a:ext cx="4400201" cy="412978"/>
+          </a:xfrm>
+          <a:prstGeom prst="straightConnector1">
+            <a:avLst/>
+          </a:prstGeom>
+          <a:ln>
+            <a:tailEnd type="triangle"/>
+          </a:ln>
+        </p:spPr>
+        <p:style>
+          <a:lnRef idx="1">
+            <a:schemeClr val="accent1"/>
+          </a:lnRef>
+          <a:fillRef idx="0">
+            <a:schemeClr val="accent1"/>
+          </a:fillRef>
+          <a:effectRef idx="0">
+            <a:schemeClr val="accent1"/>
+          </a:effectRef>
+          <a:fontRef idx="minor">
+            <a:schemeClr val="tx1"/>
+          </a:fontRef>
+        </p:style>
+      </p:cxnSp>
+      <p:sp>
+        <p:nvSpPr>
+          <p:cNvPr id="29" name="Rectangle 28"/>
+          <p:cNvSpPr/>
+          <p:nvPr/>
+        </p:nvSpPr>
+        <p:spPr>
+          <a:xfrm>
+            <a:off x="8580524" y="2311400"/>
+            <a:ext cx="2146300" cy="800100"/>
+          </a:xfrm>
+          <a:prstGeom prst="rect">
+            <a:avLst/>
+          </a:prstGeom>
+          <a:ln>
+            <a:solidFill>
+              <a:srgbClr val="FF0000"/>
+            </a:solidFill>
+          </a:ln>
+        </p:spPr>
+        <p:style>
+          <a:lnRef idx="2">
+            <a:schemeClr val="accent1"/>
+          </a:lnRef>
+          <a:fillRef idx="1">
+            <a:schemeClr val="lt1"/>
+          </a:fillRef>
+          <a:effectRef idx="0">
+            <a:schemeClr val="accent1"/>
+          </a:effectRef>
+          <a:fontRef idx="minor">
+            <a:schemeClr val="dk1"/>
+          </a:fontRef>
+        </p:style>
+        <p:txBody>
+          <a:bodyPr rtlCol="0" anchor="ctr"/>
+          <a:lstStyle/>
+          <a:p>
+            <a:pPr algn="ctr"/>
+            <a:r>
+              <a:rPr lang="en-US" b="1" dirty="0" smtClean="0"/>
+              <a:t>YarnApplicationState.java</a:t>
+            </a:r>
+            <a:endParaRPr lang="en-US" b="1" dirty="0"/>
+          </a:p>
+        </p:txBody>
+      </p:sp>
+      <p:sp>
+        <p:nvSpPr>
+          <p:cNvPr id="32" name="Rounded Rectangle 31"/>
+          <p:cNvSpPr/>
+          <p:nvPr/>
+        </p:nvSpPr>
+        <p:spPr>
+          <a:xfrm>
+            <a:off x="10962643" y="2311400"/>
+            <a:ext cx="2265276" cy="1270000"/>
+          </a:xfrm>
+          <a:prstGeom prst="roundRect">
+            <a:avLst/>
+          </a:prstGeom>
+          <a:ln>
+            <a:solidFill>
+              <a:srgbClr val="FF0000"/>
+            </a:solidFill>
+          </a:ln>
+        </p:spPr>
+        <p:style>
+          <a:lnRef idx="2">
+            <a:schemeClr val="accent1"/>
+          </a:lnRef>
+          <a:fillRef idx="1">
+            <a:schemeClr val="lt1"/>
+          </a:fillRef>
+          <a:effectRef idx="0">
+            <a:schemeClr val="accent1"/>
+          </a:effectRef>
+          <a:fontRef idx="minor">
+            <a:schemeClr val="dk1"/>
+          </a:fontRef>
+        </p:style>
+        <p:txBody>
+          <a:bodyPr rtlCol="0" anchor="ctr"/>
+          <a:lstStyle/>
+          <a:p>
+            <a:pPr algn="ctr"/>
+            <a:r>
+              <a:rPr lang="en-US" dirty="0" err="1"/>
+              <a:t>ResourceManager</a:t>
+            </a:r>
+            <a:r>
+              <a:rPr lang="en-US" dirty="0"/>
+              <a:t> fails before save applications’ state, clients need to re-submit.</a:t>
+            </a:r>
+          </a:p>
+        </p:txBody>
+      </p:sp>
+      <p:cxnSp>
+        <p:nvCxnSpPr>
+          <p:cNvPr id="34" name="Straight Arrow Connector 33"/>
+          <p:cNvCxnSpPr>
+            <a:stCxn id="2" idx="2"/>
+          </p:cNvCxnSpPr>
+          <p:nvPr/>
+        </p:nvCxnSpPr>
+        <p:spPr>
+          <a:xfrm>
+            <a:off x="5253473" y="1898422"/>
+            <a:ext cx="6841808" cy="412978"/>
+          </a:xfrm>
+          <a:prstGeom prst="straightConnector1">
+            <a:avLst/>
+          </a:prstGeom>
+          <a:ln>
+            <a:tailEnd type="triangle"/>
+          </a:ln>
+        </p:spPr>
+        <p:style>
+          <a:lnRef idx="1">
+            <a:schemeClr val="accent1"/>
+          </a:lnRef>
+          <a:fillRef idx="0">
+            <a:schemeClr val="accent1"/>
+          </a:fillRef>
+          <a:effectRef idx="0">
+            <a:schemeClr val="accent1"/>
+          </a:effectRef>
+          <a:fontRef idx="minor">
+            <a:schemeClr val="tx1"/>
+          </a:fontRef>
+        </p:style>
+      </p:cxnSp>
+      <p:sp>
+        <p:nvSpPr>
+          <p:cNvPr id="40" name="Rectangle 39"/>
+          <p:cNvSpPr/>
+          <p:nvPr/>
+        </p:nvSpPr>
+        <p:spPr>
+          <a:xfrm>
+            <a:off x="6120860" y="4381500"/>
+            <a:ext cx="2083340" cy="800100"/>
+          </a:xfrm>
+          <a:prstGeom prst="rect">
+            <a:avLst/>
+          </a:prstGeom>
+          <a:ln>
+            <a:solidFill>
+              <a:srgbClr val="FF0000"/>
+            </a:solidFill>
+          </a:ln>
+        </p:spPr>
+        <p:style>
+          <a:lnRef idx="2">
+            <a:schemeClr val="accent1"/>
+          </a:lnRef>
+          <a:fillRef idx="1">
+            <a:schemeClr val="lt1"/>
+          </a:fillRef>
+          <a:effectRef idx="0">
+            <a:schemeClr val="accent1"/>
+          </a:effectRef>
+          <a:fontRef idx="minor">
+            <a:schemeClr val="dk1"/>
+          </a:fontRef>
+        </p:style>
+        <p:txBody>
+          <a:bodyPr rtlCol="0" anchor="ctr"/>
+          <a:lstStyle/>
+          <a:p>
+            <a:pPr algn="ctr"/>
+            <a:r>
+              <a:rPr lang="en-US" b="1" dirty="0" smtClean="0"/>
+              <a:t>Proto\ApplicationClientProtocol.java</a:t>
+            </a:r>
+            <a:endParaRPr lang="en-US" b="1" dirty="0"/>
+          </a:p>
+        </p:txBody>
+      </p:sp>
+      <p:sp>
+        <p:nvSpPr>
+          <p:cNvPr id="41" name="Rounded Rectangle 40"/>
+          <p:cNvSpPr/>
+          <p:nvPr/>
+        </p:nvSpPr>
+        <p:spPr>
+          <a:xfrm>
+            <a:off x="6028925" y="5181600"/>
+            <a:ext cx="2344755" cy="850900"/>
+          </a:xfrm>
+          <a:prstGeom prst="roundRect">
+            <a:avLst/>
+          </a:prstGeom>
+          <a:ln>
+            <a:solidFill>
+              <a:srgbClr val="FF0000"/>
+            </a:solidFill>
+          </a:ln>
+        </p:spPr>
+        <p:style>
+          <a:lnRef idx="2">
+            <a:schemeClr val="accent1"/>
+          </a:lnRef>
+          <a:fillRef idx="1">
+            <a:schemeClr val="lt1"/>
+          </a:fillRef>
+          <a:effectRef idx="0">
+            <a:schemeClr val="accent1"/>
+          </a:effectRef>
+          <a:fontRef idx="minor">
+            <a:schemeClr val="dk1"/>
+          </a:fontRef>
+        </p:style>
+        <p:txBody>
+          <a:bodyPr rtlCol="0" anchor="ctr"/>
+          <a:lstStyle/>
+          <a:p>
+            <a:pPr algn="ctr"/>
+            <a:r>
+              <a:rPr lang="en-US" dirty="0" err="1" smtClean="0"/>
+              <a:t>rpc</a:t>
+            </a:r>
+            <a:r>
+              <a:rPr lang="en-US" dirty="0" smtClean="0"/>
+              <a:t> </a:t>
+            </a:r>
             <a:r>
               <a:rPr lang="en-US" dirty="0" err="1" smtClean="0"/>
               <a:t>submitApplication</a:t>
@@ -6426,6 +7244,62 @@
     <p:extLst>
       <p:ext uri="{BB962C8B-B14F-4D97-AF65-F5344CB8AC3E}">
         <p14:creationId xmlns:p14="http://schemas.microsoft.com/office/powerpoint/2010/main" val="1434236233"/>
+      </p:ext>
+    </p:extLst>
+  </p:cSld>
+  <p:clrMapOvr>
+    <a:masterClrMapping/>
+  </p:clrMapOvr>
+  <p:timing>
+    <p:tnLst>
+      <p:par>
+        <p:cTn id="1" dur="indefinite" restart="never" nodeType="tmRoot"/>
+      </p:par>
+    </p:tnLst>
+  </p:timing>
+</p:sld>
+</file>
+
+<file path=ppt/slides/slide6.xml><?xml version="1.0" encoding="utf-8"?>
+<p:sld xmlns:a="http://schemas.openxmlformats.org/drawingml/2006/main" xmlns:r="http://schemas.openxmlformats.org/officeDocument/2006/relationships" xmlns:p="http://schemas.openxmlformats.org/presentationml/2006/main">
+  <p:cSld>
+    <p:spTree>
+      <p:nvGrpSpPr>
+        <p:cNvPr id="1" name=""/>
+        <p:cNvGrpSpPr/>
+        <p:nvPr/>
+      </p:nvGrpSpPr>
+      <p:grpSpPr>
+        <a:xfrm>
+          <a:off x="0" y="0"/>
+          <a:ext cx="0" cy="0"/>
+          <a:chOff x="0" y="0"/>
+          <a:chExt cx="0" cy="0"/>
+        </a:xfrm>
+      </p:grpSpPr>
+      <p:sp>
+        <p:nvSpPr>
+          <p:cNvPr id="2" name="Title 1"/>
+          <p:cNvSpPr>
+            <a:spLocks noGrp="1"/>
+          </p:cNvSpPr>
+          <p:nvPr>
+            <p:ph type="title"/>
+          </p:nvPr>
+        </p:nvSpPr>
+        <p:spPr/>
+        <p:txBody>
+          <a:bodyPr/>
+          <a:lstStyle/>
+          <a:p>
+            <a:endParaRPr lang="en-US"/>
+          </a:p>
+        </p:txBody>
+      </p:sp>
+    </p:spTree>
+    <p:extLst>
+      <p:ext uri="{BB962C8B-B14F-4D97-AF65-F5344CB8AC3E}">
+        <p14:creationId xmlns:p14="http://schemas.microsoft.com/office/powerpoint/2010/main" val="1162340703"/>
       </p:ext>
     </p:extLst>
   </p:cSld>

</xml_diff>

<commit_message>
YARN structure in progress
</commit_message>
<xml_diff>
--- a/SamzaStructure.pptx
+++ b/SamzaStructure.pptx
@@ -5,15 +5,16 @@
     <p:sldMasterId id="2147483648" r:id="rId1"/>
   </p:sldMasterIdLst>
   <p:notesMasterIdLst>
-    <p:notesMasterId r:id="rId8"/>
+    <p:notesMasterId r:id="rId9"/>
   </p:notesMasterIdLst>
   <p:sldIdLst>
     <p:sldId id="256" r:id="rId2"/>
     <p:sldId id="259" r:id="rId3"/>
     <p:sldId id="260" r:id="rId4"/>
-    <p:sldId id="257" r:id="rId5"/>
-    <p:sldId id="258" r:id="rId6"/>
-    <p:sldId id="261" r:id="rId7"/>
+    <p:sldId id="262" r:id="rId5"/>
+    <p:sldId id="257" r:id="rId6"/>
+    <p:sldId id="258" r:id="rId7"/>
+    <p:sldId id="261" r:id="rId8"/>
   </p:sldIdLst>
   <p:sldSz cx="12192000" cy="6858000"/>
   <p:notesSz cx="6858000" cy="9144000"/>
@@ -202,7 +203,7 @@
           <a:p>
             <a:fld id="{B35ADF0B-9749-404D-9A56-8E2BD576143D}" type="datetimeFigureOut">
               <a:rPr lang="en-US" smtClean="0"/>
-              <a:t>9/25/2017</a:t>
+              <a:t>9/28/2017</a:t>
             </a:fld>
             <a:endParaRPr lang="en-US"/>
           </a:p>
@@ -535,7 +536,7 @@
           <a:p>
             <a:fld id="{EE557081-4441-41AE-98F2-955032B04A0D}" type="slidenum">
               <a:rPr lang="en-US" smtClean="0"/>
-              <a:t>4</a:t>
+              <a:t>5</a:t>
             </a:fld>
             <a:endParaRPr lang="en-US"/>
           </a:p>
@@ -685,7 +686,7 @@
           <a:p>
             <a:fld id="{7D2FF18F-DFC6-48DD-A8FE-22636A2E9C75}" type="datetimeFigureOut">
               <a:rPr lang="en-US" smtClean="0"/>
-              <a:t>9/25/2017</a:t>
+              <a:t>9/28/2017</a:t>
             </a:fld>
             <a:endParaRPr lang="en-US"/>
           </a:p>
@@ -855,7 +856,7 @@
           <a:p>
             <a:fld id="{7D2FF18F-DFC6-48DD-A8FE-22636A2E9C75}" type="datetimeFigureOut">
               <a:rPr lang="en-US" smtClean="0"/>
-              <a:t>9/25/2017</a:t>
+              <a:t>9/28/2017</a:t>
             </a:fld>
             <a:endParaRPr lang="en-US"/>
           </a:p>
@@ -1035,7 +1036,7 @@
           <a:p>
             <a:fld id="{7D2FF18F-DFC6-48DD-A8FE-22636A2E9C75}" type="datetimeFigureOut">
               <a:rPr lang="en-US" smtClean="0"/>
-              <a:t>9/25/2017</a:t>
+              <a:t>9/28/2017</a:t>
             </a:fld>
             <a:endParaRPr lang="en-US"/>
           </a:p>
@@ -1205,7 +1206,7 @@
           <a:p>
             <a:fld id="{7D2FF18F-DFC6-48DD-A8FE-22636A2E9C75}" type="datetimeFigureOut">
               <a:rPr lang="en-US" smtClean="0"/>
-              <a:t>9/25/2017</a:t>
+              <a:t>9/28/2017</a:t>
             </a:fld>
             <a:endParaRPr lang="en-US"/>
           </a:p>
@@ -1451,7 +1452,7 @@
           <a:p>
             <a:fld id="{7D2FF18F-DFC6-48DD-A8FE-22636A2E9C75}" type="datetimeFigureOut">
               <a:rPr lang="en-US" smtClean="0"/>
-              <a:t>9/25/2017</a:t>
+              <a:t>9/28/2017</a:t>
             </a:fld>
             <a:endParaRPr lang="en-US"/>
           </a:p>
@@ -1683,7 +1684,7 @@
           <a:p>
             <a:fld id="{7D2FF18F-DFC6-48DD-A8FE-22636A2E9C75}" type="datetimeFigureOut">
               <a:rPr lang="en-US" smtClean="0"/>
-              <a:t>9/25/2017</a:t>
+              <a:t>9/28/2017</a:t>
             </a:fld>
             <a:endParaRPr lang="en-US"/>
           </a:p>
@@ -2050,7 +2051,7 @@
           <a:p>
             <a:fld id="{7D2FF18F-DFC6-48DD-A8FE-22636A2E9C75}" type="datetimeFigureOut">
               <a:rPr lang="en-US" smtClean="0"/>
-              <a:t>9/25/2017</a:t>
+              <a:t>9/28/2017</a:t>
             </a:fld>
             <a:endParaRPr lang="en-US"/>
           </a:p>
@@ -2168,7 +2169,7 @@
           <a:p>
             <a:fld id="{7D2FF18F-DFC6-48DD-A8FE-22636A2E9C75}" type="datetimeFigureOut">
               <a:rPr lang="en-US" smtClean="0"/>
-              <a:t>9/25/2017</a:t>
+              <a:t>9/28/2017</a:t>
             </a:fld>
             <a:endParaRPr lang="en-US"/>
           </a:p>
@@ -2263,7 +2264,7 @@
           <a:p>
             <a:fld id="{7D2FF18F-DFC6-48DD-A8FE-22636A2E9C75}" type="datetimeFigureOut">
               <a:rPr lang="en-US" smtClean="0"/>
-              <a:t>9/25/2017</a:t>
+              <a:t>9/28/2017</a:t>
             </a:fld>
             <a:endParaRPr lang="en-US"/>
           </a:p>
@@ -2540,7 +2541,7 @@
           <a:p>
             <a:fld id="{7D2FF18F-DFC6-48DD-A8FE-22636A2E9C75}" type="datetimeFigureOut">
               <a:rPr lang="en-US" smtClean="0"/>
-              <a:t>9/25/2017</a:t>
+              <a:t>9/28/2017</a:t>
             </a:fld>
             <a:endParaRPr lang="en-US"/>
           </a:p>
@@ -2793,7 +2794,7 @@
           <a:p>
             <a:fld id="{7D2FF18F-DFC6-48DD-A8FE-22636A2E9C75}" type="datetimeFigureOut">
               <a:rPr lang="en-US" smtClean="0"/>
-              <a:t>9/25/2017</a:t>
+              <a:t>9/28/2017</a:t>
             </a:fld>
             <a:endParaRPr lang="en-US"/>
           </a:p>
@@ -3006,7 +3007,7 @@
           <a:p>
             <a:fld id="{7D2FF18F-DFC6-48DD-A8FE-22636A2E9C75}" type="datetimeFigureOut">
               <a:rPr lang="en-US" smtClean="0"/>
-              <a:t>9/25/2017</a:t>
+              <a:t>9/28/2017</a:t>
             </a:fld>
             <a:endParaRPr lang="en-US"/>
           </a:p>
@@ -3965,10 +3966,448 @@
   <p:clrMapOvr>
     <a:masterClrMapping/>
   </p:clrMapOvr>
+  <p:timing>
+    <p:tnLst>
+      <p:par>
+        <p:cTn id="1" dur="indefinite" restart="never" nodeType="tmRoot"/>
+      </p:par>
+    </p:tnLst>
+  </p:timing>
 </p:sld>
 </file>
 
 <file path=ppt/slides/slide4.xml><?xml version="1.0" encoding="utf-8"?>
+<p:sld xmlns:a="http://schemas.openxmlformats.org/drawingml/2006/main" xmlns:r="http://schemas.openxmlformats.org/officeDocument/2006/relationships" xmlns:p="http://schemas.openxmlformats.org/presentationml/2006/main">
+  <p:cSld>
+    <p:spTree>
+      <p:nvGrpSpPr>
+        <p:cNvPr id="1" name=""/>
+        <p:cNvGrpSpPr/>
+        <p:nvPr/>
+      </p:nvGrpSpPr>
+      <p:grpSpPr>
+        <a:xfrm>
+          <a:off x="0" y="0"/>
+          <a:ext cx="0" cy="0"/>
+          <a:chOff x="0" y="0"/>
+          <a:chExt cx="0" cy="0"/>
+        </a:xfrm>
+      </p:grpSpPr>
+      <p:sp>
+        <p:nvSpPr>
+          <p:cNvPr id="2" name="Title 1"/>
+          <p:cNvSpPr>
+            <a:spLocks noGrp="1"/>
+          </p:cNvSpPr>
+          <p:nvPr>
+            <p:ph type="title"/>
+          </p:nvPr>
+        </p:nvSpPr>
+        <p:spPr/>
+        <p:txBody>
+          <a:bodyPr/>
+          <a:lstStyle/>
+          <a:p>
+            <a:r>
+              <a:rPr lang="en-US" dirty="0" smtClean="0"/>
+              <a:t>Run a job</a:t>
+            </a:r>
+            <a:endParaRPr lang="en-US" dirty="0"/>
+          </a:p>
+        </p:txBody>
+      </p:sp>
+      <p:sp>
+        <p:nvSpPr>
+          <p:cNvPr id="4" name="Rectangle 3"/>
+          <p:cNvSpPr/>
+          <p:nvPr/>
+        </p:nvSpPr>
+        <p:spPr>
+          <a:xfrm>
+            <a:off x="237310" y="1488199"/>
+            <a:ext cx="12263844" cy="620383"/>
+          </a:xfrm>
+          <a:prstGeom prst="rect">
+            <a:avLst/>
+          </a:prstGeom>
+        </p:spPr>
+        <p:style>
+          <a:lnRef idx="2">
+            <a:schemeClr val="accent1"/>
+          </a:lnRef>
+          <a:fillRef idx="1">
+            <a:schemeClr val="lt1"/>
+          </a:fillRef>
+          <a:effectRef idx="0">
+            <a:schemeClr val="accent1"/>
+          </a:effectRef>
+          <a:fontRef idx="minor">
+            <a:schemeClr val="dk1"/>
+          </a:fontRef>
+        </p:style>
+        <p:txBody>
+          <a:bodyPr rtlCol="0" anchor="ctr"/>
+          <a:lstStyle/>
+          <a:p>
+            <a:pPr algn="ctr"/>
+            <a:r>
+              <a:rPr lang="en-US" dirty="0" smtClean="0"/>
+              <a:t>./run-job.sh –</a:t>
+            </a:r>
+            <a:r>
+              <a:rPr lang="en-US" dirty="0" err="1" smtClean="0"/>
+              <a:t>config</a:t>
+            </a:r>
+            <a:r>
+              <a:rPr lang="en-US" dirty="0" smtClean="0"/>
+              <a:t>-factory=</a:t>
+            </a:r>
+            <a:r>
+              <a:rPr lang="en-US" dirty="0" err="1" smtClean="0"/>
+              <a:t>org.apache.samza.config.factories.PropertiesConfigFactory</a:t>
+            </a:r>
+            <a:r>
+              <a:rPr lang="en-US" dirty="0" smtClean="0"/>
+              <a:t> –</a:t>
+            </a:r>
+            <a:r>
+              <a:rPr lang="en-US" dirty="0" err="1" smtClean="0"/>
+              <a:t>config</a:t>
+            </a:r>
+            <a:r>
+              <a:rPr lang="en-US" dirty="0" smtClean="0"/>
+              <a:t>-path=</a:t>
+            </a:r>
+            <a:r>
+              <a:rPr lang="en-US" dirty="0" err="1"/>
+              <a:t>wikipedia-feed.properties</a:t>
+            </a:r>
+            <a:endParaRPr lang="en-US" dirty="0"/>
+          </a:p>
+          <a:p>
+            <a:pPr algn="ctr"/>
+            <a:endParaRPr lang="en-US" dirty="0" smtClean="0"/>
+          </a:p>
+        </p:txBody>
+      </p:sp>
+      <p:sp>
+        <p:nvSpPr>
+          <p:cNvPr id="5" name="Rectangle 4"/>
+          <p:cNvSpPr/>
+          <p:nvPr/>
+        </p:nvSpPr>
+        <p:spPr>
+          <a:xfrm>
+            <a:off x="1681572" y="3732238"/>
+            <a:ext cx="1861457" cy="731520"/>
+          </a:xfrm>
+          <a:prstGeom prst="rect">
+            <a:avLst/>
+          </a:prstGeom>
+        </p:spPr>
+        <p:style>
+          <a:lnRef idx="2">
+            <a:schemeClr val="accent1"/>
+          </a:lnRef>
+          <a:fillRef idx="1">
+            <a:schemeClr val="lt1"/>
+          </a:fillRef>
+          <a:effectRef idx="0">
+            <a:schemeClr val="accent1"/>
+          </a:effectRef>
+          <a:fontRef idx="minor">
+            <a:schemeClr val="dk1"/>
+          </a:fontRef>
+        </p:style>
+        <p:txBody>
+          <a:bodyPr rtlCol="0" anchor="ctr"/>
+          <a:lstStyle/>
+          <a:p>
+            <a:pPr algn="ctr"/>
+            <a:r>
+              <a:rPr lang="en-US" b="1" dirty="0" err="1" smtClean="0"/>
+              <a:t>JobRunner.scala</a:t>
+            </a:r>
+            <a:endParaRPr lang="en-US" b="1" dirty="0" smtClean="0"/>
+          </a:p>
+          <a:p>
+            <a:pPr algn="ctr"/>
+            <a:r>
+              <a:rPr lang="en-US" dirty="0" smtClean="0"/>
+              <a:t>Run:</a:t>
+            </a:r>
+            <a:endParaRPr lang="en-US" dirty="0"/>
+          </a:p>
+        </p:txBody>
+      </p:sp>
+      <p:cxnSp>
+        <p:nvCxnSpPr>
+          <p:cNvPr id="7" name="Straight Arrow Connector 6"/>
+          <p:cNvCxnSpPr>
+            <a:stCxn id="18" idx="2"/>
+            <a:endCxn id="5" idx="0"/>
+          </p:cNvCxnSpPr>
+          <p:nvPr/>
+        </p:nvCxnSpPr>
+        <p:spPr>
+          <a:xfrm>
+            <a:off x="2612301" y="3182602"/>
+            <a:ext cx="0" cy="549636"/>
+          </a:xfrm>
+          <a:prstGeom prst="straightConnector1">
+            <a:avLst/>
+          </a:prstGeom>
+          <a:ln>
+            <a:tailEnd type="triangle"/>
+          </a:ln>
+        </p:spPr>
+        <p:style>
+          <a:lnRef idx="1">
+            <a:schemeClr val="accent1"/>
+          </a:lnRef>
+          <a:fillRef idx="0">
+            <a:schemeClr val="accent1"/>
+          </a:fillRef>
+          <a:effectRef idx="0">
+            <a:schemeClr val="accent1"/>
+          </a:effectRef>
+          <a:fontRef idx="minor">
+            <a:schemeClr val="tx1"/>
+          </a:fontRef>
+        </p:style>
+      </p:cxnSp>
+      <p:sp>
+        <p:nvSpPr>
+          <p:cNvPr id="18" name="Rectangle 17"/>
+          <p:cNvSpPr/>
+          <p:nvPr/>
+        </p:nvSpPr>
+        <p:spPr>
+          <a:xfrm>
+            <a:off x="237310" y="2658218"/>
+            <a:ext cx="4749982" cy="524384"/>
+          </a:xfrm>
+          <a:prstGeom prst="rect">
+            <a:avLst/>
+          </a:prstGeom>
+        </p:spPr>
+        <p:style>
+          <a:lnRef idx="2">
+            <a:schemeClr val="accent1"/>
+          </a:lnRef>
+          <a:fillRef idx="1">
+            <a:schemeClr val="lt1"/>
+          </a:fillRef>
+          <a:effectRef idx="0">
+            <a:schemeClr val="accent1"/>
+          </a:effectRef>
+          <a:fontRef idx="minor">
+            <a:schemeClr val="dk1"/>
+          </a:fontRef>
+        </p:style>
+        <p:txBody>
+          <a:bodyPr rtlCol="0" anchor="ctr"/>
+          <a:lstStyle/>
+          <a:p>
+            <a:pPr algn="ctr"/>
+            <a:r>
+              <a:rPr lang="en-US" dirty="0"/>
+              <a:t>./run-class.sh </a:t>
+            </a:r>
+            <a:r>
+              <a:rPr lang="en-US" dirty="0" err="1"/>
+              <a:t>org.apache.samza.job.JobRunner</a:t>
+            </a:r>
+            <a:endParaRPr lang="en-US" dirty="0"/>
+          </a:p>
+        </p:txBody>
+      </p:sp>
+      <p:cxnSp>
+        <p:nvCxnSpPr>
+          <p:cNvPr id="25" name="Straight Arrow Connector 24"/>
+          <p:cNvCxnSpPr>
+            <a:stCxn id="4" idx="2"/>
+            <a:endCxn id="18" idx="0"/>
+          </p:cNvCxnSpPr>
+          <p:nvPr/>
+        </p:nvCxnSpPr>
+        <p:spPr>
+          <a:xfrm flipH="1">
+            <a:off x="2612301" y="2108582"/>
+            <a:ext cx="3756931" cy="549636"/>
+          </a:xfrm>
+          <a:prstGeom prst="straightConnector1">
+            <a:avLst/>
+          </a:prstGeom>
+          <a:ln>
+            <a:tailEnd type="triangle"/>
+          </a:ln>
+        </p:spPr>
+        <p:style>
+          <a:lnRef idx="1">
+            <a:schemeClr val="accent1"/>
+          </a:lnRef>
+          <a:fillRef idx="0">
+            <a:schemeClr val="accent1"/>
+          </a:fillRef>
+          <a:effectRef idx="0">
+            <a:schemeClr val="accent1"/>
+          </a:effectRef>
+          <a:fontRef idx="minor">
+            <a:schemeClr val="tx1"/>
+          </a:fontRef>
+        </p:style>
+      </p:cxnSp>
+      <p:sp>
+        <p:nvSpPr>
+          <p:cNvPr id="33" name="Rectangle 32"/>
+          <p:cNvSpPr/>
+          <p:nvPr/>
+        </p:nvSpPr>
+        <p:spPr>
+          <a:xfrm>
+            <a:off x="6858546" y="2586299"/>
+            <a:ext cx="4783183" cy="3534452"/>
+          </a:xfrm>
+          <a:prstGeom prst="rect">
+            <a:avLst/>
+          </a:prstGeom>
+        </p:spPr>
+        <p:style>
+          <a:lnRef idx="2">
+            <a:schemeClr val="accent1"/>
+          </a:lnRef>
+          <a:fillRef idx="1">
+            <a:schemeClr val="lt1"/>
+          </a:fillRef>
+          <a:effectRef idx="0">
+            <a:schemeClr val="accent1"/>
+          </a:effectRef>
+          <a:fontRef idx="minor">
+            <a:schemeClr val="dk1"/>
+          </a:fontRef>
+        </p:style>
+        <p:txBody>
+          <a:bodyPr rtlCol="0" anchor="ctr"/>
+          <a:lstStyle/>
+          <a:p>
+            <a:pPr algn="ctr"/>
+            <a:r>
+              <a:rPr lang="en-US" dirty="0" err="1" smtClean="0"/>
+              <a:t>wikipedia-feed.properties</a:t>
+            </a:r>
+            <a:endParaRPr lang="en-US" dirty="0" smtClean="0"/>
+          </a:p>
+          <a:p>
+            <a:pPr algn="ctr"/>
+            <a:r>
+              <a:rPr lang="en-US" dirty="0" err="1" smtClean="0"/>
+              <a:t>job.factory.class</a:t>
+            </a:r>
+            <a:endParaRPr lang="en-US" dirty="0" smtClean="0"/>
+          </a:p>
+          <a:p>
+            <a:pPr algn="ctr"/>
+            <a:r>
+              <a:rPr lang="en-US" dirty="0" smtClean="0"/>
+              <a:t>job.name</a:t>
+            </a:r>
+          </a:p>
+          <a:p>
+            <a:pPr algn="ctr"/>
+            <a:r>
+              <a:rPr lang="en-US" dirty="0" err="1" smtClean="0"/>
+              <a:t>yarn.package.path</a:t>
+            </a:r>
+            <a:endParaRPr lang="en-US" dirty="0" smtClean="0"/>
+          </a:p>
+          <a:p>
+            <a:pPr algn="ctr"/>
+            <a:r>
+              <a:rPr lang="en-US" dirty="0" err="1" smtClean="0"/>
+              <a:t>task.class</a:t>
+            </a:r>
+            <a:endParaRPr lang="en-US" dirty="0" smtClean="0"/>
+          </a:p>
+          <a:p>
+            <a:pPr algn="ctr"/>
+            <a:r>
+              <a:rPr lang="en-US" dirty="0" err="1" smtClean="0"/>
+              <a:t>task.inputs</a:t>
+            </a:r>
+            <a:endParaRPr lang="en-US" dirty="0" smtClean="0"/>
+          </a:p>
+          <a:p>
+            <a:pPr algn="ctr"/>
+            <a:r>
+              <a:rPr lang="en-US" dirty="0" err="1" smtClean="0"/>
+              <a:t>serializer.registry.json.class</a:t>
+            </a:r>
+            <a:endParaRPr lang="en-US" dirty="0"/>
+          </a:p>
+          <a:p>
+            <a:pPr algn="ctr"/>
+            <a:r>
+              <a:rPr lang="en-US" dirty="0" err="1" smtClean="0"/>
+              <a:t>systems.kafka.samza.factory</a:t>
+            </a:r>
+            <a:endParaRPr lang="en-US" dirty="0" smtClean="0"/>
+          </a:p>
+          <a:p>
+            <a:pPr algn="ctr"/>
+            <a:r>
+              <a:rPr lang="en-US" dirty="0" err="1" smtClean="0"/>
+              <a:t>systems.kafka.samza.msg.serde</a:t>
+            </a:r>
+            <a:endParaRPr lang="en-US" dirty="0" smtClean="0"/>
+          </a:p>
+          <a:p>
+            <a:pPr algn="ctr"/>
+            <a:r>
+              <a:rPr lang="en-US" dirty="0" err="1" smtClean="0"/>
+              <a:t>systems.kafka.consumer.zookeeper.connect</a:t>
+            </a:r>
+            <a:endParaRPr lang="en-US" dirty="0" smtClean="0"/>
+          </a:p>
+          <a:p>
+            <a:pPr algn="ctr"/>
+            <a:r>
+              <a:rPr lang="en-US" dirty="0" err="1" smtClean="0"/>
+              <a:t>systems.kafka.producer.bootstrap.servers</a:t>
+            </a:r>
+            <a:endParaRPr lang="en-US" dirty="0" smtClean="0"/>
+          </a:p>
+          <a:p>
+            <a:pPr algn="ctr"/>
+            <a:r>
+              <a:rPr lang="en-US" dirty="0" err="1" smtClean="0"/>
+              <a:t>job.coordinator.system</a:t>
+            </a:r>
+            <a:endParaRPr lang="en-US" dirty="0" smtClean="0"/>
+          </a:p>
+        </p:txBody>
+      </p:sp>
+    </p:spTree>
+    <p:extLst>
+      <p:ext uri="{BB962C8B-B14F-4D97-AF65-F5344CB8AC3E}">
+        <p14:creationId xmlns:p14="http://schemas.microsoft.com/office/powerpoint/2010/main" val="1029901076"/>
+      </p:ext>
+    </p:extLst>
+  </p:cSld>
+  <p:clrMapOvr>
+    <a:masterClrMapping/>
+  </p:clrMapOvr>
+  <p:timing>
+    <p:tnLst>
+      <p:par>
+        <p:cTn id="1" dur="indefinite" restart="never" nodeType="tmRoot"/>
+      </p:par>
+    </p:tnLst>
+  </p:timing>
+</p:sld>
+</file>
+
+<file path=ppt/slides/slide5.xml><?xml version="1.0" encoding="utf-8"?>
 <p:sld xmlns:a="http://schemas.openxmlformats.org/drawingml/2006/main" xmlns:r="http://schemas.openxmlformats.org/officeDocument/2006/relationships" xmlns:p="http://schemas.openxmlformats.org/presentationml/2006/main">
   <p:cSld>
     <p:spTree>
@@ -5842,21 +6281,12 @@
               <a:rPr lang="en-US" dirty="0" smtClean="0"/>
               <a:t>???</a:t>
             </a:r>
-            <a:endParaRPr lang="en-US" dirty="0" smtClean="0"/>
           </a:p>
           <a:p>
             <a:pPr algn="ctr"/>
             <a:r>
               <a:rPr lang="en-US" dirty="0" smtClean="0"/>
-              <a:t>Start </a:t>
-            </a:r>
-            <a:r>
-              <a:rPr lang="en-US" dirty="0" smtClean="0"/>
-              <a:t>Application </a:t>
-            </a:r>
-            <a:r>
-              <a:rPr lang="en-US" dirty="0" smtClean="0"/>
-              <a:t>Manager</a:t>
+              <a:t>Start Application Manager</a:t>
             </a:r>
             <a:endParaRPr lang="en-US" dirty="0"/>
           </a:p>
@@ -6488,7 +6918,7 @@
 </p:sld>
 </file>
 
-<file path=ppt/slides/slide5.xml><?xml version="1.0" encoding="utf-8"?>
+<file path=ppt/slides/slide6.xml><?xml version="1.0" encoding="utf-8"?>
 <p:sld xmlns:a="http://schemas.openxmlformats.org/drawingml/2006/main" xmlns:r="http://schemas.openxmlformats.org/officeDocument/2006/relationships" xmlns:p="http://schemas.openxmlformats.org/presentationml/2006/main">
   <p:cSld>
     <p:spTree>
@@ -7260,7 +7690,7 @@
 </p:sld>
 </file>
 
-<file path=ppt/slides/slide6.xml><?xml version="1.0" encoding="utf-8"?>
+<file path=ppt/slides/slide7.xml><?xml version="1.0" encoding="utf-8"?>
 <p:sld xmlns:a="http://schemas.openxmlformats.org/drawingml/2006/main" xmlns:r="http://schemas.openxmlformats.org/officeDocument/2006/relationships" xmlns:p="http://schemas.openxmlformats.org/presentationml/2006/main">
   <p:cSld>
     <p:spTree>

</xml_diff>

<commit_message>
Samza deployment tutorial v1.0
</commit_message>
<xml_diff>
--- a/SamzaStructure.pptx
+++ b/SamzaStructure.pptx
@@ -114,6 +114,29 @@
     </a:lvl9pPr>
   </p:defaultTextStyle>
   <p:extLst>
+    <p:ext uri="{521415D9-36F7-43E2-AB2F-B90AF26B5E84}">
+      <p14:sectionLst xmlns:p14="http://schemas.microsoft.com/office/powerpoint/2010/main">
+        <p14:section name="Default Section" id="{89772D14-3FAD-4F25-BD61-626CDDDCAD6F}">
+          <p14:sldIdLst>
+            <p14:sldId id="256"/>
+            <p14:sldId id="259"/>
+            <p14:sldId id="260"/>
+          </p14:sldIdLst>
+        </p14:section>
+        <p14:section name="Submit job" id="{087780A7-9521-466D-9F4A-82953803DA7D}">
+          <p14:sldIdLst>
+            <p14:sldId id="262"/>
+            <p14:sldId id="257"/>
+            <p14:sldId id="258"/>
+          </p14:sldIdLst>
+        </p14:section>
+        <p14:section name="HelloSamza" id="{91F3EF09-C0C3-4BE2-8DC7-D6E3DBCA8E87}">
+          <p14:sldIdLst>
+            <p14:sldId id="261"/>
+          </p14:sldIdLst>
+        </p14:section>
+      </p14:sectionLst>
+    </p:ext>
     <p:ext uri="{EFAFB233-063F-42B5-8137-9DF3F51BA10A}">
       <p15:sldGuideLst xmlns:p15="http://schemas.microsoft.com/office/powerpoint/2012/main"/>
     </p:ext>
@@ -203,7 +226,7 @@
           <a:p>
             <a:fld id="{B35ADF0B-9749-404D-9A56-8E2BD576143D}" type="datetimeFigureOut">
               <a:rPr lang="en-US" smtClean="0"/>
-              <a:t>9/28/2017</a:t>
+              <a:t>10/19/2017</a:t>
             </a:fld>
             <a:endParaRPr lang="en-US"/>
           </a:p>
@@ -686,7 +709,7 @@
           <a:p>
             <a:fld id="{7D2FF18F-DFC6-48DD-A8FE-22636A2E9C75}" type="datetimeFigureOut">
               <a:rPr lang="en-US" smtClean="0"/>
-              <a:t>9/28/2017</a:t>
+              <a:t>10/19/2017</a:t>
             </a:fld>
             <a:endParaRPr lang="en-US"/>
           </a:p>
@@ -856,7 +879,7 @@
           <a:p>
             <a:fld id="{7D2FF18F-DFC6-48DD-A8FE-22636A2E9C75}" type="datetimeFigureOut">
               <a:rPr lang="en-US" smtClean="0"/>
-              <a:t>9/28/2017</a:t>
+              <a:t>10/19/2017</a:t>
             </a:fld>
             <a:endParaRPr lang="en-US"/>
           </a:p>
@@ -1036,7 +1059,7 @@
           <a:p>
             <a:fld id="{7D2FF18F-DFC6-48DD-A8FE-22636A2E9C75}" type="datetimeFigureOut">
               <a:rPr lang="en-US" smtClean="0"/>
-              <a:t>9/28/2017</a:t>
+              <a:t>10/19/2017</a:t>
             </a:fld>
             <a:endParaRPr lang="en-US"/>
           </a:p>
@@ -1206,7 +1229,7 @@
           <a:p>
             <a:fld id="{7D2FF18F-DFC6-48DD-A8FE-22636A2E9C75}" type="datetimeFigureOut">
               <a:rPr lang="en-US" smtClean="0"/>
-              <a:t>9/28/2017</a:t>
+              <a:t>10/19/2017</a:t>
             </a:fld>
             <a:endParaRPr lang="en-US"/>
           </a:p>
@@ -1452,7 +1475,7 @@
           <a:p>
             <a:fld id="{7D2FF18F-DFC6-48DD-A8FE-22636A2E9C75}" type="datetimeFigureOut">
               <a:rPr lang="en-US" smtClean="0"/>
-              <a:t>9/28/2017</a:t>
+              <a:t>10/19/2017</a:t>
             </a:fld>
             <a:endParaRPr lang="en-US"/>
           </a:p>
@@ -1684,7 +1707,7 @@
           <a:p>
             <a:fld id="{7D2FF18F-DFC6-48DD-A8FE-22636A2E9C75}" type="datetimeFigureOut">
               <a:rPr lang="en-US" smtClean="0"/>
-              <a:t>9/28/2017</a:t>
+              <a:t>10/19/2017</a:t>
             </a:fld>
             <a:endParaRPr lang="en-US"/>
           </a:p>
@@ -2051,7 +2074,7 @@
           <a:p>
             <a:fld id="{7D2FF18F-DFC6-48DD-A8FE-22636A2E9C75}" type="datetimeFigureOut">
               <a:rPr lang="en-US" smtClean="0"/>
-              <a:t>9/28/2017</a:t>
+              <a:t>10/19/2017</a:t>
             </a:fld>
             <a:endParaRPr lang="en-US"/>
           </a:p>
@@ -2169,7 +2192,7 @@
           <a:p>
             <a:fld id="{7D2FF18F-DFC6-48DD-A8FE-22636A2E9C75}" type="datetimeFigureOut">
               <a:rPr lang="en-US" smtClean="0"/>
-              <a:t>9/28/2017</a:t>
+              <a:t>10/19/2017</a:t>
             </a:fld>
             <a:endParaRPr lang="en-US"/>
           </a:p>
@@ -2264,7 +2287,7 @@
           <a:p>
             <a:fld id="{7D2FF18F-DFC6-48DD-A8FE-22636A2E9C75}" type="datetimeFigureOut">
               <a:rPr lang="en-US" smtClean="0"/>
-              <a:t>9/28/2017</a:t>
+              <a:t>10/19/2017</a:t>
             </a:fld>
             <a:endParaRPr lang="en-US"/>
           </a:p>
@@ -2541,7 +2564,7 @@
           <a:p>
             <a:fld id="{7D2FF18F-DFC6-48DD-A8FE-22636A2E9C75}" type="datetimeFigureOut">
               <a:rPr lang="en-US" smtClean="0"/>
-              <a:t>9/28/2017</a:t>
+              <a:t>10/19/2017</a:t>
             </a:fld>
             <a:endParaRPr lang="en-US"/>
           </a:p>
@@ -2794,7 +2817,7 @@
           <a:p>
             <a:fld id="{7D2FF18F-DFC6-48DD-A8FE-22636A2E9C75}" type="datetimeFigureOut">
               <a:rPr lang="en-US" smtClean="0"/>
-              <a:t>9/28/2017</a:t>
+              <a:t>10/19/2017</a:t>
             </a:fld>
             <a:endParaRPr lang="en-US"/>
           </a:p>
@@ -3007,7 +3030,7 @@
           <a:p>
             <a:fld id="{7D2FF18F-DFC6-48DD-A8FE-22636A2E9C75}" type="datetimeFigureOut">
               <a:rPr lang="en-US" smtClean="0"/>
-              <a:t>9/28/2017</a:t>
+              <a:t>10/19/2017</a:t>
             </a:fld>
             <a:endParaRPr lang="en-US"/>
           </a:p>
@@ -7722,10 +7745,96 @@
           <a:bodyPr/>
           <a:lstStyle/>
           <a:p>
-            <a:endParaRPr lang="en-US"/>
-          </a:p>
-        </p:txBody>
-      </p:sp>
+            <a:r>
+              <a:rPr lang="en-US" dirty="0" err="1" smtClean="0"/>
+              <a:t>WikipediaFeedStreamTask</a:t>
+            </a:r>
+            <a:endParaRPr lang="en-US" dirty="0"/>
+          </a:p>
+        </p:txBody>
+      </p:sp>
+      <p:pic>
+        <p:nvPicPr>
+          <p:cNvPr id="1026" name="Picture 2" descr="https://documents.lucidchart.com/documents/05f9900f-133a-45f0-a0c0-edd8205bddce/pages/0_0?a=262&amp;x=844&amp;y=628&amp;w=352&amp;h=264&amp;store=1&amp;accept=image%2F*&amp;auth=LCA%2048ef8ae93b250247bc409e26bf81c848f046bdc9-ts%3D1508378426"/>
+          <p:cNvPicPr>
+            <a:picLocks noChangeAspect="1" noChangeArrowheads="1"/>
+          </p:cNvPicPr>
+          <p:nvPr/>
+        </p:nvPicPr>
+        <p:blipFill>
+          <a:blip r:embed="rId2">
+            <a:extLst>
+              <a:ext uri="{28A0092B-C50C-407E-A947-70E740481C1C}">
+                <a14:useLocalDpi xmlns:a14="http://schemas.microsoft.com/office/drawing/2010/main" val="0"/>
+              </a:ext>
+            </a:extLst>
+          </a:blip>
+          <a:srcRect/>
+          <a:stretch>
+            <a:fillRect/>
+          </a:stretch>
+        </p:blipFill>
+        <p:spPr bwMode="auto">
+          <a:xfrm>
+            <a:off x="3235814" y="3647585"/>
+            <a:ext cx="2514600" cy="1885950"/>
+          </a:xfrm>
+          <a:prstGeom prst="rect">
+            <a:avLst/>
+          </a:prstGeom>
+          <a:noFill/>
+          <a:extLst>
+            <a:ext uri="{909E8E84-426E-40DD-AFC4-6F175D3DCCD1}">
+              <a14:hiddenFill xmlns:a14="http://schemas.microsoft.com/office/drawing/2010/main">
+                <a:solidFill>
+                  <a:srgbClr val="FFFFFF"/>
+                </a:solidFill>
+              </a14:hiddenFill>
+            </a:ext>
+          </a:extLst>
+        </p:spPr>
+      </p:pic>
+      <p:pic>
+        <p:nvPicPr>
+          <p:cNvPr id="1030" name="Picture 6" descr="https://documents.lucidchart.com/documents/05f9900f-133a-45f0-a0c0-edd8205bddce/pages/0_0?a=278&amp;x=455&amp;y=453&amp;w=550&amp;h=154&amp;store=1&amp;accept=image%2F*&amp;auth=LCA%20d9f9c3066d1a1f90035c98ef28524cf0afd052ae-ts%3D1508378426"/>
+          <p:cNvPicPr>
+            <a:picLocks noChangeAspect="1" noChangeArrowheads="1"/>
+          </p:cNvPicPr>
+          <p:nvPr/>
+        </p:nvPicPr>
+        <p:blipFill>
+          <a:blip r:embed="rId3">
+            <a:extLst>
+              <a:ext uri="{28A0092B-C50C-407E-A947-70E740481C1C}">
+                <a14:useLocalDpi xmlns:a14="http://schemas.microsoft.com/office/drawing/2010/main" val="0"/>
+              </a:ext>
+            </a:extLst>
+          </a:blip>
+          <a:srcRect/>
+          <a:stretch>
+            <a:fillRect/>
+          </a:stretch>
+        </p:blipFill>
+        <p:spPr bwMode="auto">
+          <a:xfrm>
+            <a:off x="2327275" y="1989137"/>
+            <a:ext cx="3933825" cy="1104901"/>
+          </a:xfrm>
+          <a:prstGeom prst="rect">
+            <a:avLst/>
+          </a:prstGeom>
+          <a:noFill/>
+          <a:extLst>
+            <a:ext uri="{909E8E84-426E-40DD-AFC4-6F175D3DCCD1}">
+              <a14:hiddenFill xmlns:a14="http://schemas.microsoft.com/office/drawing/2010/main">
+                <a:solidFill>
+                  <a:srgbClr val="FFFFFF"/>
+                </a:solidFill>
+              </a14:hiddenFill>
+            </a:ext>
+          </a:extLst>
+        </p:spPr>
+      </p:pic>
     </p:spTree>
     <p:extLst>
       <p:ext uri="{BB962C8B-B14F-4D97-AF65-F5344CB8AC3E}">

</xml_diff>

<commit_message>
Start to analyze YarnJob.scala
</commit_message>
<xml_diff>
--- a/SamzaStructure.pptx
+++ b/SamzaStructure.pptx
@@ -5,7 +5,7 @@
     <p:sldMasterId id="2147483648" r:id="rId1"/>
   </p:sldMasterIdLst>
   <p:notesMasterIdLst>
-    <p:notesMasterId r:id="rId9"/>
+    <p:notesMasterId r:id="rId14"/>
   </p:notesMasterIdLst>
   <p:sldIdLst>
     <p:sldId id="256" r:id="rId2"/>
@@ -14,7 +14,12 @@
     <p:sldId id="262" r:id="rId5"/>
     <p:sldId id="257" r:id="rId6"/>
     <p:sldId id="258" r:id="rId7"/>
-    <p:sldId id="261" r:id="rId8"/>
+    <p:sldId id="268" r:id="rId8"/>
+    <p:sldId id="263" r:id="rId9"/>
+    <p:sldId id="264" r:id="rId10"/>
+    <p:sldId id="265" r:id="rId11"/>
+    <p:sldId id="266" r:id="rId12"/>
+    <p:sldId id="267" r:id="rId13"/>
   </p:sldIdLst>
   <p:sldSz cx="12192000" cy="6858000"/>
   <p:notesSz cx="6858000" cy="9144000"/>
@@ -128,11 +133,20 @@
             <p14:sldId id="262"/>
             <p14:sldId id="257"/>
             <p14:sldId id="258"/>
+            <p14:sldId id="268"/>
           </p14:sldIdLst>
         </p14:section>
-        <p14:section name="HelloSamza" id="{91F3EF09-C0C3-4BE2-8DC7-D6E3DBCA8E87}">
+        <p14:section name="Task" id="{A6BE1BE1-8715-4861-9F81-EBD747D5600C}">
           <p14:sldIdLst>
-            <p14:sldId id="261"/>
+            <p14:sldId id="263"/>
+            <p14:sldId id="264"/>
+            <p14:sldId id="265"/>
+            <p14:sldId id="266"/>
+          </p14:sldIdLst>
+        </p14:section>
+        <p14:section name="ProcessJob" id="{EB2BD693-8ADC-4925-94C5-588DCC0B727C}">
+          <p14:sldIdLst>
+            <p14:sldId id="267"/>
           </p14:sldIdLst>
         </p14:section>
       </p14:sectionLst>
@@ -226,7 +240,7 @@
           <a:p>
             <a:fld id="{B35ADF0B-9749-404D-9A56-8E2BD576143D}" type="datetimeFigureOut">
               <a:rPr lang="en-US" smtClean="0"/>
-              <a:t>10/19/2017</a:t>
+              <a:t>10/30/2017</a:t>
             </a:fld>
             <a:endParaRPr lang="en-US"/>
           </a:p>
@@ -578,6 +592,90 @@
 </p:notes>
 </file>
 
+<file path=ppt/notesSlides/notesSlide2.xml><?xml version="1.0" encoding="utf-8"?>
+<p:notes xmlns:a="http://schemas.openxmlformats.org/drawingml/2006/main" xmlns:r="http://schemas.openxmlformats.org/officeDocument/2006/relationships" xmlns:p="http://schemas.openxmlformats.org/presentationml/2006/main">
+  <p:cSld>
+    <p:spTree>
+      <p:nvGrpSpPr>
+        <p:cNvPr id="1" name=""/>
+        <p:cNvGrpSpPr/>
+        <p:nvPr/>
+      </p:nvGrpSpPr>
+      <p:grpSpPr>
+        <a:xfrm>
+          <a:off x="0" y="0"/>
+          <a:ext cx="0" cy="0"/>
+          <a:chOff x="0" y="0"/>
+          <a:chExt cx="0" cy="0"/>
+        </a:xfrm>
+      </p:grpSpPr>
+      <p:sp>
+        <p:nvSpPr>
+          <p:cNvPr id="2" name="Slide Image Placeholder 1"/>
+          <p:cNvSpPr>
+            <a:spLocks noGrp="1" noRot="1" noChangeAspect="1"/>
+          </p:cNvSpPr>
+          <p:nvPr>
+            <p:ph type="sldImg"/>
+          </p:nvPr>
+        </p:nvSpPr>
+        <p:spPr/>
+      </p:sp>
+      <p:sp>
+        <p:nvSpPr>
+          <p:cNvPr id="3" name="Notes Placeholder 2"/>
+          <p:cNvSpPr>
+            <a:spLocks noGrp="1"/>
+          </p:cNvSpPr>
+          <p:nvPr>
+            <p:ph type="body" idx="1"/>
+          </p:nvPr>
+        </p:nvSpPr>
+        <p:spPr/>
+        <p:txBody>
+          <a:bodyPr/>
+          <a:lstStyle/>
+          <a:p>
+            <a:endParaRPr lang="en-US" dirty="0"/>
+          </a:p>
+        </p:txBody>
+      </p:sp>
+      <p:sp>
+        <p:nvSpPr>
+          <p:cNvPr id="4" name="Slide Number Placeholder 3"/>
+          <p:cNvSpPr>
+            <a:spLocks noGrp="1"/>
+          </p:cNvSpPr>
+          <p:nvPr>
+            <p:ph type="sldNum" sz="quarter" idx="10"/>
+          </p:nvPr>
+        </p:nvSpPr>
+        <p:spPr/>
+        <p:txBody>
+          <a:bodyPr/>
+          <a:lstStyle/>
+          <a:p>
+            <a:fld id="{339097E1-CCCB-4E56-BB56-9CF62DC970F1}" type="slidenum">
+              <a:rPr lang="en-US" smtClean="0"/>
+              <a:t>9</a:t>
+            </a:fld>
+            <a:endParaRPr lang="en-US"/>
+          </a:p>
+        </p:txBody>
+      </p:sp>
+    </p:spTree>
+    <p:extLst>
+      <p:ext uri="{BB962C8B-B14F-4D97-AF65-F5344CB8AC3E}">
+        <p14:creationId xmlns:p14="http://schemas.microsoft.com/office/powerpoint/2010/main" val="3849999253"/>
+      </p:ext>
+    </p:extLst>
+  </p:cSld>
+  <p:clrMapOvr>
+    <a:masterClrMapping/>
+  </p:clrMapOvr>
+</p:notes>
+</file>
+
 <file path=ppt/slideLayouts/slideLayout1.xml><?xml version="1.0" encoding="utf-8"?>
 <p:sldLayout xmlns:a="http://schemas.openxmlformats.org/drawingml/2006/main" xmlns:r="http://schemas.openxmlformats.org/officeDocument/2006/relationships" xmlns:p="http://schemas.openxmlformats.org/presentationml/2006/main" type="title" preserve="1">
   <p:cSld name="Title Slide">
@@ -709,7 +807,7 @@
           <a:p>
             <a:fld id="{7D2FF18F-DFC6-48DD-A8FE-22636A2E9C75}" type="datetimeFigureOut">
               <a:rPr lang="en-US" smtClean="0"/>
-              <a:t>10/19/2017</a:t>
+              <a:t>10/30/2017</a:t>
             </a:fld>
             <a:endParaRPr lang="en-US"/>
           </a:p>
@@ -879,7 +977,7 @@
           <a:p>
             <a:fld id="{7D2FF18F-DFC6-48DD-A8FE-22636A2E9C75}" type="datetimeFigureOut">
               <a:rPr lang="en-US" smtClean="0"/>
-              <a:t>10/19/2017</a:t>
+              <a:t>10/30/2017</a:t>
             </a:fld>
             <a:endParaRPr lang="en-US"/>
           </a:p>
@@ -1059,7 +1157,7 @@
           <a:p>
             <a:fld id="{7D2FF18F-DFC6-48DD-A8FE-22636A2E9C75}" type="datetimeFigureOut">
               <a:rPr lang="en-US" smtClean="0"/>
-              <a:t>10/19/2017</a:t>
+              <a:t>10/30/2017</a:t>
             </a:fld>
             <a:endParaRPr lang="en-US"/>
           </a:p>
@@ -1229,7 +1327,7 @@
           <a:p>
             <a:fld id="{7D2FF18F-DFC6-48DD-A8FE-22636A2E9C75}" type="datetimeFigureOut">
               <a:rPr lang="en-US" smtClean="0"/>
-              <a:t>10/19/2017</a:t>
+              <a:t>10/30/2017</a:t>
             </a:fld>
             <a:endParaRPr lang="en-US"/>
           </a:p>
@@ -1475,7 +1573,7 @@
           <a:p>
             <a:fld id="{7D2FF18F-DFC6-48DD-A8FE-22636A2E9C75}" type="datetimeFigureOut">
               <a:rPr lang="en-US" smtClean="0"/>
-              <a:t>10/19/2017</a:t>
+              <a:t>10/30/2017</a:t>
             </a:fld>
             <a:endParaRPr lang="en-US"/>
           </a:p>
@@ -1707,7 +1805,7 @@
           <a:p>
             <a:fld id="{7D2FF18F-DFC6-48DD-A8FE-22636A2E9C75}" type="datetimeFigureOut">
               <a:rPr lang="en-US" smtClean="0"/>
-              <a:t>10/19/2017</a:t>
+              <a:t>10/30/2017</a:t>
             </a:fld>
             <a:endParaRPr lang="en-US"/>
           </a:p>
@@ -2074,7 +2172,7 @@
           <a:p>
             <a:fld id="{7D2FF18F-DFC6-48DD-A8FE-22636A2E9C75}" type="datetimeFigureOut">
               <a:rPr lang="en-US" smtClean="0"/>
-              <a:t>10/19/2017</a:t>
+              <a:t>10/30/2017</a:t>
             </a:fld>
             <a:endParaRPr lang="en-US"/>
           </a:p>
@@ -2192,7 +2290,7 @@
           <a:p>
             <a:fld id="{7D2FF18F-DFC6-48DD-A8FE-22636A2E9C75}" type="datetimeFigureOut">
               <a:rPr lang="en-US" smtClean="0"/>
-              <a:t>10/19/2017</a:t>
+              <a:t>10/30/2017</a:t>
             </a:fld>
             <a:endParaRPr lang="en-US"/>
           </a:p>
@@ -2287,7 +2385,7 @@
           <a:p>
             <a:fld id="{7D2FF18F-DFC6-48DD-A8FE-22636A2E9C75}" type="datetimeFigureOut">
               <a:rPr lang="en-US" smtClean="0"/>
-              <a:t>10/19/2017</a:t>
+              <a:t>10/30/2017</a:t>
             </a:fld>
             <a:endParaRPr lang="en-US"/>
           </a:p>
@@ -2564,7 +2662,7 @@
           <a:p>
             <a:fld id="{7D2FF18F-DFC6-48DD-A8FE-22636A2E9C75}" type="datetimeFigureOut">
               <a:rPr lang="en-US" smtClean="0"/>
-              <a:t>10/19/2017</a:t>
+              <a:t>10/30/2017</a:t>
             </a:fld>
             <a:endParaRPr lang="en-US"/>
           </a:p>
@@ -2817,7 +2915,7 @@
           <a:p>
             <a:fld id="{7D2FF18F-DFC6-48DD-A8FE-22636A2E9C75}" type="datetimeFigureOut">
               <a:rPr lang="en-US" smtClean="0"/>
-              <a:t>10/19/2017</a:t>
+              <a:t>10/30/2017</a:t>
             </a:fld>
             <a:endParaRPr lang="en-US"/>
           </a:p>
@@ -3030,7 +3128,7 @@
           <a:p>
             <a:fld id="{7D2FF18F-DFC6-48DD-A8FE-22636A2E9C75}" type="datetimeFigureOut">
               <a:rPr lang="en-US" smtClean="0"/>
-              <a:t>10/19/2017</a:t>
+              <a:t>10/30/2017</a:t>
             </a:fld>
             <a:endParaRPr lang="en-US"/>
           </a:p>
@@ -3486,6 +3584,1227 @@
 </p:sld>
 </file>
 
+<file path=ppt/slides/slide10.xml><?xml version="1.0" encoding="utf-8"?>
+<p:sld xmlns:a="http://schemas.openxmlformats.org/drawingml/2006/main" xmlns:r="http://schemas.openxmlformats.org/officeDocument/2006/relationships" xmlns:p="http://schemas.openxmlformats.org/presentationml/2006/main">
+  <p:cSld>
+    <p:spTree>
+      <p:nvGrpSpPr>
+        <p:cNvPr id="1" name=""/>
+        <p:cNvGrpSpPr/>
+        <p:nvPr/>
+      </p:nvGrpSpPr>
+      <p:grpSpPr>
+        <a:xfrm>
+          <a:off x="0" y="0"/>
+          <a:ext cx="0" cy="0"/>
+          <a:chOff x="0" y="0"/>
+          <a:chExt cx="0" cy="0"/>
+        </a:xfrm>
+      </p:grpSpPr>
+      <p:sp>
+        <p:nvSpPr>
+          <p:cNvPr id="31" name="Rectangle 30"/>
+          <p:cNvSpPr/>
+          <p:nvPr/>
+        </p:nvSpPr>
+        <p:spPr>
+          <a:xfrm>
+            <a:off x="1972491" y="1463039"/>
+            <a:ext cx="8007532" cy="4036423"/>
+          </a:xfrm>
+          <a:prstGeom prst="rect">
+            <a:avLst/>
+          </a:prstGeom>
+          <a:ln>
+            <a:prstDash val="dash"/>
+          </a:ln>
+        </p:spPr>
+        <p:style>
+          <a:lnRef idx="2">
+            <a:schemeClr val="accent1"/>
+          </a:lnRef>
+          <a:fillRef idx="1">
+            <a:schemeClr val="lt1"/>
+          </a:fillRef>
+          <a:effectRef idx="0">
+            <a:schemeClr val="accent1"/>
+          </a:effectRef>
+          <a:fontRef idx="minor">
+            <a:schemeClr val="dk1"/>
+          </a:fontRef>
+        </p:style>
+        <p:txBody>
+          <a:bodyPr rtlCol="0" anchor="ctr"/>
+          <a:lstStyle/>
+          <a:p>
+            <a:pPr algn="ctr"/>
+            <a:endParaRPr lang="en-US"/>
+          </a:p>
+        </p:txBody>
+      </p:sp>
+      <p:sp>
+        <p:nvSpPr>
+          <p:cNvPr id="6" name="Rectangle 5"/>
+          <p:cNvSpPr/>
+          <p:nvPr/>
+        </p:nvSpPr>
+        <p:spPr>
+          <a:xfrm>
+            <a:off x="2256608" y="2053655"/>
+            <a:ext cx="3086102" cy="3001671"/>
+          </a:xfrm>
+          <a:prstGeom prst="rect">
+            <a:avLst/>
+          </a:prstGeom>
+        </p:spPr>
+        <p:style>
+          <a:lnRef idx="2">
+            <a:schemeClr val="accent1"/>
+          </a:lnRef>
+          <a:fillRef idx="1">
+            <a:schemeClr val="lt1"/>
+          </a:fillRef>
+          <a:effectRef idx="0">
+            <a:schemeClr val="accent1"/>
+          </a:effectRef>
+          <a:fontRef idx="minor">
+            <a:schemeClr val="dk1"/>
+          </a:fontRef>
+        </p:style>
+        <p:txBody>
+          <a:bodyPr rtlCol="0" anchor="ctr"/>
+          <a:lstStyle/>
+          <a:p>
+            <a:pPr algn="ctr"/>
+            <a:endParaRPr lang="en-US"/>
+          </a:p>
+        </p:txBody>
+      </p:sp>
+      <p:sp>
+        <p:nvSpPr>
+          <p:cNvPr id="2" name="Title 1"/>
+          <p:cNvSpPr>
+            <a:spLocks noGrp="1"/>
+          </p:cNvSpPr>
+          <p:nvPr>
+            <p:ph type="title"/>
+          </p:nvPr>
+        </p:nvSpPr>
+        <p:spPr/>
+        <p:txBody>
+          <a:bodyPr/>
+          <a:lstStyle/>
+          <a:p>
+            <a:r>
+              <a:rPr lang="en-US" dirty="0" err="1" smtClean="0"/>
+              <a:t>WikipediaFeed</a:t>
+            </a:r>
+            <a:endParaRPr lang="en-US" dirty="0"/>
+          </a:p>
+        </p:txBody>
+      </p:sp>
+      <p:sp>
+        <p:nvSpPr>
+          <p:cNvPr id="5" name="TextBox 4"/>
+          <p:cNvSpPr txBox="1"/>
+          <p:nvPr/>
+        </p:nvSpPr>
+        <p:spPr>
+          <a:xfrm>
+            <a:off x="2787285" y="2157122"/>
+            <a:ext cx="2074817" cy="369332"/>
+          </a:xfrm>
+          <a:prstGeom prst="rect">
+            <a:avLst/>
+          </a:prstGeom>
+          <a:noFill/>
+        </p:spPr>
+        <p:txBody>
+          <a:bodyPr wrap="square" rtlCol="0">
+            <a:spAutoFit/>
+          </a:bodyPr>
+          <a:lstStyle/>
+          <a:p>
+            <a:r>
+              <a:rPr lang="en-US" dirty="0" err="1" smtClean="0"/>
+              <a:t>WikipediaFactory</a:t>
+            </a:r>
+            <a:endParaRPr lang="en-US" dirty="0"/>
+          </a:p>
+        </p:txBody>
+      </p:sp>
+      <p:sp>
+        <p:nvSpPr>
+          <p:cNvPr id="15" name="TextBox 14"/>
+          <p:cNvSpPr txBox="1"/>
+          <p:nvPr/>
+        </p:nvSpPr>
+        <p:spPr>
+          <a:xfrm rot="540974">
+            <a:off x="1544655" y="3164817"/>
+            <a:ext cx="781594" cy="369332"/>
+          </a:xfrm>
+          <a:prstGeom prst="rect">
+            <a:avLst/>
+          </a:prstGeom>
+          <a:noFill/>
+        </p:spPr>
+        <p:txBody>
+          <a:bodyPr wrap="square" rtlCol="0">
+            <a:spAutoFit/>
+          </a:bodyPr>
+          <a:lstStyle/>
+          <a:p>
+            <a:r>
+              <a:rPr lang="en-US" dirty="0" smtClean="0"/>
+              <a:t>Listen</a:t>
+            </a:r>
+            <a:endParaRPr lang="en-US" dirty="0"/>
+          </a:p>
+        </p:txBody>
+      </p:sp>
+      <p:sp>
+        <p:nvSpPr>
+          <p:cNvPr id="16" name="Rectangle 15"/>
+          <p:cNvSpPr/>
+          <p:nvPr/>
+        </p:nvSpPr>
+        <p:spPr>
+          <a:xfrm>
+            <a:off x="261257" y="1463040"/>
+            <a:ext cx="1018903" cy="3931920"/>
+          </a:xfrm>
+          <a:prstGeom prst="rect">
+            <a:avLst/>
+          </a:prstGeom>
+        </p:spPr>
+        <p:style>
+          <a:lnRef idx="2">
+            <a:schemeClr val="accent1"/>
+          </a:lnRef>
+          <a:fillRef idx="1">
+            <a:schemeClr val="lt1"/>
+          </a:fillRef>
+          <a:effectRef idx="0">
+            <a:schemeClr val="accent1"/>
+          </a:effectRef>
+          <a:fontRef idx="minor">
+            <a:schemeClr val="dk1"/>
+          </a:fontRef>
+        </p:style>
+        <p:txBody>
+          <a:bodyPr rtlCol="0" anchor="ctr"/>
+          <a:lstStyle/>
+          <a:p>
+            <a:pPr algn="ctr"/>
+            <a:endParaRPr lang="en-US"/>
+          </a:p>
+        </p:txBody>
+      </p:sp>
+      <p:sp>
+        <p:nvSpPr>
+          <p:cNvPr id="17" name="TextBox 16"/>
+          <p:cNvSpPr txBox="1"/>
+          <p:nvPr/>
+        </p:nvSpPr>
+        <p:spPr>
+          <a:xfrm>
+            <a:off x="539875" y="2788603"/>
+            <a:ext cx="461665" cy="3403826"/>
+          </a:xfrm>
+          <a:prstGeom prst="rect">
+            <a:avLst/>
+          </a:prstGeom>
+          <a:noFill/>
+        </p:spPr>
+        <p:txBody>
+          <a:bodyPr vert="eaVert" wrap="square" rtlCol="0">
+            <a:spAutoFit/>
+          </a:bodyPr>
+          <a:lstStyle/>
+          <a:p>
+            <a:r>
+              <a:rPr lang="en-US" dirty="0" err="1" smtClean="0"/>
+              <a:t>WikiPedia</a:t>
+            </a:r>
+            <a:endParaRPr lang="en-US" dirty="0"/>
+          </a:p>
+        </p:txBody>
+      </p:sp>
+      <p:sp>
+        <p:nvSpPr>
+          <p:cNvPr id="48" name="Rectangle 47"/>
+          <p:cNvSpPr/>
+          <p:nvPr/>
+        </p:nvSpPr>
+        <p:spPr>
+          <a:xfrm>
+            <a:off x="2641417" y="2621610"/>
+            <a:ext cx="2220685" cy="2076283"/>
+          </a:xfrm>
+          <a:prstGeom prst="rect">
+            <a:avLst/>
+          </a:prstGeom>
+          <a:ln>
+            <a:prstDash val="solid"/>
+          </a:ln>
+        </p:spPr>
+        <p:style>
+          <a:lnRef idx="2">
+            <a:schemeClr val="accent1"/>
+          </a:lnRef>
+          <a:fillRef idx="1">
+            <a:schemeClr val="lt1"/>
+          </a:fillRef>
+          <a:effectRef idx="0">
+            <a:schemeClr val="accent1"/>
+          </a:effectRef>
+          <a:fontRef idx="minor">
+            <a:schemeClr val="dk1"/>
+          </a:fontRef>
+        </p:style>
+        <p:txBody>
+          <a:bodyPr rtlCol="0" anchor="ctr"/>
+          <a:lstStyle/>
+          <a:p>
+            <a:pPr algn="ctr"/>
+            <a:endParaRPr lang="en-US"/>
+          </a:p>
+        </p:txBody>
+      </p:sp>
+      <p:sp>
+        <p:nvSpPr>
+          <p:cNvPr id="21" name="Rectangle 20"/>
+          <p:cNvSpPr/>
+          <p:nvPr/>
+        </p:nvSpPr>
+        <p:spPr>
+          <a:xfrm>
+            <a:off x="6073142" y="3090369"/>
+            <a:ext cx="2664822" cy="904909"/>
+          </a:xfrm>
+          <a:prstGeom prst="rect">
+            <a:avLst/>
+          </a:prstGeom>
+        </p:spPr>
+        <p:style>
+          <a:lnRef idx="2">
+            <a:schemeClr val="accent1"/>
+          </a:lnRef>
+          <a:fillRef idx="1">
+            <a:schemeClr val="lt1"/>
+          </a:fillRef>
+          <a:effectRef idx="0">
+            <a:schemeClr val="accent1"/>
+          </a:effectRef>
+          <a:fontRef idx="minor">
+            <a:schemeClr val="dk1"/>
+          </a:fontRef>
+        </p:style>
+        <p:txBody>
+          <a:bodyPr rtlCol="0" anchor="ctr"/>
+          <a:lstStyle/>
+          <a:p>
+            <a:pPr algn="ctr"/>
+            <a:endParaRPr lang="en-US" dirty="0"/>
+          </a:p>
+        </p:txBody>
+      </p:sp>
+      <p:sp>
+        <p:nvSpPr>
+          <p:cNvPr id="24" name="TextBox 23"/>
+          <p:cNvSpPr txBox="1"/>
+          <p:nvPr/>
+        </p:nvSpPr>
+        <p:spPr>
+          <a:xfrm>
+            <a:off x="6525090" y="3184680"/>
+            <a:ext cx="1593669" cy="646331"/>
+          </a:xfrm>
+          <a:prstGeom prst="rect">
+            <a:avLst/>
+          </a:prstGeom>
+          <a:noFill/>
+        </p:spPr>
+        <p:txBody>
+          <a:bodyPr wrap="square" rtlCol="0">
+            <a:spAutoFit/>
+          </a:bodyPr>
+          <a:lstStyle/>
+          <a:p>
+            <a:r>
+              <a:rPr lang="en-US" dirty="0" err="1" smtClean="0"/>
+              <a:t>WikipediaFeedStreamTask</a:t>
+            </a:r>
+            <a:endParaRPr lang="en-US" dirty="0"/>
+          </a:p>
+        </p:txBody>
+      </p:sp>
+      <p:cxnSp>
+        <p:nvCxnSpPr>
+          <p:cNvPr id="26" name="Straight Arrow Connector 25"/>
+          <p:cNvCxnSpPr>
+            <a:stCxn id="21" idx="3"/>
+          </p:cNvCxnSpPr>
+          <p:nvPr/>
+        </p:nvCxnSpPr>
+        <p:spPr>
+          <a:xfrm flipV="1">
+            <a:off x="8737964" y="3538078"/>
+            <a:ext cx="2289268" cy="4746"/>
+          </a:xfrm>
+          <a:prstGeom prst="straightConnector1">
+            <a:avLst/>
+          </a:prstGeom>
+          <a:ln>
+            <a:tailEnd type="triangle"/>
+          </a:ln>
+        </p:spPr>
+        <p:style>
+          <a:lnRef idx="1">
+            <a:schemeClr val="accent1"/>
+          </a:lnRef>
+          <a:fillRef idx="0">
+            <a:schemeClr val="accent1"/>
+          </a:fillRef>
+          <a:effectRef idx="0">
+            <a:schemeClr val="accent1"/>
+          </a:effectRef>
+          <a:fontRef idx="minor">
+            <a:schemeClr val="tx1"/>
+          </a:fontRef>
+        </p:style>
+      </p:cxnSp>
+      <p:sp>
+        <p:nvSpPr>
+          <p:cNvPr id="35" name="TextBox 34"/>
+          <p:cNvSpPr txBox="1"/>
+          <p:nvPr/>
+        </p:nvSpPr>
+        <p:spPr>
+          <a:xfrm>
+            <a:off x="8983524" y="3164817"/>
+            <a:ext cx="2314305" cy="369332"/>
+          </a:xfrm>
+          <a:prstGeom prst="rect">
+            <a:avLst/>
+          </a:prstGeom>
+          <a:noFill/>
+        </p:spPr>
+        <p:txBody>
+          <a:bodyPr wrap="square" rtlCol="0">
+            <a:spAutoFit/>
+          </a:bodyPr>
+          <a:lstStyle/>
+          <a:p>
+            <a:r>
+              <a:rPr lang="en-US" dirty="0" smtClean="0"/>
+              <a:t>Wikipedia-raw</a:t>
+            </a:r>
+            <a:endParaRPr lang="en-US" dirty="0"/>
+          </a:p>
+        </p:txBody>
+      </p:sp>
+      <p:sp>
+        <p:nvSpPr>
+          <p:cNvPr id="42" name="Rectangle 41"/>
+          <p:cNvSpPr/>
+          <p:nvPr/>
+        </p:nvSpPr>
+        <p:spPr>
+          <a:xfrm>
+            <a:off x="2921991" y="3265902"/>
+            <a:ext cx="1627070" cy="841056"/>
+          </a:xfrm>
+          <a:prstGeom prst="rect">
+            <a:avLst/>
+          </a:prstGeom>
+        </p:spPr>
+        <p:style>
+          <a:lnRef idx="2">
+            <a:schemeClr val="accent1"/>
+          </a:lnRef>
+          <a:fillRef idx="1">
+            <a:schemeClr val="lt1"/>
+          </a:fillRef>
+          <a:effectRef idx="0">
+            <a:schemeClr val="accent1"/>
+          </a:effectRef>
+          <a:fontRef idx="minor">
+            <a:schemeClr val="dk1"/>
+          </a:fontRef>
+        </p:style>
+        <p:txBody>
+          <a:bodyPr rtlCol="0" anchor="ctr"/>
+          <a:lstStyle/>
+          <a:p>
+            <a:pPr algn="ctr"/>
+            <a:endParaRPr lang="en-US" dirty="0"/>
+          </a:p>
+        </p:txBody>
+      </p:sp>
+      <p:sp>
+        <p:nvSpPr>
+          <p:cNvPr id="43" name="TextBox 42"/>
+          <p:cNvSpPr txBox="1"/>
+          <p:nvPr/>
+        </p:nvSpPr>
+        <p:spPr>
+          <a:xfrm>
+            <a:off x="2915562" y="3461679"/>
+            <a:ext cx="1703612" cy="369332"/>
+          </a:xfrm>
+          <a:prstGeom prst="rect">
+            <a:avLst/>
+          </a:prstGeom>
+          <a:noFill/>
+        </p:spPr>
+        <p:txBody>
+          <a:bodyPr wrap="square" rtlCol="0">
+            <a:spAutoFit/>
+          </a:bodyPr>
+          <a:lstStyle/>
+          <a:p>
+            <a:r>
+              <a:rPr lang="en-US" dirty="0" err="1" smtClean="0"/>
+              <a:t>WikipediaFeed</a:t>
+            </a:r>
+            <a:endParaRPr lang="en-US" dirty="0"/>
+          </a:p>
+        </p:txBody>
+      </p:sp>
+      <p:cxnSp>
+        <p:nvCxnSpPr>
+          <p:cNvPr id="14" name="Straight Arrow Connector 13"/>
+          <p:cNvCxnSpPr>
+            <a:stCxn id="16" idx="3"/>
+            <a:endCxn id="48" idx="1"/>
+          </p:cNvCxnSpPr>
+          <p:nvPr/>
+        </p:nvCxnSpPr>
+        <p:spPr>
+          <a:xfrm>
+            <a:off x="1280160" y="3429000"/>
+            <a:ext cx="1361257" cy="230752"/>
+          </a:xfrm>
+          <a:prstGeom prst="straightConnector1">
+            <a:avLst/>
+          </a:prstGeom>
+          <a:ln>
+            <a:headEnd type="triangle"/>
+            <a:tailEnd type="triangle"/>
+          </a:ln>
+        </p:spPr>
+        <p:style>
+          <a:lnRef idx="1">
+            <a:schemeClr val="accent1"/>
+          </a:lnRef>
+          <a:fillRef idx="0">
+            <a:schemeClr val="accent1"/>
+          </a:fillRef>
+          <a:effectRef idx="0">
+            <a:schemeClr val="accent1"/>
+          </a:effectRef>
+          <a:fontRef idx="minor">
+            <a:schemeClr val="tx1"/>
+          </a:fontRef>
+        </p:style>
+      </p:cxnSp>
+      <p:cxnSp>
+        <p:nvCxnSpPr>
+          <p:cNvPr id="20" name="Straight Arrow Connector 19"/>
+          <p:cNvCxnSpPr>
+            <a:stCxn id="48" idx="3"/>
+            <a:endCxn id="21" idx="1"/>
+          </p:cNvCxnSpPr>
+          <p:nvPr/>
+        </p:nvCxnSpPr>
+        <p:spPr>
+          <a:xfrm flipV="1">
+            <a:off x="4862102" y="3542824"/>
+            <a:ext cx="1211040" cy="116928"/>
+          </a:xfrm>
+          <a:prstGeom prst="straightConnector1">
+            <a:avLst/>
+          </a:prstGeom>
+          <a:ln>
+            <a:tailEnd type="triangle"/>
+          </a:ln>
+        </p:spPr>
+        <p:style>
+          <a:lnRef idx="1">
+            <a:schemeClr val="accent1"/>
+          </a:lnRef>
+          <a:fillRef idx="0">
+            <a:schemeClr val="accent1"/>
+          </a:fillRef>
+          <a:effectRef idx="0">
+            <a:schemeClr val="accent1"/>
+          </a:effectRef>
+          <a:fontRef idx="minor">
+            <a:schemeClr val="tx1"/>
+          </a:fontRef>
+        </p:style>
+      </p:cxnSp>
+      <p:sp>
+        <p:nvSpPr>
+          <p:cNvPr id="58" name="TextBox 57"/>
+          <p:cNvSpPr txBox="1"/>
+          <p:nvPr/>
+        </p:nvSpPr>
+        <p:spPr>
+          <a:xfrm>
+            <a:off x="2753144" y="2724287"/>
+            <a:ext cx="2108958" cy="369332"/>
+          </a:xfrm>
+          <a:prstGeom prst="rect">
+            <a:avLst/>
+          </a:prstGeom>
+          <a:noFill/>
+        </p:spPr>
+        <p:txBody>
+          <a:bodyPr wrap="square" rtlCol="0">
+            <a:spAutoFit/>
+          </a:bodyPr>
+          <a:lstStyle/>
+          <a:p>
+            <a:r>
+              <a:rPr lang="en-US" dirty="0" err="1" smtClean="0"/>
+              <a:t>WikipediaConsumer</a:t>
+            </a:r>
+            <a:endParaRPr lang="en-US" dirty="0"/>
+          </a:p>
+        </p:txBody>
+      </p:sp>
+      <p:sp>
+        <p:nvSpPr>
+          <p:cNvPr id="69" name="TextBox 68"/>
+          <p:cNvSpPr txBox="1"/>
+          <p:nvPr/>
+        </p:nvSpPr>
+        <p:spPr>
+          <a:xfrm>
+            <a:off x="4549061" y="1447924"/>
+            <a:ext cx="3535678" cy="369332"/>
+          </a:xfrm>
+          <a:prstGeom prst="rect">
+            <a:avLst/>
+          </a:prstGeom>
+          <a:noFill/>
+        </p:spPr>
+        <p:txBody>
+          <a:bodyPr wrap="square" rtlCol="0">
+            <a:spAutoFit/>
+          </a:bodyPr>
+          <a:lstStyle/>
+          <a:p>
+            <a:r>
+              <a:rPr lang="en-US" dirty="0" err="1" smtClean="0"/>
+              <a:t>WikipediaFeed</a:t>
+            </a:r>
+            <a:r>
+              <a:rPr lang="en-US" dirty="0" smtClean="0"/>
+              <a:t> Job</a:t>
+            </a:r>
+            <a:endParaRPr lang="en-US" dirty="0"/>
+          </a:p>
+        </p:txBody>
+      </p:sp>
+    </p:spTree>
+    <p:extLst>
+      <p:ext uri="{BB962C8B-B14F-4D97-AF65-F5344CB8AC3E}">
+        <p14:creationId xmlns:p14="http://schemas.microsoft.com/office/powerpoint/2010/main" val="544353580"/>
+      </p:ext>
+    </p:extLst>
+  </p:cSld>
+  <p:clrMapOvr>
+    <a:masterClrMapping/>
+  </p:clrMapOvr>
+</p:sld>
+</file>
+
+<file path=ppt/slides/slide11.xml><?xml version="1.0" encoding="utf-8"?>
+<p:sld xmlns:a="http://schemas.openxmlformats.org/drawingml/2006/main" xmlns:r="http://schemas.openxmlformats.org/officeDocument/2006/relationships" xmlns:p="http://schemas.openxmlformats.org/presentationml/2006/main">
+  <p:cSld>
+    <p:spTree>
+      <p:nvGrpSpPr>
+        <p:cNvPr id="1" name=""/>
+        <p:cNvGrpSpPr/>
+        <p:nvPr/>
+      </p:nvGrpSpPr>
+      <p:grpSpPr>
+        <a:xfrm>
+          <a:off x="0" y="0"/>
+          <a:ext cx="0" cy="0"/>
+          <a:chOff x="0" y="0"/>
+          <a:chExt cx="0" cy="0"/>
+        </a:xfrm>
+      </p:grpSpPr>
+      <p:sp>
+        <p:nvSpPr>
+          <p:cNvPr id="2" name="Title 1"/>
+          <p:cNvSpPr>
+            <a:spLocks noGrp="1"/>
+          </p:cNvSpPr>
+          <p:nvPr>
+            <p:ph type="title"/>
+          </p:nvPr>
+        </p:nvSpPr>
+        <p:spPr/>
+        <p:txBody>
+          <a:bodyPr/>
+          <a:lstStyle/>
+          <a:p>
+            <a:r>
+              <a:rPr lang="en-US" altLang="zh-CN" dirty="0" smtClean="0"/>
+              <a:t>Factory</a:t>
+            </a:r>
+            <a:endParaRPr lang="en-US" dirty="0"/>
+          </a:p>
+        </p:txBody>
+      </p:sp>
+      <p:sp>
+        <p:nvSpPr>
+          <p:cNvPr id="4" name="Content Placeholder 3"/>
+          <p:cNvSpPr>
+            <a:spLocks noGrp="1"/>
+          </p:cNvSpPr>
+          <p:nvPr>
+            <p:ph idx="1"/>
+          </p:nvPr>
+        </p:nvSpPr>
+        <p:spPr/>
+        <p:txBody>
+          <a:bodyPr/>
+          <a:lstStyle/>
+          <a:p>
+            <a:r>
+              <a:rPr lang="en-US" sz="2400" dirty="0" smtClean="0"/>
+              <a:t>Factory implement both consumer and producer</a:t>
+            </a:r>
+          </a:p>
+          <a:p>
+            <a:endParaRPr lang="en-US" dirty="0"/>
+          </a:p>
+          <a:p>
+            <a:endParaRPr lang="en-US" dirty="0" smtClean="0"/>
+          </a:p>
+          <a:p>
+            <a:r>
+              <a:rPr lang="en-US" sz="2400" dirty="0" smtClean="0"/>
+              <a:t>Container use Consumer to read message and pass them to </a:t>
+            </a:r>
+            <a:r>
+              <a:rPr lang="en-US" altLang="zh-CN" sz="2400" dirty="0" err="1" smtClean="0"/>
+              <a:t>StreamTask</a:t>
+            </a:r>
+            <a:endParaRPr lang="en-US" altLang="zh-CN" sz="2400" dirty="0"/>
+          </a:p>
+          <a:p>
+            <a:endParaRPr lang="en-US" sz="2400" dirty="0" smtClean="0"/>
+          </a:p>
+          <a:p>
+            <a:endParaRPr lang="en-US" sz="2400" dirty="0" smtClean="0"/>
+          </a:p>
+          <a:p>
+            <a:r>
+              <a:rPr lang="en-US" sz="2400" dirty="0" smtClean="0"/>
+              <a:t>Producer </a:t>
+            </a:r>
+            <a:r>
+              <a:rPr lang="en-US" altLang="zh-CN" sz="2400" dirty="0" smtClean="0"/>
+              <a:t>writes messages from </a:t>
+            </a:r>
+            <a:r>
+              <a:rPr lang="en-US" altLang="zh-CN" sz="2400" dirty="0" err="1" smtClean="0"/>
+              <a:t>StreamTask</a:t>
+            </a:r>
+            <a:r>
+              <a:rPr lang="en-US" altLang="zh-CN" sz="2400" dirty="0" smtClean="0"/>
+              <a:t> to outside systems</a:t>
+            </a:r>
+          </a:p>
+          <a:p>
+            <a:endParaRPr lang="en-US" sz="2400" dirty="0"/>
+          </a:p>
+        </p:txBody>
+      </p:sp>
+      <p:pic>
+        <p:nvPicPr>
+          <p:cNvPr id="5" name="Picture 4"/>
+          <p:cNvPicPr>
+            <a:picLocks noChangeAspect="1"/>
+          </p:cNvPicPr>
+          <p:nvPr/>
+        </p:nvPicPr>
+        <p:blipFill>
+          <a:blip r:embed="rId2"/>
+          <a:stretch>
+            <a:fillRect/>
+          </a:stretch>
+        </p:blipFill>
+        <p:spPr>
+          <a:xfrm>
+            <a:off x="1123406" y="2229513"/>
+            <a:ext cx="10136337" cy="1060286"/>
+          </a:xfrm>
+          <a:prstGeom prst="rect">
+            <a:avLst/>
+          </a:prstGeom>
+        </p:spPr>
+      </p:pic>
+      <p:pic>
+        <p:nvPicPr>
+          <p:cNvPr id="6" name="Picture 5"/>
+          <p:cNvPicPr>
+            <a:picLocks noChangeAspect="1"/>
+          </p:cNvPicPr>
+          <p:nvPr/>
+        </p:nvPicPr>
+        <p:blipFill>
+          <a:blip r:embed="rId3"/>
+          <a:stretch>
+            <a:fillRect/>
+          </a:stretch>
+        </p:blipFill>
+        <p:spPr>
+          <a:xfrm>
+            <a:off x="1123406" y="5091113"/>
+            <a:ext cx="7343775" cy="1085850"/>
+          </a:xfrm>
+          <a:prstGeom prst="rect">
+            <a:avLst/>
+          </a:prstGeom>
+        </p:spPr>
+      </p:pic>
+      <p:pic>
+        <p:nvPicPr>
+          <p:cNvPr id="8" name="Picture 7"/>
+          <p:cNvPicPr>
+            <a:picLocks noChangeAspect="1"/>
+          </p:cNvPicPr>
+          <p:nvPr/>
+        </p:nvPicPr>
+        <p:blipFill>
+          <a:blip r:embed="rId4"/>
+          <a:stretch>
+            <a:fillRect/>
+          </a:stretch>
+        </p:blipFill>
+        <p:spPr>
+          <a:xfrm>
+            <a:off x="1123406" y="4269490"/>
+            <a:ext cx="10075140" cy="237195"/>
+          </a:xfrm>
+          <a:prstGeom prst="rect">
+            <a:avLst/>
+          </a:prstGeom>
+        </p:spPr>
+      </p:pic>
+      <p:pic>
+        <p:nvPicPr>
+          <p:cNvPr id="9" name="Picture 8"/>
+          <p:cNvPicPr>
+            <a:picLocks noChangeAspect="1"/>
+          </p:cNvPicPr>
+          <p:nvPr/>
+        </p:nvPicPr>
+        <p:blipFill>
+          <a:blip r:embed="rId5"/>
+          <a:stretch>
+            <a:fillRect/>
+          </a:stretch>
+        </p:blipFill>
+        <p:spPr>
+          <a:xfrm>
+            <a:off x="1123406" y="3905862"/>
+            <a:ext cx="6657975" cy="219075"/>
+          </a:xfrm>
+          <a:prstGeom prst="rect">
+            <a:avLst/>
+          </a:prstGeom>
+        </p:spPr>
+      </p:pic>
+    </p:spTree>
+    <p:extLst>
+      <p:ext uri="{BB962C8B-B14F-4D97-AF65-F5344CB8AC3E}">
+        <p14:creationId xmlns:p14="http://schemas.microsoft.com/office/powerpoint/2010/main" val="3338733228"/>
+      </p:ext>
+    </p:extLst>
+  </p:cSld>
+  <p:clrMapOvr>
+    <a:masterClrMapping/>
+  </p:clrMapOvr>
+</p:sld>
+</file>
+
+<file path=ppt/slides/slide12.xml><?xml version="1.0" encoding="utf-8"?>
+<p:sld xmlns:a="http://schemas.openxmlformats.org/drawingml/2006/main" xmlns:r="http://schemas.openxmlformats.org/officeDocument/2006/relationships" xmlns:p="http://schemas.openxmlformats.org/presentationml/2006/main">
+  <p:cSld>
+    <p:spTree>
+      <p:nvGrpSpPr>
+        <p:cNvPr id="1" name=""/>
+        <p:cNvGrpSpPr/>
+        <p:nvPr/>
+      </p:nvGrpSpPr>
+      <p:grpSpPr>
+        <a:xfrm>
+          <a:off x="0" y="0"/>
+          <a:ext cx="0" cy="0"/>
+          <a:chOff x="0" y="0"/>
+          <a:chExt cx="0" cy="0"/>
+        </a:xfrm>
+      </p:grpSpPr>
+      <p:sp>
+        <p:nvSpPr>
+          <p:cNvPr id="2" name="Title 1"/>
+          <p:cNvSpPr>
+            <a:spLocks noGrp="1"/>
+          </p:cNvSpPr>
+          <p:nvPr>
+            <p:ph type="title"/>
+          </p:nvPr>
+        </p:nvSpPr>
+        <p:spPr/>
+        <p:txBody>
+          <a:bodyPr/>
+          <a:lstStyle/>
+          <a:p>
+            <a:r>
+              <a:rPr lang="en-US" dirty="0" err="1" smtClean="0"/>
+              <a:t>ProcessJob</a:t>
+            </a:r>
+            <a:endParaRPr lang="en-US" dirty="0"/>
+          </a:p>
+        </p:txBody>
+      </p:sp>
+      <p:sp>
+        <p:nvSpPr>
+          <p:cNvPr id="4" name="Rectangle 3"/>
+          <p:cNvSpPr/>
+          <p:nvPr/>
+        </p:nvSpPr>
+        <p:spPr>
+          <a:xfrm>
+            <a:off x="1318846" y="2726408"/>
+            <a:ext cx="3982916" cy="2698445"/>
+          </a:xfrm>
+          <a:prstGeom prst="rect">
+            <a:avLst/>
+          </a:prstGeom>
+        </p:spPr>
+        <p:style>
+          <a:lnRef idx="2">
+            <a:schemeClr val="accent1"/>
+          </a:lnRef>
+          <a:fillRef idx="1">
+            <a:schemeClr val="lt1"/>
+          </a:fillRef>
+          <a:effectRef idx="0">
+            <a:schemeClr val="accent1"/>
+          </a:effectRef>
+          <a:fontRef idx="minor">
+            <a:schemeClr val="dk1"/>
+          </a:fontRef>
+        </p:style>
+        <p:txBody>
+          <a:bodyPr rtlCol="0" anchor="ctr"/>
+          <a:lstStyle/>
+          <a:p>
+            <a:pPr algn="ctr"/>
+            <a:endParaRPr lang="en-US" dirty="0"/>
+          </a:p>
+        </p:txBody>
+      </p:sp>
+      <p:sp>
+        <p:nvSpPr>
+          <p:cNvPr id="7" name="TextBox 6"/>
+          <p:cNvSpPr txBox="1"/>
+          <p:nvPr/>
+        </p:nvSpPr>
+        <p:spPr>
+          <a:xfrm>
+            <a:off x="1424354" y="2848707"/>
+            <a:ext cx="2839916" cy="646331"/>
+          </a:xfrm>
+          <a:prstGeom prst="rect">
+            <a:avLst/>
+          </a:prstGeom>
+          <a:noFill/>
+        </p:spPr>
+        <p:txBody>
+          <a:bodyPr wrap="square" rtlCol="0">
+            <a:spAutoFit/>
+          </a:bodyPr>
+          <a:lstStyle/>
+          <a:p>
+            <a:r>
+              <a:rPr lang="en-US" dirty="0" err="1" smtClean="0"/>
+              <a:t>ProcessJobFactory</a:t>
+            </a:r>
+            <a:endParaRPr lang="en-US" dirty="0"/>
+          </a:p>
+          <a:p>
+            <a:endParaRPr lang="en-US" dirty="0"/>
+          </a:p>
+        </p:txBody>
+      </p:sp>
+      <p:sp>
+        <p:nvSpPr>
+          <p:cNvPr id="8" name="Rectangle 7"/>
+          <p:cNvSpPr/>
+          <p:nvPr/>
+        </p:nvSpPr>
+        <p:spPr>
+          <a:xfrm>
+            <a:off x="2690446" y="3798278"/>
+            <a:ext cx="2031023" cy="597544"/>
+          </a:xfrm>
+          <a:prstGeom prst="rect">
+            <a:avLst/>
+          </a:prstGeom>
+        </p:spPr>
+        <p:style>
+          <a:lnRef idx="2">
+            <a:schemeClr val="accent1"/>
+          </a:lnRef>
+          <a:fillRef idx="1">
+            <a:schemeClr val="lt1"/>
+          </a:fillRef>
+          <a:effectRef idx="0">
+            <a:schemeClr val="accent1"/>
+          </a:effectRef>
+          <a:fontRef idx="minor">
+            <a:schemeClr val="dk1"/>
+          </a:fontRef>
+        </p:style>
+        <p:txBody>
+          <a:bodyPr rtlCol="0" anchor="ctr"/>
+          <a:lstStyle/>
+          <a:p>
+            <a:pPr algn="ctr"/>
+            <a:endParaRPr lang="en-US"/>
+          </a:p>
+        </p:txBody>
+      </p:sp>
+      <p:sp>
+        <p:nvSpPr>
+          <p:cNvPr id="9" name="TextBox 8"/>
+          <p:cNvSpPr txBox="1"/>
+          <p:nvPr/>
+        </p:nvSpPr>
+        <p:spPr>
+          <a:xfrm>
+            <a:off x="2756389" y="3890964"/>
+            <a:ext cx="1965080" cy="369332"/>
+          </a:xfrm>
+          <a:prstGeom prst="rect">
+            <a:avLst/>
+          </a:prstGeom>
+          <a:noFill/>
+        </p:spPr>
+        <p:txBody>
+          <a:bodyPr wrap="square" rtlCol="0">
+            <a:spAutoFit/>
+          </a:bodyPr>
+          <a:lstStyle/>
+          <a:p>
+            <a:r>
+              <a:rPr lang="en-US" dirty="0" err="1" smtClean="0"/>
+              <a:t>JobModelManager</a:t>
+            </a:r>
+            <a:endParaRPr lang="en-US" dirty="0"/>
+          </a:p>
+        </p:txBody>
+      </p:sp>
+      <p:sp>
+        <p:nvSpPr>
+          <p:cNvPr id="11" name="Rectangle 10"/>
+          <p:cNvSpPr/>
+          <p:nvPr/>
+        </p:nvSpPr>
+        <p:spPr>
+          <a:xfrm>
+            <a:off x="2690445" y="4581436"/>
+            <a:ext cx="2031023" cy="597544"/>
+          </a:xfrm>
+          <a:prstGeom prst="rect">
+            <a:avLst/>
+          </a:prstGeom>
+        </p:spPr>
+        <p:style>
+          <a:lnRef idx="2">
+            <a:schemeClr val="accent1"/>
+          </a:lnRef>
+          <a:fillRef idx="1">
+            <a:schemeClr val="lt1"/>
+          </a:fillRef>
+          <a:effectRef idx="0">
+            <a:schemeClr val="accent1"/>
+          </a:effectRef>
+          <a:fontRef idx="minor">
+            <a:schemeClr val="dk1"/>
+          </a:fontRef>
+        </p:style>
+        <p:txBody>
+          <a:bodyPr rtlCol="0" anchor="ctr"/>
+          <a:lstStyle/>
+          <a:p>
+            <a:pPr algn="ctr"/>
+            <a:endParaRPr lang="en-US"/>
+          </a:p>
+        </p:txBody>
+      </p:sp>
+      <p:sp>
+        <p:nvSpPr>
+          <p:cNvPr id="12" name="TextBox 11"/>
+          <p:cNvSpPr txBox="1"/>
+          <p:nvPr/>
+        </p:nvSpPr>
+        <p:spPr>
+          <a:xfrm>
+            <a:off x="2844312" y="4611565"/>
+            <a:ext cx="1613388" cy="646331"/>
+          </a:xfrm>
+          <a:prstGeom prst="rect">
+            <a:avLst/>
+          </a:prstGeom>
+          <a:noFill/>
+        </p:spPr>
+        <p:txBody>
+          <a:bodyPr wrap="square" rtlCol="0">
+            <a:spAutoFit/>
+          </a:bodyPr>
+          <a:lstStyle/>
+          <a:p>
+            <a:r>
+              <a:rPr lang="en-US" dirty="0" err="1" smtClean="0"/>
+              <a:t>JobCoordinator</a:t>
+            </a:r>
+            <a:r>
+              <a:rPr lang="en-US" dirty="0" smtClean="0"/>
+              <a:t>???</a:t>
+            </a:r>
+            <a:endParaRPr lang="en-US" dirty="0"/>
+          </a:p>
+        </p:txBody>
+      </p:sp>
+      <p:cxnSp>
+        <p:nvCxnSpPr>
+          <p:cNvPr id="14" name="Straight Arrow Connector 13"/>
+          <p:cNvCxnSpPr>
+            <a:stCxn id="4" idx="3"/>
+          </p:cNvCxnSpPr>
+          <p:nvPr/>
+        </p:nvCxnSpPr>
+        <p:spPr>
+          <a:xfrm flipV="1">
+            <a:off x="5301762" y="4075630"/>
+            <a:ext cx="694592" cy="1"/>
+          </a:xfrm>
+          <a:prstGeom prst="straightConnector1">
+            <a:avLst/>
+          </a:prstGeom>
+          <a:ln>
+            <a:tailEnd type="triangle"/>
+          </a:ln>
+        </p:spPr>
+        <p:style>
+          <a:lnRef idx="1">
+            <a:schemeClr val="accent1"/>
+          </a:lnRef>
+          <a:fillRef idx="0">
+            <a:schemeClr val="accent1"/>
+          </a:fillRef>
+          <a:effectRef idx="0">
+            <a:schemeClr val="accent1"/>
+          </a:effectRef>
+          <a:fontRef idx="minor">
+            <a:schemeClr val="tx1"/>
+          </a:fontRef>
+        </p:style>
+      </p:cxnSp>
+      <p:sp>
+        <p:nvSpPr>
+          <p:cNvPr id="15" name="Rectangle 14"/>
+          <p:cNvSpPr/>
+          <p:nvPr/>
+        </p:nvSpPr>
+        <p:spPr>
+          <a:xfrm>
+            <a:off x="5952392" y="3015762"/>
+            <a:ext cx="2523393" cy="2022230"/>
+          </a:xfrm>
+          <a:prstGeom prst="rect">
+            <a:avLst/>
+          </a:prstGeom>
+        </p:spPr>
+        <p:style>
+          <a:lnRef idx="2">
+            <a:schemeClr val="accent1"/>
+          </a:lnRef>
+          <a:fillRef idx="1">
+            <a:schemeClr val="lt1"/>
+          </a:fillRef>
+          <a:effectRef idx="0">
+            <a:schemeClr val="accent1"/>
+          </a:effectRef>
+          <a:fontRef idx="minor">
+            <a:schemeClr val="dk1"/>
+          </a:fontRef>
+        </p:style>
+        <p:txBody>
+          <a:bodyPr rtlCol="0" anchor="ctr"/>
+          <a:lstStyle/>
+          <a:p>
+            <a:pPr algn="ctr"/>
+            <a:endParaRPr lang="en-US"/>
+          </a:p>
+        </p:txBody>
+      </p:sp>
+      <p:sp>
+        <p:nvSpPr>
+          <p:cNvPr id="16" name="TextBox 15"/>
+          <p:cNvSpPr txBox="1"/>
+          <p:nvPr/>
+        </p:nvSpPr>
+        <p:spPr>
+          <a:xfrm>
+            <a:off x="6093067" y="3171872"/>
+            <a:ext cx="1573825" cy="369332"/>
+          </a:xfrm>
+          <a:prstGeom prst="rect">
+            <a:avLst/>
+          </a:prstGeom>
+          <a:noFill/>
+        </p:spPr>
+        <p:txBody>
+          <a:bodyPr wrap="square" rtlCol="0">
+            <a:spAutoFit/>
+          </a:bodyPr>
+          <a:lstStyle/>
+          <a:p>
+            <a:r>
+              <a:rPr lang="en-US" dirty="0" err="1" smtClean="0"/>
+              <a:t>ProcessJob</a:t>
+            </a:r>
+            <a:endParaRPr lang="en-US" dirty="0"/>
+          </a:p>
+        </p:txBody>
+      </p:sp>
+    </p:spTree>
+    <p:extLst>
+      <p:ext uri="{BB962C8B-B14F-4D97-AF65-F5344CB8AC3E}">
+        <p14:creationId xmlns:p14="http://schemas.microsoft.com/office/powerpoint/2010/main" val="143873955"/>
+      </p:ext>
+    </p:extLst>
+  </p:cSld>
+  <p:clrMapOvr>
+    <a:masterClrMapping/>
+  </p:clrMapOvr>
+</p:sld>
+</file>
+
 <file path=ppt/slides/slide2.xml><?xml version="1.0" encoding="utf-8"?>
 <p:sld xmlns:a="http://schemas.openxmlformats.org/drawingml/2006/main" xmlns:r="http://schemas.openxmlformats.org/officeDocument/2006/relationships" xmlns:p="http://schemas.openxmlformats.org/presentationml/2006/main">
   <p:cSld>
@@ -6264,7 +7583,9 @@
       </p:cxnSp>
       <p:sp>
         <p:nvSpPr>
-          <p:cNvPr id="47" name="Rectangle 46"/>
+          <p:cNvPr id="47" name="Rectangle 46">
+            <a:hlinkClick r:id="rId4" action="ppaction://hlinksldjump"/>
+          </p:cNvPr>
           <p:cNvSpPr/>
           <p:nvPr/>
         </p:nvSpPr>
@@ -6300,16 +7621,17 @@
               <a:rPr lang="en-US" b="1" dirty="0" err="1" smtClean="0"/>
               <a:t>YarnJob.scala</a:t>
             </a:r>
+            <a:endParaRPr lang="en-US" b="1" dirty="0" smtClean="0"/>
+          </a:p>
+          <a:p>
+            <a:pPr algn="ctr"/>
             <a:r>
               <a:rPr lang="en-US" dirty="0" smtClean="0"/>
-              <a:t>???</a:t>
-            </a:r>
-          </a:p>
-          <a:p>
-            <a:pPr algn="ctr"/>
+              <a:t>Start </a:t>
+            </a:r>
             <a:r>
               <a:rPr lang="en-US" dirty="0" smtClean="0"/>
-              <a:t>Start Application Manager</a:t>
+              <a:t>Application Manager</a:t>
             </a:r>
             <a:endParaRPr lang="en-US" dirty="0"/>
           </a:p>
@@ -7740,105 +9062,2093 @@
             <p:ph type="title"/>
           </p:nvPr>
         </p:nvSpPr>
-        <p:spPr/>
+        <p:spPr>
+          <a:xfrm>
+            <a:off x="0" y="66186"/>
+            <a:ext cx="10515600" cy="1325563"/>
+          </a:xfrm>
+        </p:spPr>
         <p:txBody>
           <a:bodyPr/>
           <a:lstStyle/>
           <a:p>
             <a:r>
               <a:rPr lang="en-US" dirty="0" err="1" smtClean="0"/>
-              <a:t>WikipediaFeedStreamTask</a:t>
+              <a:t>YarnJob.scala</a:t>
             </a:r>
             <a:endParaRPr lang="en-US" dirty="0"/>
           </a:p>
         </p:txBody>
       </p:sp>
-      <p:pic>
-        <p:nvPicPr>
-          <p:cNvPr id="1026" name="Picture 2" descr="https://documents.lucidchart.com/documents/05f9900f-133a-45f0-a0c0-edd8205bddce/pages/0_0?a=262&amp;x=844&amp;y=628&amp;w=352&amp;h=264&amp;store=1&amp;accept=image%2F*&amp;auth=LCA%2048ef8ae93b250247bc409e26bf81c848f046bdc9-ts%3D1508378426"/>
-          <p:cNvPicPr>
-            <a:picLocks noChangeAspect="1" noChangeArrowheads="1"/>
-          </p:cNvPicPr>
-          <p:nvPr/>
-        </p:nvPicPr>
-        <p:blipFill>
-          <a:blip r:embed="rId2">
-            <a:extLst>
-              <a:ext uri="{28A0092B-C50C-407E-A947-70E740481C1C}">
-                <a14:useLocalDpi xmlns:a14="http://schemas.microsoft.com/office/drawing/2010/main" val="0"/>
-              </a:ext>
-            </a:extLst>
-          </a:blip>
-          <a:srcRect/>
-          <a:stretch>
-            <a:fillRect/>
-          </a:stretch>
-        </p:blipFill>
-        <p:spPr bwMode="auto">
-          <a:xfrm>
-            <a:off x="3235814" y="3647585"/>
-            <a:ext cx="2514600" cy="1885950"/>
+      <p:sp>
+        <p:nvSpPr>
+          <p:cNvPr id="3" name="Rectangle 2"/>
+          <p:cNvSpPr/>
+          <p:nvPr/>
+        </p:nvSpPr>
+        <p:spPr>
+          <a:xfrm>
+            <a:off x="1301262" y="996095"/>
+            <a:ext cx="2690446" cy="791308"/>
           </a:xfrm>
           <a:prstGeom prst="rect">
             <a:avLst/>
           </a:prstGeom>
-          <a:noFill/>
-          <a:extLst>
-            <a:ext uri="{909E8E84-426E-40DD-AFC4-6F175D3DCCD1}">
-              <a14:hiddenFill xmlns:a14="http://schemas.microsoft.com/office/drawing/2010/main">
-                <a:solidFill>
-                  <a:srgbClr val="FFFFFF"/>
-                </a:solidFill>
-              </a14:hiddenFill>
-            </a:ext>
-          </a:extLst>
-        </p:spPr>
-      </p:pic>
-      <p:pic>
-        <p:nvPicPr>
-          <p:cNvPr id="1030" name="Picture 6" descr="https://documents.lucidchart.com/documents/05f9900f-133a-45f0-a0c0-edd8205bddce/pages/0_0?a=278&amp;x=455&amp;y=453&amp;w=550&amp;h=154&amp;store=1&amp;accept=image%2F*&amp;auth=LCA%20d9f9c3066d1a1f90035c98ef28524cf0afd052ae-ts%3D1508378426"/>
-          <p:cNvPicPr>
-            <a:picLocks noChangeAspect="1" noChangeArrowheads="1"/>
-          </p:cNvPicPr>
-          <p:nvPr/>
-        </p:nvPicPr>
-        <p:blipFill>
-          <a:blip r:embed="rId3">
-            <a:extLst>
-              <a:ext uri="{28A0092B-C50C-407E-A947-70E740481C1C}">
-                <a14:useLocalDpi xmlns:a14="http://schemas.microsoft.com/office/drawing/2010/main" val="0"/>
-              </a:ext>
-            </a:extLst>
-          </a:blip>
-          <a:srcRect/>
-          <a:stretch>
-            <a:fillRect/>
-          </a:stretch>
-        </p:blipFill>
-        <p:spPr bwMode="auto">
-          <a:xfrm>
-            <a:off x="2327275" y="1989137"/>
-            <a:ext cx="3933825" cy="1104901"/>
-          </a:xfrm>
-          <a:prstGeom prst="rect">
-            <a:avLst/>
-          </a:prstGeom>
-          <a:noFill/>
-          <a:extLst>
-            <a:ext uri="{909E8E84-426E-40DD-AFC4-6F175D3DCCD1}">
-              <a14:hiddenFill xmlns:a14="http://schemas.microsoft.com/office/drawing/2010/main">
-                <a:solidFill>
-                  <a:srgbClr val="FFFFFF"/>
-                </a:solidFill>
-              </a14:hiddenFill>
-            </a:ext>
-          </a:extLst>
-        </p:spPr>
-      </p:pic>
+        </p:spPr>
+        <p:style>
+          <a:lnRef idx="2">
+            <a:schemeClr val="accent1"/>
+          </a:lnRef>
+          <a:fillRef idx="1">
+            <a:schemeClr val="lt1"/>
+          </a:fillRef>
+          <a:effectRef idx="0">
+            <a:schemeClr val="accent1"/>
+          </a:effectRef>
+          <a:fontRef idx="minor">
+            <a:schemeClr val="dk1"/>
+          </a:fontRef>
+        </p:style>
+        <p:txBody>
+          <a:bodyPr rtlCol="0" anchor="ctr"/>
+          <a:lstStyle/>
+          <a:p>
+            <a:pPr algn="ctr"/>
+            <a:endParaRPr lang="en-US"/>
+          </a:p>
+        </p:txBody>
+      </p:sp>
     </p:spTree>
     <p:extLst>
       <p:ext uri="{BB962C8B-B14F-4D97-AF65-F5344CB8AC3E}">
-        <p14:creationId xmlns:p14="http://schemas.microsoft.com/office/powerpoint/2010/main" val="1162340703"/>
+        <p14:creationId xmlns:p14="http://schemas.microsoft.com/office/powerpoint/2010/main" val="1226606233"/>
+      </p:ext>
+    </p:extLst>
+  </p:cSld>
+  <p:clrMapOvr>
+    <a:masterClrMapping/>
+  </p:clrMapOvr>
+</p:sld>
+</file>
+
+<file path=ppt/slides/slide8.xml><?xml version="1.0" encoding="utf-8"?>
+<p:sld xmlns:a="http://schemas.openxmlformats.org/drawingml/2006/main" xmlns:r="http://schemas.openxmlformats.org/officeDocument/2006/relationships" xmlns:p="http://schemas.openxmlformats.org/presentationml/2006/main">
+  <p:cSld>
+    <p:spTree>
+      <p:nvGrpSpPr>
+        <p:cNvPr id="1" name=""/>
+        <p:cNvGrpSpPr/>
+        <p:nvPr/>
+      </p:nvGrpSpPr>
+      <p:grpSpPr>
+        <a:xfrm>
+          <a:off x="0" y="0"/>
+          <a:ext cx="0" cy="0"/>
+          <a:chOff x="0" y="0"/>
+          <a:chExt cx="0" cy="0"/>
+        </a:xfrm>
+      </p:grpSpPr>
+      <p:sp>
+        <p:nvSpPr>
+          <p:cNvPr id="5" name="Rectangle 4"/>
+          <p:cNvSpPr/>
+          <p:nvPr/>
+        </p:nvSpPr>
+        <p:spPr>
+          <a:xfrm>
+            <a:off x="3540034" y="2508069"/>
+            <a:ext cx="4310743" cy="3213462"/>
+          </a:xfrm>
+          <a:prstGeom prst="rect">
+            <a:avLst/>
+          </a:prstGeom>
+        </p:spPr>
+        <p:style>
+          <a:lnRef idx="2">
+            <a:schemeClr val="accent1"/>
+          </a:lnRef>
+          <a:fillRef idx="1">
+            <a:schemeClr val="lt1"/>
+          </a:fillRef>
+          <a:effectRef idx="0">
+            <a:schemeClr val="accent1"/>
+          </a:effectRef>
+          <a:fontRef idx="minor">
+            <a:schemeClr val="dk1"/>
+          </a:fontRef>
+        </p:style>
+        <p:txBody>
+          <a:bodyPr rtlCol="0" anchor="ctr"/>
+          <a:lstStyle/>
+          <a:p>
+            <a:pPr algn="ctr"/>
+            <a:endParaRPr lang="en-US"/>
+          </a:p>
+        </p:txBody>
+      </p:sp>
+      <p:sp>
+        <p:nvSpPr>
+          <p:cNvPr id="2" name="Title 1"/>
+          <p:cNvSpPr>
+            <a:spLocks noGrp="1"/>
+          </p:cNvSpPr>
+          <p:nvPr>
+            <p:ph type="title"/>
+          </p:nvPr>
+        </p:nvSpPr>
+        <p:spPr/>
+        <p:txBody>
+          <a:bodyPr/>
+          <a:lstStyle/>
+          <a:p>
+            <a:r>
+              <a:rPr lang="en-US" altLang="zh-CN" dirty="0" smtClean="0"/>
+              <a:t>Task</a:t>
+            </a:r>
+            <a:endParaRPr lang="en-US" dirty="0"/>
+          </a:p>
+        </p:txBody>
+      </p:sp>
+      <p:sp>
+        <p:nvSpPr>
+          <p:cNvPr id="4" name="Rectangle 3"/>
+          <p:cNvSpPr/>
+          <p:nvPr/>
+        </p:nvSpPr>
+        <p:spPr>
+          <a:xfrm>
+            <a:off x="4180114" y="3435531"/>
+            <a:ext cx="3030582" cy="1258094"/>
+          </a:xfrm>
+          <a:prstGeom prst="rect">
+            <a:avLst/>
+          </a:prstGeom>
+        </p:spPr>
+        <p:style>
+          <a:lnRef idx="2">
+            <a:schemeClr val="accent1"/>
+          </a:lnRef>
+          <a:fillRef idx="1">
+            <a:schemeClr val="lt1"/>
+          </a:fillRef>
+          <a:effectRef idx="0">
+            <a:schemeClr val="accent1"/>
+          </a:effectRef>
+          <a:fontRef idx="minor">
+            <a:schemeClr val="dk1"/>
+          </a:fontRef>
+        </p:style>
+        <p:txBody>
+          <a:bodyPr rtlCol="0" anchor="ctr"/>
+          <a:lstStyle/>
+          <a:p>
+            <a:pPr algn="ctr"/>
+            <a:endParaRPr lang="en-US" dirty="0"/>
+          </a:p>
+        </p:txBody>
+      </p:sp>
+      <p:cxnSp>
+        <p:nvCxnSpPr>
+          <p:cNvPr id="7" name="Straight Arrow Connector 6"/>
+          <p:cNvCxnSpPr>
+            <a:endCxn id="4" idx="1"/>
+          </p:cNvCxnSpPr>
+          <p:nvPr/>
+        </p:nvCxnSpPr>
+        <p:spPr>
+          <a:xfrm>
+            <a:off x="1149531" y="4064578"/>
+            <a:ext cx="3030583" cy="0"/>
+          </a:xfrm>
+          <a:prstGeom prst="straightConnector1">
+            <a:avLst/>
+          </a:prstGeom>
+          <a:ln>
+            <a:tailEnd type="triangle"/>
+          </a:ln>
+        </p:spPr>
+        <p:style>
+          <a:lnRef idx="1">
+            <a:schemeClr val="accent1"/>
+          </a:lnRef>
+          <a:fillRef idx="0">
+            <a:schemeClr val="accent1"/>
+          </a:fillRef>
+          <a:effectRef idx="0">
+            <a:schemeClr val="accent1"/>
+          </a:effectRef>
+          <a:fontRef idx="minor">
+            <a:schemeClr val="tx1"/>
+          </a:fontRef>
+        </p:style>
+      </p:cxnSp>
+      <p:sp>
+        <p:nvSpPr>
+          <p:cNvPr id="8" name="Rectangle 7"/>
+          <p:cNvSpPr/>
+          <p:nvPr/>
+        </p:nvSpPr>
+        <p:spPr>
+          <a:xfrm>
+            <a:off x="1443445" y="3488797"/>
+            <a:ext cx="1776549" cy="496390"/>
+          </a:xfrm>
+          <a:prstGeom prst="rect">
+            <a:avLst/>
+          </a:prstGeom>
+        </p:spPr>
+        <p:style>
+          <a:lnRef idx="2">
+            <a:schemeClr val="accent1"/>
+          </a:lnRef>
+          <a:fillRef idx="1">
+            <a:schemeClr val="lt1"/>
+          </a:fillRef>
+          <a:effectRef idx="0">
+            <a:schemeClr val="accent1"/>
+          </a:effectRef>
+          <a:fontRef idx="minor">
+            <a:schemeClr val="dk1"/>
+          </a:fontRef>
+        </p:style>
+        <p:txBody>
+          <a:bodyPr rtlCol="0" anchor="ctr"/>
+          <a:lstStyle/>
+          <a:p>
+            <a:pPr algn="ctr"/>
+            <a:r>
+              <a:rPr lang="en-US" altLang="zh-CN" dirty="0" err="1" smtClean="0"/>
+              <a:t>Envolope</a:t>
+            </a:r>
+            <a:endParaRPr lang="en-US" dirty="0"/>
+          </a:p>
+        </p:txBody>
+      </p:sp>
+      <p:cxnSp>
+        <p:nvCxnSpPr>
+          <p:cNvPr id="10" name="Straight Arrow Connector 9"/>
+          <p:cNvCxnSpPr/>
+          <p:nvPr/>
+        </p:nvCxnSpPr>
+        <p:spPr>
+          <a:xfrm>
+            <a:off x="7057208" y="4064578"/>
+            <a:ext cx="2739935" cy="8643"/>
+          </a:xfrm>
+          <a:prstGeom prst="straightConnector1">
+            <a:avLst/>
+          </a:prstGeom>
+          <a:ln>
+            <a:tailEnd type="triangle"/>
+          </a:ln>
+        </p:spPr>
+        <p:style>
+          <a:lnRef idx="1">
+            <a:schemeClr val="accent1"/>
+          </a:lnRef>
+          <a:fillRef idx="0">
+            <a:schemeClr val="accent1"/>
+          </a:fillRef>
+          <a:effectRef idx="0">
+            <a:schemeClr val="accent1"/>
+          </a:effectRef>
+          <a:fontRef idx="minor">
+            <a:schemeClr val="tx1"/>
+          </a:fontRef>
+        </p:style>
+      </p:cxnSp>
+      <p:sp>
+        <p:nvSpPr>
+          <p:cNvPr id="11" name="Rectangle 10"/>
+          <p:cNvSpPr/>
+          <p:nvPr/>
+        </p:nvSpPr>
+        <p:spPr>
+          <a:xfrm>
+            <a:off x="5796640" y="3666668"/>
+            <a:ext cx="1260568" cy="795819"/>
+          </a:xfrm>
+          <a:prstGeom prst="rect">
+            <a:avLst/>
+          </a:prstGeom>
+        </p:spPr>
+        <p:style>
+          <a:lnRef idx="2">
+            <a:schemeClr val="accent1"/>
+          </a:lnRef>
+          <a:fillRef idx="1">
+            <a:schemeClr val="lt1"/>
+          </a:fillRef>
+          <a:effectRef idx="0">
+            <a:schemeClr val="accent1"/>
+          </a:effectRef>
+          <a:fontRef idx="minor">
+            <a:schemeClr val="dk1"/>
+          </a:fontRef>
+        </p:style>
+        <p:txBody>
+          <a:bodyPr rtlCol="0" anchor="ctr"/>
+          <a:lstStyle/>
+          <a:p>
+            <a:pPr algn="ctr"/>
+            <a:endParaRPr lang="en-US"/>
+          </a:p>
+        </p:txBody>
+      </p:sp>
+      <p:sp>
+        <p:nvSpPr>
+          <p:cNvPr id="12" name="TextBox 11"/>
+          <p:cNvSpPr txBox="1"/>
+          <p:nvPr/>
+        </p:nvSpPr>
+        <p:spPr>
+          <a:xfrm>
+            <a:off x="4232366" y="3853543"/>
+            <a:ext cx="1463039" cy="369332"/>
+          </a:xfrm>
+          <a:prstGeom prst="rect">
+            <a:avLst/>
+          </a:prstGeom>
+          <a:noFill/>
+        </p:spPr>
+        <p:txBody>
+          <a:bodyPr wrap="square" rtlCol="0">
+            <a:spAutoFit/>
+          </a:bodyPr>
+          <a:lstStyle/>
+          <a:p>
+            <a:r>
+              <a:rPr lang="en-US" altLang="zh-CN" dirty="0" err="1" smtClean="0"/>
+              <a:t>StreamTask</a:t>
+            </a:r>
+            <a:endParaRPr lang="en-US" dirty="0"/>
+          </a:p>
+        </p:txBody>
+      </p:sp>
+      <p:sp>
+        <p:nvSpPr>
+          <p:cNvPr id="13" name="TextBox 12"/>
+          <p:cNvSpPr txBox="1"/>
+          <p:nvPr/>
+        </p:nvSpPr>
+        <p:spPr>
+          <a:xfrm>
+            <a:off x="5901147" y="3750055"/>
+            <a:ext cx="1208314" cy="646331"/>
+          </a:xfrm>
+          <a:prstGeom prst="rect">
+            <a:avLst/>
+          </a:prstGeom>
+          <a:noFill/>
+        </p:spPr>
+        <p:txBody>
+          <a:bodyPr wrap="square" rtlCol="0">
+            <a:spAutoFit/>
+          </a:bodyPr>
+          <a:lstStyle/>
+          <a:p>
+            <a:r>
+              <a:rPr lang="en-US" dirty="0" smtClean="0"/>
+              <a:t>Output Collector</a:t>
+            </a:r>
+          </a:p>
+        </p:txBody>
+      </p:sp>
+      <p:sp>
+        <p:nvSpPr>
+          <p:cNvPr id="15" name="TextBox 14"/>
+          <p:cNvSpPr txBox="1"/>
+          <p:nvPr/>
+        </p:nvSpPr>
+        <p:spPr>
+          <a:xfrm>
+            <a:off x="4088674" y="2637682"/>
+            <a:ext cx="1606731" cy="369332"/>
+          </a:xfrm>
+          <a:prstGeom prst="rect">
+            <a:avLst/>
+          </a:prstGeom>
+          <a:noFill/>
+        </p:spPr>
+        <p:txBody>
+          <a:bodyPr wrap="square" rtlCol="0">
+            <a:spAutoFit/>
+          </a:bodyPr>
+          <a:lstStyle/>
+          <a:p>
+            <a:r>
+              <a:rPr lang="en-US" dirty="0" err="1" smtClean="0"/>
+              <a:t>SamzaJob</a:t>
+            </a:r>
+            <a:endParaRPr lang="en-US" dirty="0"/>
+          </a:p>
+        </p:txBody>
+      </p:sp>
+      <p:sp>
+        <p:nvSpPr>
+          <p:cNvPr id="16" name="Rectangle 15"/>
+          <p:cNvSpPr/>
+          <p:nvPr/>
+        </p:nvSpPr>
+        <p:spPr>
+          <a:xfrm>
+            <a:off x="7458889" y="3485816"/>
+            <a:ext cx="1776549" cy="496390"/>
+          </a:xfrm>
+          <a:prstGeom prst="rect">
+            <a:avLst/>
+          </a:prstGeom>
+        </p:spPr>
+        <p:style>
+          <a:lnRef idx="2">
+            <a:schemeClr val="accent1"/>
+          </a:lnRef>
+          <a:fillRef idx="1">
+            <a:schemeClr val="lt1"/>
+          </a:fillRef>
+          <a:effectRef idx="0">
+            <a:schemeClr val="accent1"/>
+          </a:effectRef>
+          <a:fontRef idx="minor">
+            <a:schemeClr val="dk1"/>
+          </a:fontRef>
+        </p:style>
+        <p:txBody>
+          <a:bodyPr rtlCol="0" anchor="ctr"/>
+          <a:lstStyle/>
+          <a:p>
+            <a:pPr algn="ctr"/>
+            <a:r>
+              <a:rPr lang="en-US" altLang="zh-CN" dirty="0" err="1" smtClean="0"/>
+              <a:t>Envolope</a:t>
+            </a:r>
+            <a:endParaRPr lang="en-US" dirty="0"/>
+          </a:p>
+        </p:txBody>
+      </p:sp>
+    </p:spTree>
+    <p:extLst>
+      <p:ext uri="{BB962C8B-B14F-4D97-AF65-F5344CB8AC3E}">
+        <p14:creationId xmlns:p14="http://schemas.microsoft.com/office/powerpoint/2010/main" val="2715910777"/>
+      </p:ext>
+    </p:extLst>
+  </p:cSld>
+  <p:clrMapOvr>
+    <a:masterClrMapping/>
+  </p:clrMapOvr>
+</p:sld>
+</file>
+
+<file path=ppt/slides/slide9.xml><?xml version="1.0" encoding="utf-8"?>
+<p:sld xmlns:a="http://schemas.openxmlformats.org/drawingml/2006/main" xmlns:r="http://schemas.openxmlformats.org/officeDocument/2006/relationships" xmlns:p="http://schemas.openxmlformats.org/presentationml/2006/main">
+  <p:cSld>
+    <p:spTree>
+      <p:nvGrpSpPr>
+        <p:cNvPr id="1" name=""/>
+        <p:cNvGrpSpPr/>
+        <p:nvPr/>
+      </p:nvGrpSpPr>
+      <p:grpSpPr>
+        <a:xfrm>
+          <a:off x="0" y="0"/>
+          <a:ext cx="0" cy="0"/>
+          <a:chOff x="0" y="0"/>
+          <a:chExt cx="0" cy="0"/>
+        </a:xfrm>
+      </p:grpSpPr>
+      <p:sp>
+        <p:nvSpPr>
+          <p:cNvPr id="2" name="Title 1"/>
+          <p:cNvSpPr>
+            <a:spLocks noGrp="1"/>
+          </p:cNvSpPr>
+          <p:nvPr>
+            <p:ph type="title"/>
+          </p:nvPr>
+        </p:nvSpPr>
+        <p:spPr/>
+        <p:txBody>
+          <a:bodyPr/>
+          <a:lstStyle/>
+          <a:p>
+            <a:r>
+              <a:rPr lang="en-US" dirty="0" smtClean="0"/>
+              <a:t>Submit a task</a:t>
+            </a:r>
+            <a:endParaRPr lang="en-US" dirty="0"/>
+          </a:p>
+        </p:txBody>
+      </p:sp>
+      <p:sp>
+        <p:nvSpPr>
+          <p:cNvPr id="4" name="Rectangle 3"/>
+          <p:cNvSpPr/>
+          <p:nvPr/>
+        </p:nvSpPr>
+        <p:spPr>
+          <a:xfrm>
+            <a:off x="838200" y="1690687"/>
+            <a:ext cx="7313023" cy="4566421"/>
+          </a:xfrm>
+          <a:prstGeom prst="rect">
+            <a:avLst/>
+          </a:prstGeom>
+        </p:spPr>
+        <p:style>
+          <a:lnRef idx="2">
+            <a:schemeClr val="accent1"/>
+          </a:lnRef>
+          <a:fillRef idx="1">
+            <a:schemeClr val="lt1"/>
+          </a:fillRef>
+          <a:effectRef idx="0">
+            <a:schemeClr val="accent1"/>
+          </a:effectRef>
+          <a:fontRef idx="minor">
+            <a:schemeClr val="dk1"/>
+          </a:fontRef>
+        </p:style>
+        <p:txBody>
+          <a:bodyPr rtlCol="0" anchor="ctr"/>
+          <a:lstStyle/>
+          <a:p>
+            <a:pPr algn="ctr"/>
+            <a:endParaRPr lang="en-US" dirty="0"/>
+          </a:p>
+        </p:txBody>
+      </p:sp>
+      <p:sp>
+        <p:nvSpPr>
+          <p:cNvPr id="7" name="Rectangle 6"/>
+          <p:cNvSpPr/>
+          <p:nvPr/>
+        </p:nvSpPr>
+        <p:spPr>
+          <a:xfrm>
+            <a:off x="1195251" y="2325190"/>
+            <a:ext cx="1946365" cy="548640"/>
+          </a:xfrm>
+          <a:prstGeom prst="rect">
+            <a:avLst/>
+          </a:prstGeom>
+        </p:spPr>
+        <p:style>
+          <a:lnRef idx="2">
+            <a:schemeClr val="accent1"/>
+          </a:lnRef>
+          <a:fillRef idx="1">
+            <a:schemeClr val="lt1"/>
+          </a:fillRef>
+          <a:effectRef idx="0">
+            <a:schemeClr val="accent1"/>
+          </a:effectRef>
+          <a:fontRef idx="minor">
+            <a:schemeClr val="dk1"/>
+          </a:fontRef>
+        </p:style>
+        <p:txBody>
+          <a:bodyPr rtlCol="0" anchor="ctr"/>
+          <a:lstStyle/>
+          <a:p>
+            <a:pPr algn="ctr"/>
+            <a:endParaRPr lang="en-US"/>
+          </a:p>
+        </p:txBody>
+      </p:sp>
+      <p:sp>
+        <p:nvSpPr>
+          <p:cNvPr id="8" name="TextBox 7"/>
+          <p:cNvSpPr txBox="1"/>
+          <p:nvPr/>
+        </p:nvSpPr>
+        <p:spPr>
+          <a:xfrm>
+            <a:off x="3282042" y="1775226"/>
+            <a:ext cx="2661558" cy="461665"/>
+          </a:xfrm>
+          <a:prstGeom prst="rect">
+            <a:avLst/>
+          </a:prstGeom>
+          <a:noFill/>
+        </p:spPr>
+        <p:txBody>
+          <a:bodyPr wrap="square" rtlCol="0">
+            <a:spAutoFit/>
+          </a:bodyPr>
+          <a:lstStyle/>
+          <a:p>
+            <a:r>
+              <a:rPr lang="en-US" sz="2400" dirty="0" smtClean="0"/>
+              <a:t>Job Properties File</a:t>
+            </a:r>
+            <a:endParaRPr lang="en-US" sz="2400" dirty="0"/>
+          </a:p>
+        </p:txBody>
+      </p:sp>
+      <p:sp>
+        <p:nvSpPr>
+          <p:cNvPr id="9" name="TextBox 8"/>
+          <p:cNvSpPr txBox="1"/>
+          <p:nvPr/>
+        </p:nvSpPr>
+        <p:spPr>
+          <a:xfrm>
+            <a:off x="1280160" y="2401780"/>
+            <a:ext cx="1776548" cy="369332"/>
+          </a:xfrm>
+          <a:prstGeom prst="rect">
+            <a:avLst/>
+          </a:prstGeom>
+          <a:noFill/>
+        </p:spPr>
+        <p:txBody>
+          <a:bodyPr wrap="square" rtlCol="0">
+            <a:spAutoFit/>
+          </a:bodyPr>
+          <a:lstStyle/>
+          <a:p>
+            <a:r>
+              <a:rPr lang="en-US" dirty="0" smtClean="0"/>
+              <a:t>Job factory class</a:t>
+            </a:r>
+            <a:endParaRPr lang="en-US" dirty="0"/>
+          </a:p>
+        </p:txBody>
+      </p:sp>
+      <p:sp>
+        <p:nvSpPr>
+          <p:cNvPr id="10" name="Rectangle 9"/>
+          <p:cNvSpPr/>
+          <p:nvPr/>
+        </p:nvSpPr>
+        <p:spPr>
+          <a:xfrm>
+            <a:off x="3458392" y="2321429"/>
+            <a:ext cx="1946365" cy="548640"/>
+          </a:xfrm>
+          <a:prstGeom prst="rect">
+            <a:avLst/>
+          </a:prstGeom>
+        </p:spPr>
+        <p:style>
+          <a:lnRef idx="2">
+            <a:schemeClr val="accent1"/>
+          </a:lnRef>
+          <a:fillRef idx="1">
+            <a:schemeClr val="lt1"/>
+          </a:fillRef>
+          <a:effectRef idx="0">
+            <a:schemeClr val="accent1"/>
+          </a:effectRef>
+          <a:fontRef idx="minor">
+            <a:schemeClr val="dk1"/>
+          </a:fontRef>
+        </p:style>
+        <p:txBody>
+          <a:bodyPr rtlCol="0" anchor="ctr"/>
+          <a:lstStyle/>
+          <a:p>
+            <a:pPr algn="ctr"/>
+            <a:r>
+              <a:rPr lang="en-US" dirty="0" smtClean="0"/>
+              <a:t>Job name</a:t>
+            </a:r>
+            <a:endParaRPr lang="en-US" dirty="0"/>
+          </a:p>
+        </p:txBody>
+      </p:sp>
+      <p:sp>
+        <p:nvSpPr>
+          <p:cNvPr id="12" name="Rectangle 11"/>
+          <p:cNvSpPr/>
+          <p:nvPr/>
+        </p:nvSpPr>
+        <p:spPr>
+          <a:xfrm>
+            <a:off x="5721533" y="2321429"/>
+            <a:ext cx="1946365" cy="548640"/>
+          </a:xfrm>
+          <a:prstGeom prst="rect">
+            <a:avLst/>
+          </a:prstGeom>
+        </p:spPr>
+        <p:style>
+          <a:lnRef idx="2">
+            <a:schemeClr val="accent1"/>
+          </a:lnRef>
+          <a:fillRef idx="1">
+            <a:schemeClr val="lt1"/>
+          </a:fillRef>
+          <a:effectRef idx="0">
+            <a:schemeClr val="accent1"/>
+          </a:effectRef>
+          <a:fontRef idx="minor">
+            <a:schemeClr val="dk1"/>
+          </a:fontRef>
+        </p:style>
+        <p:txBody>
+          <a:bodyPr rtlCol="0" anchor="ctr"/>
+          <a:lstStyle/>
+          <a:p>
+            <a:pPr algn="ctr"/>
+            <a:endParaRPr lang="en-US"/>
+          </a:p>
+        </p:txBody>
+      </p:sp>
+      <p:sp>
+        <p:nvSpPr>
+          <p:cNvPr id="13" name="TextBox 12"/>
+          <p:cNvSpPr txBox="1"/>
+          <p:nvPr/>
+        </p:nvSpPr>
+        <p:spPr>
+          <a:xfrm>
+            <a:off x="5806442" y="2398019"/>
+            <a:ext cx="1776548" cy="369332"/>
+          </a:xfrm>
+          <a:prstGeom prst="rect">
+            <a:avLst/>
+          </a:prstGeom>
+          <a:noFill/>
+        </p:spPr>
+        <p:txBody>
+          <a:bodyPr wrap="square" rtlCol="0">
+            <a:spAutoFit/>
+          </a:bodyPr>
+          <a:lstStyle/>
+          <a:p>
+            <a:r>
+              <a:rPr lang="en-US" dirty="0" smtClean="0"/>
+              <a:t>package path</a:t>
+            </a:r>
+            <a:endParaRPr lang="en-US" dirty="0"/>
+          </a:p>
+        </p:txBody>
+      </p:sp>
+      <p:sp>
+        <p:nvSpPr>
+          <p:cNvPr id="15" name="Rectangle 14"/>
+          <p:cNvSpPr/>
+          <p:nvPr/>
+        </p:nvSpPr>
+        <p:spPr>
+          <a:xfrm>
+            <a:off x="1195251" y="3234012"/>
+            <a:ext cx="1946365" cy="548640"/>
+          </a:xfrm>
+          <a:prstGeom prst="rect">
+            <a:avLst/>
+          </a:prstGeom>
+        </p:spPr>
+        <p:style>
+          <a:lnRef idx="2">
+            <a:schemeClr val="accent1"/>
+          </a:lnRef>
+          <a:fillRef idx="1">
+            <a:schemeClr val="lt1"/>
+          </a:fillRef>
+          <a:effectRef idx="0">
+            <a:schemeClr val="accent1"/>
+          </a:effectRef>
+          <a:fontRef idx="minor">
+            <a:schemeClr val="dk1"/>
+          </a:fontRef>
+        </p:style>
+        <p:txBody>
+          <a:bodyPr rtlCol="0" anchor="ctr"/>
+          <a:lstStyle/>
+          <a:p>
+            <a:pPr algn="ctr"/>
+            <a:endParaRPr lang="en-US"/>
+          </a:p>
+        </p:txBody>
+      </p:sp>
+      <p:sp>
+        <p:nvSpPr>
+          <p:cNvPr id="16" name="TextBox 15"/>
+          <p:cNvSpPr txBox="1"/>
+          <p:nvPr/>
+        </p:nvSpPr>
+        <p:spPr>
+          <a:xfrm>
+            <a:off x="1365068" y="3323666"/>
+            <a:ext cx="1776548" cy="369332"/>
+          </a:xfrm>
+          <a:prstGeom prst="rect">
+            <a:avLst/>
+          </a:prstGeom>
+          <a:noFill/>
+        </p:spPr>
+        <p:txBody>
+          <a:bodyPr wrap="square" rtlCol="0">
+            <a:spAutoFit/>
+          </a:bodyPr>
+          <a:lstStyle/>
+          <a:p>
+            <a:r>
+              <a:rPr lang="en-US" dirty="0" smtClean="0"/>
+              <a:t>Task class</a:t>
+            </a:r>
+            <a:endParaRPr lang="en-US" dirty="0"/>
+          </a:p>
+        </p:txBody>
+      </p:sp>
+      <p:sp>
+        <p:nvSpPr>
+          <p:cNvPr id="17" name="Right Arrow 16"/>
+          <p:cNvSpPr/>
+          <p:nvPr/>
+        </p:nvSpPr>
+        <p:spPr>
+          <a:xfrm>
+            <a:off x="8151223" y="3508332"/>
+            <a:ext cx="1123406" cy="237970"/>
+          </a:xfrm>
+          <a:prstGeom prst="rightArrow">
+            <a:avLst/>
+          </a:prstGeom>
+        </p:spPr>
+        <p:style>
+          <a:lnRef idx="2">
+            <a:schemeClr val="accent1"/>
+          </a:lnRef>
+          <a:fillRef idx="1">
+            <a:schemeClr val="lt1"/>
+          </a:fillRef>
+          <a:effectRef idx="0">
+            <a:schemeClr val="accent1"/>
+          </a:effectRef>
+          <a:fontRef idx="minor">
+            <a:schemeClr val="dk1"/>
+          </a:fontRef>
+        </p:style>
+        <p:txBody>
+          <a:bodyPr rtlCol="0" anchor="ctr"/>
+          <a:lstStyle/>
+          <a:p>
+            <a:pPr algn="ctr"/>
+            <a:endParaRPr lang="en-US"/>
+          </a:p>
+        </p:txBody>
+      </p:sp>
+      <p:sp>
+        <p:nvSpPr>
+          <p:cNvPr id="18" name="Rectangle 17"/>
+          <p:cNvSpPr/>
+          <p:nvPr/>
+        </p:nvSpPr>
+        <p:spPr>
+          <a:xfrm>
+            <a:off x="9274629" y="2582685"/>
+            <a:ext cx="2325188" cy="2106881"/>
+          </a:xfrm>
+          <a:prstGeom prst="rect">
+            <a:avLst/>
+          </a:prstGeom>
+        </p:spPr>
+        <p:style>
+          <a:lnRef idx="2">
+            <a:schemeClr val="accent1"/>
+          </a:lnRef>
+          <a:fillRef idx="1">
+            <a:schemeClr val="lt1"/>
+          </a:fillRef>
+          <a:effectRef idx="0">
+            <a:schemeClr val="accent1"/>
+          </a:effectRef>
+          <a:fontRef idx="minor">
+            <a:schemeClr val="dk1"/>
+          </a:fontRef>
+        </p:style>
+        <p:txBody>
+          <a:bodyPr rtlCol="0" anchor="ctr"/>
+          <a:lstStyle/>
+          <a:p>
+            <a:pPr algn="ctr"/>
+            <a:r>
+              <a:rPr lang="en-US" dirty="0" err="1" smtClean="0"/>
+              <a:t>PropertyConfigFactory</a:t>
+            </a:r>
+            <a:endParaRPr lang="en-US" dirty="0"/>
+          </a:p>
+        </p:txBody>
+      </p:sp>
+      <p:sp>
+        <p:nvSpPr>
+          <p:cNvPr id="19" name="Rectangle 18"/>
+          <p:cNvSpPr/>
+          <p:nvPr/>
+        </p:nvSpPr>
+        <p:spPr>
+          <a:xfrm>
+            <a:off x="3458392" y="3234012"/>
+            <a:ext cx="1946365" cy="548640"/>
+          </a:xfrm>
+          <a:prstGeom prst="rect">
+            <a:avLst/>
+          </a:prstGeom>
+        </p:spPr>
+        <p:style>
+          <a:lnRef idx="2">
+            <a:schemeClr val="accent1"/>
+          </a:lnRef>
+          <a:fillRef idx="1">
+            <a:schemeClr val="lt1"/>
+          </a:fillRef>
+          <a:effectRef idx="0">
+            <a:schemeClr val="accent1"/>
+          </a:effectRef>
+          <a:fontRef idx="minor">
+            <a:schemeClr val="dk1"/>
+          </a:fontRef>
+        </p:style>
+        <p:txBody>
+          <a:bodyPr rtlCol="0" anchor="ctr"/>
+          <a:lstStyle/>
+          <a:p>
+            <a:pPr algn="ctr"/>
+            <a:endParaRPr lang="en-US"/>
+          </a:p>
+        </p:txBody>
+      </p:sp>
+      <p:sp>
+        <p:nvSpPr>
+          <p:cNvPr id="20" name="TextBox 19"/>
+          <p:cNvSpPr txBox="1"/>
+          <p:nvPr/>
+        </p:nvSpPr>
+        <p:spPr>
+          <a:xfrm>
+            <a:off x="3628209" y="3323666"/>
+            <a:ext cx="1776548" cy="369332"/>
+          </a:xfrm>
+          <a:prstGeom prst="rect">
+            <a:avLst/>
+          </a:prstGeom>
+          <a:noFill/>
+        </p:spPr>
+        <p:txBody>
+          <a:bodyPr wrap="square" rtlCol="0">
+            <a:spAutoFit/>
+          </a:bodyPr>
+          <a:lstStyle/>
+          <a:p>
+            <a:r>
+              <a:rPr lang="en-US" dirty="0" smtClean="0"/>
+              <a:t>Task inputs</a:t>
+            </a:r>
+            <a:endParaRPr lang="en-US" dirty="0"/>
+          </a:p>
+        </p:txBody>
+      </p:sp>
+      <p:sp>
+        <p:nvSpPr>
+          <p:cNvPr id="21" name="Rectangle 20"/>
+          <p:cNvSpPr/>
+          <p:nvPr/>
+        </p:nvSpPr>
+        <p:spPr>
+          <a:xfrm>
+            <a:off x="5721533" y="3234012"/>
+            <a:ext cx="1946365" cy="548640"/>
+          </a:xfrm>
+          <a:prstGeom prst="rect">
+            <a:avLst/>
+          </a:prstGeom>
+        </p:spPr>
+        <p:style>
+          <a:lnRef idx="2">
+            <a:schemeClr val="accent1"/>
+          </a:lnRef>
+          <a:fillRef idx="1">
+            <a:schemeClr val="lt1"/>
+          </a:fillRef>
+          <a:effectRef idx="0">
+            <a:schemeClr val="accent1"/>
+          </a:effectRef>
+          <a:fontRef idx="minor">
+            <a:schemeClr val="dk1"/>
+          </a:fontRef>
+        </p:style>
+        <p:txBody>
+          <a:bodyPr rot="0" spcFirstLastPara="0" vert="horz" wrap="square" lIns="91440" tIns="45720" rIns="91440" bIns="45720" numCol="1" spcCol="0" rtlCol="0" fromWordArt="0" anchor="ctr" anchorCtr="0" forceAA="0" compatLnSpc="1">
+            <a:prstTxWarp prst="textNoShape">
+              <a:avLst/>
+            </a:prstTxWarp>
+            <a:noAutofit/>
+          </a:bodyPr>
+          <a:lstStyle>
+            <a:defPPr>
+              <a:defRPr lang="en-US"/>
+            </a:defPPr>
+            <a:lvl1pPr marL="0" algn="l" defTabSz="914400" rtl="0" eaLnBrk="1" latinLnBrk="0" hangingPunct="1">
+              <a:defRPr sz="1800" kern="1200">
+                <a:solidFill>
+                  <a:schemeClr val="dk1"/>
+                </a:solidFill>
+                <a:latin typeface="+mn-lt"/>
+                <a:ea typeface="+mn-ea"/>
+                <a:cs typeface="+mn-cs"/>
+              </a:defRPr>
+            </a:lvl1pPr>
+            <a:lvl2pPr marL="457200" algn="l" defTabSz="914400" rtl="0" eaLnBrk="1" latinLnBrk="0" hangingPunct="1">
+              <a:defRPr sz="1800" kern="1200">
+                <a:solidFill>
+                  <a:schemeClr val="dk1"/>
+                </a:solidFill>
+                <a:latin typeface="+mn-lt"/>
+                <a:ea typeface="+mn-ea"/>
+                <a:cs typeface="+mn-cs"/>
+              </a:defRPr>
+            </a:lvl2pPr>
+            <a:lvl3pPr marL="914400" algn="l" defTabSz="914400" rtl="0" eaLnBrk="1" latinLnBrk="0" hangingPunct="1">
+              <a:defRPr sz="1800" kern="1200">
+                <a:solidFill>
+                  <a:schemeClr val="dk1"/>
+                </a:solidFill>
+                <a:latin typeface="+mn-lt"/>
+                <a:ea typeface="+mn-ea"/>
+                <a:cs typeface="+mn-cs"/>
+              </a:defRPr>
+            </a:lvl3pPr>
+            <a:lvl4pPr marL="1371600" algn="l" defTabSz="914400" rtl="0" eaLnBrk="1" latinLnBrk="0" hangingPunct="1">
+              <a:defRPr sz="1800" kern="1200">
+                <a:solidFill>
+                  <a:schemeClr val="dk1"/>
+                </a:solidFill>
+                <a:latin typeface="+mn-lt"/>
+                <a:ea typeface="+mn-ea"/>
+                <a:cs typeface="+mn-cs"/>
+              </a:defRPr>
+            </a:lvl4pPr>
+            <a:lvl5pPr marL="1828800" algn="l" defTabSz="914400" rtl="0" eaLnBrk="1" latinLnBrk="0" hangingPunct="1">
+              <a:defRPr sz="1800" kern="1200">
+                <a:solidFill>
+                  <a:schemeClr val="dk1"/>
+                </a:solidFill>
+                <a:latin typeface="+mn-lt"/>
+                <a:ea typeface="+mn-ea"/>
+                <a:cs typeface="+mn-cs"/>
+              </a:defRPr>
+            </a:lvl5pPr>
+            <a:lvl6pPr marL="2286000" algn="l" defTabSz="914400" rtl="0" eaLnBrk="1" latinLnBrk="0" hangingPunct="1">
+              <a:defRPr sz="1800" kern="1200">
+                <a:solidFill>
+                  <a:schemeClr val="dk1"/>
+                </a:solidFill>
+                <a:latin typeface="+mn-lt"/>
+                <a:ea typeface="+mn-ea"/>
+                <a:cs typeface="+mn-cs"/>
+              </a:defRPr>
+            </a:lvl6pPr>
+            <a:lvl7pPr marL="2743200" algn="l" defTabSz="914400" rtl="0" eaLnBrk="1" latinLnBrk="0" hangingPunct="1">
+              <a:defRPr sz="1800" kern="1200">
+                <a:solidFill>
+                  <a:schemeClr val="dk1"/>
+                </a:solidFill>
+                <a:latin typeface="+mn-lt"/>
+                <a:ea typeface="+mn-ea"/>
+                <a:cs typeface="+mn-cs"/>
+              </a:defRPr>
+            </a:lvl7pPr>
+            <a:lvl8pPr marL="3200400" algn="l" defTabSz="914400" rtl="0" eaLnBrk="1" latinLnBrk="0" hangingPunct="1">
+              <a:defRPr sz="1800" kern="1200">
+                <a:solidFill>
+                  <a:schemeClr val="dk1"/>
+                </a:solidFill>
+                <a:latin typeface="+mn-lt"/>
+                <a:ea typeface="+mn-ea"/>
+                <a:cs typeface="+mn-cs"/>
+              </a:defRPr>
+            </a:lvl8pPr>
+            <a:lvl9pPr marL="3657600" algn="l" defTabSz="914400" rtl="0" eaLnBrk="1" latinLnBrk="0" hangingPunct="1">
+              <a:defRPr sz="1800" kern="1200">
+                <a:solidFill>
+                  <a:schemeClr val="dk1"/>
+                </a:solidFill>
+                <a:latin typeface="+mn-lt"/>
+                <a:ea typeface="+mn-ea"/>
+                <a:cs typeface="+mn-cs"/>
+              </a:defRPr>
+            </a:lvl9pPr>
+          </a:lstStyle>
+          <a:p>
+            <a:pPr algn="ctr"/>
+            <a:endParaRPr lang="en-US"/>
+          </a:p>
+        </p:txBody>
+      </p:sp>
+      <p:sp>
+        <p:nvSpPr>
+          <p:cNvPr id="22" name="TextBox 15"/>
+          <p:cNvSpPr txBox="1"/>
+          <p:nvPr/>
+        </p:nvSpPr>
+        <p:spPr>
+          <a:xfrm>
+            <a:off x="5891350" y="3323666"/>
+            <a:ext cx="1776548" cy="369332"/>
+          </a:xfrm>
+          <a:prstGeom prst="rect">
+            <a:avLst/>
+          </a:prstGeom>
+          <a:noFill/>
+        </p:spPr>
+        <p:txBody>
+          <a:bodyPr wrap="square" rtlCol="0">
+            <a:spAutoFit/>
+          </a:bodyPr>
+          <a:lstStyle>
+            <a:defPPr>
+              <a:defRPr lang="en-US"/>
+            </a:defPPr>
+            <a:lvl1pPr marL="0" algn="l" defTabSz="914400" rtl="0" eaLnBrk="1" latinLnBrk="0" hangingPunct="1">
+              <a:defRPr sz="1800" kern="1200">
+                <a:solidFill>
+                  <a:schemeClr val="tx1"/>
+                </a:solidFill>
+                <a:latin typeface="+mn-lt"/>
+                <a:ea typeface="+mn-ea"/>
+                <a:cs typeface="+mn-cs"/>
+              </a:defRPr>
+            </a:lvl1pPr>
+            <a:lvl2pPr marL="457200" algn="l" defTabSz="914400" rtl="0" eaLnBrk="1" latinLnBrk="0" hangingPunct="1">
+              <a:defRPr sz="1800" kern="1200">
+                <a:solidFill>
+                  <a:schemeClr val="tx1"/>
+                </a:solidFill>
+                <a:latin typeface="+mn-lt"/>
+                <a:ea typeface="+mn-ea"/>
+                <a:cs typeface="+mn-cs"/>
+              </a:defRPr>
+            </a:lvl2pPr>
+            <a:lvl3pPr marL="914400" algn="l" defTabSz="914400" rtl="0" eaLnBrk="1" latinLnBrk="0" hangingPunct="1">
+              <a:defRPr sz="1800" kern="1200">
+                <a:solidFill>
+                  <a:schemeClr val="tx1"/>
+                </a:solidFill>
+                <a:latin typeface="+mn-lt"/>
+                <a:ea typeface="+mn-ea"/>
+                <a:cs typeface="+mn-cs"/>
+              </a:defRPr>
+            </a:lvl3pPr>
+            <a:lvl4pPr marL="1371600" algn="l" defTabSz="914400" rtl="0" eaLnBrk="1" latinLnBrk="0" hangingPunct="1">
+              <a:defRPr sz="1800" kern="1200">
+                <a:solidFill>
+                  <a:schemeClr val="tx1"/>
+                </a:solidFill>
+                <a:latin typeface="+mn-lt"/>
+                <a:ea typeface="+mn-ea"/>
+                <a:cs typeface="+mn-cs"/>
+              </a:defRPr>
+            </a:lvl4pPr>
+            <a:lvl5pPr marL="1828800" algn="l" defTabSz="914400" rtl="0" eaLnBrk="1" latinLnBrk="0" hangingPunct="1">
+              <a:defRPr sz="1800" kern="1200">
+                <a:solidFill>
+                  <a:schemeClr val="tx1"/>
+                </a:solidFill>
+                <a:latin typeface="+mn-lt"/>
+                <a:ea typeface="+mn-ea"/>
+                <a:cs typeface="+mn-cs"/>
+              </a:defRPr>
+            </a:lvl5pPr>
+            <a:lvl6pPr marL="2286000" algn="l" defTabSz="914400" rtl="0" eaLnBrk="1" latinLnBrk="0" hangingPunct="1">
+              <a:defRPr sz="1800" kern="1200">
+                <a:solidFill>
+                  <a:schemeClr val="tx1"/>
+                </a:solidFill>
+                <a:latin typeface="+mn-lt"/>
+                <a:ea typeface="+mn-ea"/>
+                <a:cs typeface="+mn-cs"/>
+              </a:defRPr>
+            </a:lvl6pPr>
+            <a:lvl7pPr marL="2743200" algn="l" defTabSz="914400" rtl="0" eaLnBrk="1" latinLnBrk="0" hangingPunct="1">
+              <a:defRPr sz="1800" kern="1200">
+                <a:solidFill>
+                  <a:schemeClr val="tx1"/>
+                </a:solidFill>
+                <a:latin typeface="+mn-lt"/>
+                <a:ea typeface="+mn-ea"/>
+                <a:cs typeface="+mn-cs"/>
+              </a:defRPr>
+            </a:lvl7pPr>
+            <a:lvl8pPr marL="3200400" algn="l" defTabSz="914400" rtl="0" eaLnBrk="1" latinLnBrk="0" hangingPunct="1">
+              <a:defRPr sz="1800" kern="1200">
+                <a:solidFill>
+                  <a:schemeClr val="tx1"/>
+                </a:solidFill>
+                <a:latin typeface="+mn-lt"/>
+                <a:ea typeface="+mn-ea"/>
+                <a:cs typeface="+mn-cs"/>
+              </a:defRPr>
+            </a:lvl8pPr>
+            <a:lvl9pPr marL="3657600" algn="l" defTabSz="914400" rtl="0" eaLnBrk="1" latinLnBrk="0" hangingPunct="1">
+              <a:defRPr sz="1800" kern="1200">
+                <a:solidFill>
+                  <a:schemeClr val="tx1"/>
+                </a:solidFill>
+                <a:latin typeface="+mn-lt"/>
+                <a:ea typeface="+mn-ea"/>
+                <a:cs typeface="+mn-cs"/>
+              </a:defRPr>
+            </a:lvl9pPr>
+          </a:lstStyle>
+          <a:p>
+            <a:r>
+              <a:rPr lang="en-US" dirty="0" err="1" smtClean="0"/>
+              <a:t>Serializers</a:t>
+            </a:r>
+            <a:endParaRPr lang="en-US" dirty="0"/>
+          </a:p>
+        </p:txBody>
+      </p:sp>
+      <p:sp>
+        <p:nvSpPr>
+          <p:cNvPr id="23" name="Rectangle 22"/>
+          <p:cNvSpPr/>
+          <p:nvPr/>
+        </p:nvSpPr>
+        <p:spPr>
+          <a:xfrm>
+            <a:off x="1195251" y="4151140"/>
+            <a:ext cx="1946365" cy="548640"/>
+          </a:xfrm>
+          <a:prstGeom prst="rect">
+            <a:avLst/>
+          </a:prstGeom>
+        </p:spPr>
+        <p:style>
+          <a:lnRef idx="2">
+            <a:schemeClr val="accent1"/>
+          </a:lnRef>
+          <a:fillRef idx="1">
+            <a:schemeClr val="lt1"/>
+          </a:fillRef>
+          <a:effectRef idx="0">
+            <a:schemeClr val="accent1"/>
+          </a:effectRef>
+          <a:fontRef idx="minor">
+            <a:schemeClr val="dk1"/>
+          </a:fontRef>
+        </p:style>
+        <p:txBody>
+          <a:bodyPr rot="0" spcFirstLastPara="0" vert="horz" wrap="square" lIns="91440" tIns="45720" rIns="91440" bIns="45720" numCol="1" spcCol="0" rtlCol="0" fromWordArt="0" anchor="ctr" anchorCtr="0" forceAA="0" compatLnSpc="1">
+            <a:prstTxWarp prst="textNoShape">
+              <a:avLst/>
+            </a:prstTxWarp>
+            <a:noAutofit/>
+          </a:bodyPr>
+          <a:lstStyle>
+            <a:defPPr>
+              <a:defRPr lang="en-US"/>
+            </a:defPPr>
+            <a:lvl1pPr marL="0" algn="l" defTabSz="914400" rtl="0" eaLnBrk="1" latinLnBrk="0" hangingPunct="1">
+              <a:defRPr sz="1800" kern="1200">
+                <a:solidFill>
+                  <a:schemeClr val="dk1"/>
+                </a:solidFill>
+                <a:latin typeface="+mn-lt"/>
+                <a:ea typeface="+mn-ea"/>
+                <a:cs typeface="+mn-cs"/>
+              </a:defRPr>
+            </a:lvl1pPr>
+            <a:lvl2pPr marL="457200" algn="l" defTabSz="914400" rtl="0" eaLnBrk="1" latinLnBrk="0" hangingPunct="1">
+              <a:defRPr sz="1800" kern="1200">
+                <a:solidFill>
+                  <a:schemeClr val="dk1"/>
+                </a:solidFill>
+                <a:latin typeface="+mn-lt"/>
+                <a:ea typeface="+mn-ea"/>
+                <a:cs typeface="+mn-cs"/>
+              </a:defRPr>
+            </a:lvl2pPr>
+            <a:lvl3pPr marL="914400" algn="l" defTabSz="914400" rtl="0" eaLnBrk="1" latinLnBrk="0" hangingPunct="1">
+              <a:defRPr sz="1800" kern="1200">
+                <a:solidFill>
+                  <a:schemeClr val="dk1"/>
+                </a:solidFill>
+                <a:latin typeface="+mn-lt"/>
+                <a:ea typeface="+mn-ea"/>
+                <a:cs typeface="+mn-cs"/>
+              </a:defRPr>
+            </a:lvl3pPr>
+            <a:lvl4pPr marL="1371600" algn="l" defTabSz="914400" rtl="0" eaLnBrk="1" latinLnBrk="0" hangingPunct="1">
+              <a:defRPr sz="1800" kern="1200">
+                <a:solidFill>
+                  <a:schemeClr val="dk1"/>
+                </a:solidFill>
+                <a:latin typeface="+mn-lt"/>
+                <a:ea typeface="+mn-ea"/>
+                <a:cs typeface="+mn-cs"/>
+              </a:defRPr>
+            </a:lvl4pPr>
+            <a:lvl5pPr marL="1828800" algn="l" defTabSz="914400" rtl="0" eaLnBrk="1" latinLnBrk="0" hangingPunct="1">
+              <a:defRPr sz="1800" kern="1200">
+                <a:solidFill>
+                  <a:schemeClr val="dk1"/>
+                </a:solidFill>
+                <a:latin typeface="+mn-lt"/>
+                <a:ea typeface="+mn-ea"/>
+                <a:cs typeface="+mn-cs"/>
+              </a:defRPr>
+            </a:lvl5pPr>
+            <a:lvl6pPr marL="2286000" algn="l" defTabSz="914400" rtl="0" eaLnBrk="1" latinLnBrk="0" hangingPunct="1">
+              <a:defRPr sz="1800" kern="1200">
+                <a:solidFill>
+                  <a:schemeClr val="dk1"/>
+                </a:solidFill>
+                <a:latin typeface="+mn-lt"/>
+                <a:ea typeface="+mn-ea"/>
+                <a:cs typeface="+mn-cs"/>
+              </a:defRPr>
+            </a:lvl6pPr>
+            <a:lvl7pPr marL="2743200" algn="l" defTabSz="914400" rtl="0" eaLnBrk="1" latinLnBrk="0" hangingPunct="1">
+              <a:defRPr sz="1800" kern="1200">
+                <a:solidFill>
+                  <a:schemeClr val="dk1"/>
+                </a:solidFill>
+                <a:latin typeface="+mn-lt"/>
+                <a:ea typeface="+mn-ea"/>
+                <a:cs typeface="+mn-cs"/>
+              </a:defRPr>
+            </a:lvl7pPr>
+            <a:lvl8pPr marL="3200400" algn="l" defTabSz="914400" rtl="0" eaLnBrk="1" latinLnBrk="0" hangingPunct="1">
+              <a:defRPr sz="1800" kern="1200">
+                <a:solidFill>
+                  <a:schemeClr val="dk1"/>
+                </a:solidFill>
+                <a:latin typeface="+mn-lt"/>
+                <a:ea typeface="+mn-ea"/>
+                <a:cs typeface="+mn-cs"/>
+              </a:defRPr>
+            </a:lvl8pPr>
+            <a:lvl9pPr marL="3657600" algn="l" defTabSz="914400" rtl="0" eaLnBrk="1" latinLnBrk="0" hangingPunct="1">
+              <a:defRPr sz="1800" kern="1200">
+                <a:solidFill>
+                  <a:schemeClr val="dk1"/>
+                </a:solidFill>
+                <a:latin typeface="+mn-lt"/>
+                <a:ea typeface="+mn-ea"/>
+                <a:cs typeface="+mn-cs"/>
+              </a:defRPr>
+            </a:lvl9pPr>
+          </a:lstStyle>
+          <a:p>
+            <a:pPr algn="ctr"/>
+            <a:endParaRPr lang="en-US"/>
+          </a:p>
+        </p:txBody>
+      </p:sp>
+      <p:sp>
+        <p:nvSpPr>
+          <p:cNvPr id="24" name="TextBox 15"/>
+          <p:cNvSpPr txBox="1"/>
+          <p:nvPr/>
+        </p:nvSpPr>
+        <p:spPr>
+          <a:xfrm>
+            <a:off x="1365068" y="4230580"/>
+            <a:ext cx="1776548" cy="369332"/>
+          </a:xfrm>
+          <a:prstGeom prst="rect">
+            <a:avLst/>
+          </a:prstGeom>
+          <a:noFill/>
+        </p:spPr>
+        <p:txBody>
+          <a:bodyPr wrap="square" rtlCol="0">
+            <a:spAutoFit/>
+          </a:bodyPr>
+          <a:lstStyle>
+            <a:defPPr>
+              <a:defRPr lang="en-US"/>
+            </a:defPPr>
+            <a:lvl1pPr marL="0" algn="l" defTabSz="914400" rtl="0" eaLnBrk="1" latinLnBrk="0" hangingPunct="1">
+              <a:defRPr sz="1800" kern="1200">
+                <a:solidFill>
+                  <a:schemeClr val="tx1"/>
+                </a:solidFill>
+                <a:latin typeface="+mn-lt"/>
+                <a:ea typeface="+mn-ea"/>
+                <a:cs typeface="+mn-cs"/>
+              </a:defRPr>
+            </a:lvl1pPr>
+            <a:lvl2pPr marL="457200" algn="l" defTabSz="914400" rtl="0" eaLnBrk="1" latinLnBrk="0" hangingPunct="1">
+              <a:defRPr sz="1800" kern="1200">
+                <a:solidFill>
+                  <a:schemeClr val="tx1"/>
+                </a:solidFill>
+                <a:latin typeface="+mn-lt"/>
+                <a:ea typeface="+mn-ea"/>
+                <a:cs typeface="+mn-cs"/>
+              </a:defRPr>
+            </a:lvl2pPr>
+            <a:lvl3pPr marL="914400" algn="l" defTabSz="914400" rtl="0" eaLnBrk="1" latinLnBrk="0" hangingPunct="1">
+              <a:defRPr sz="1800" kern="1200">
+                <a:solidFill>
+                  <a:schemeClr val="tx1"/>
+                </a:solidFill>
+                <a:latin typeface="+mn-lt"/>
+                <a:ea typeface="+mn-ea"/>
+                <a:cs typeface="+mn-cs"/>
+              </a:defRPr>
+            </a:lvl3pPr>
+            <a:lvl4pPr marL="1371600" algn="l" defTabSz="914400" rtl="0" eaLnBrk="1" latinLnBrk="0" hangingPunct="1">
+              <a:defRPr sz="1800" kern="1200">
+                <a:solidFill>
+                  <a:schemeClr val="tx1"/>
+                </a:solidFill>
+                <a:latin typeface="+mn-lt"/>
+                <a:ea typeface="+mn-ea"/>
+                <a:cs typeface="+mn-cs"/>
+              </a:defRPr>
+            </a:lvl4pPr>
+            <a:lvl5pPr marL="1828800" algn="l" defTabSz="914400" rtl="0" eaLnBrk="1" latinLnBrk="0" hangingPunct="1">
+              <a:defRPr sz="1800" kern="1200">
+                <a:solidFill>
+                  <a:schemeClr val="tx1"/>
+                </a:solidFill>
+                <a:latin typeface="+mn-lt"/>
+                <a:ea typeface="+mn-ea"/>
+                <a:cs typeface="+mn-cs"/>
+              </a:defRPr>
+            </a:lvl5pPr>
+            <a:lvl6pPr marL="2286000" algn="l" defTabSz="914400" rtl="0" eaLnBrk="1" latinLnBrk="0" hangingPunct="1">
+              <a:defRPr sz="1800" kern="1200">
+                <a:solidFill>
+                  <a:schemeClr val="tx1"/>
+                </a:solidFill>
+                <a:latin typeface="+mn-lt"/>
+                <a:ea typeface="+mn-ea"/>
+                <a:cs typeface="+mn-cs"/>
+              </a:defRPr>
+            </a:lvl6pPr>
+            <a:lvl7pPr marL="2743200" algn="l" defTabSz="914400" rtl="0" eaLnBrk="1" latinLnBrk="0" hangingPunct="1">
+              <a:defRPr sz="1800" kern="1200">
+                <a:solidFill>
+                  <a:schemeClr val="tx1"/>
+                </a:solidFill>
+                <a:latin typeface="+mn-lt"/>
+                <a:ea typeface="+mn-ea"/>
+                <a:cs typeface="+mn-cs"/>
+              </a:defRPr>
+            </a:lvl7pPr>
+            <a:lvl8pPr marL="3200400" algn="l" defTabSz="914400" rtl="0" eaLnBrk="1" latinLnBrk="0" hangingPunct="1">
+              <a:defRPr sz="1800" kern="1200">
+                <a:solidFill>
+                  <a:schemeClr val="tx1"/>
+                </a:solidFill>
+                <a:latin typeface="+mn-lt"/>
+                <a:ea typeface="+mn-ea"/>
+                <a:cs typeface="+mn-cs"/>
+              </a:defRPr>
+            </a:lvl8pPr>
+            <a:lvl9pPr marL="3657600" algn="l" defTabSz="914400" rtl="0" eaLnBrk="1" latinLnBrk="0" hangingPunct="1">
+              <a:defRPr sz="1800" kern="1200">
+                <a:solidFill>
+                  <a:schemeClr val="tx1"/>
+                </a:solidFill>
+                <a:latin typeface="+mn-lt"/>
+                <a:ea typeface="+mn-ea"/>
+                <a:cs typeface="+mn-cs"/>
+              </a:defRPr>
+            </a:lvl9pPr>
+          </a:lstStyle>
+          <a:p>
+            <a:r>
+              <a:rPr lang="en-US" dirty="0" smtClean="0"/>
+              <a:t>Job Coordinator</a:t>
+            </a:r>
+            <a:endParaRPr lang="en-US" dirty="0"/>
+          </a:p>
+        </p:txBody>
+      </p:sp>
+      <p:sp>
+        <p:nvSpPr>
+          <p:cNvPr id="31" name="Rectangle 30"/>
+          <p:cNvSpPr/>
+          <p:nvPr/>
+        </p:nvSpPr>
+        <p:spPr>
+          <a:xfrm>
+            <a:off x="3311433" y="3872306"/>
+            <a:ext cx="4551794" cy="1052391"/>
+          </a:xfrm>
+          <a:prstGeom prst="rect">
+            <a:avLst/>
+          </a:prstGeom>
+          <a:ln>
+            <a:prstDash val="dash"/>
+          </a:ln>
+        </p:spPr>
+        <p:style>
+          <a:lnRef idx="2">
+            <a:schemeClr val="accent1"/>
+          </a:lnRef>
+          <a:fillRef idx="1">
+            <a:schemeClr val="lt1"/>
+          </a:fillRef>
+          <a:effectRef idx="0">
+            <a:schemeClr val="accent1"/>
+          </a:effectRef>
+          <a:fontRef idx="minor">
+            <a:schemeClr val="dk1"/>
+          </a:fontRef>
+        </p:style>
+        <p:txBody>
+          <a:bodyPr rtlCol="0" anchor="ctr"/>
+          <a:lstStyle/>
+          <a:p>
+            <a:pPr algn="ctr"/>
+            <a:endParaRPr lang="en-US"/>
+          </a:p>
+        </p:txBody>
+      </p:sp>
+      <p:sp>
+        <p:nvSpPr>
+          <p:cNvPr id="29" name="Rectangle 28"/>
+          <p:cNvSpPr/>
+          <p:nvPr/>
+        </p:nvSpPr>
+        <p:spPr>
+          <a:xfrm>
+            <a:off x="3458393" y="4146595"/>
+            <a:ext cx="1727562" cy="548640"/>
+          </a:xfrm>
+          <a:prstGeom prst="rect">
+            <a:avLst/>
+          </a:prstGeom>
+        </p:spPr>
+        <p:style>
+          <a:lnRef idx="2">
+            <a:schemeClr val="accent1"/>
+          </a:lnRef>
+          <a:fillRef idx="1">
+            <a:schemeClr val="lt1"/>
+          </a:fillRef>
+          <a:effectRef idx="0">
+            <a:schemeClr val="accent1"/>
+          </a:effectRef>
+          <a:fontRef idx="minor">
+            <a:schemeClr val="dk1"/>
+          </a:fontRef>
+        </p:style>
+        <p:txBody>
+          <a:bodyPr rot="0" spcFirstLastPara="0" vert="horz" wrap="square" lIns="91440" tIns="45720" rIns="91440" bIns="45720" numCol="1" spcCol="0" rtlCol="0" fromWordArt="0" anchor="ctr" anchorCtr="0" forceAA="0" compatLnSpc="1">
+            <a:prstTxWarp prst="textNoShape">
+              <a:avLst/>
+            </a:prstTxWarp>
+            <a:noAutofit/>
+          </a:bodyPr>
+          <a:lstStyle>
+            <a:defPPr>
+              <a:defRPr lang="en-US"/>
+            </a:defPPr>
+            <a:lvl1pPr marL="0" algn="l" defTabSz="914400" rtl="0" eaLnBrk="1" latinLnBrk="0" hangingPunct="1">
+              <a:defRPr sz="1800" kern="1200">
+                <a:solidFill>
+                  <a:schemeClr val="dk1"/>
+                </a:solidFill>
+                <a:latin typeface="+mn-lt"/>
+                <a:ea typeface="+mn-ea"/>
+                <a:cs typeface="+mn-cs"/>
+              </a:defRPr>
+            </a:lvl1pPr>
+            <a:lvl2pPr marL="457200" algn="l" defTabSz="914400" rtl="0" eaLnBrk="1" latinLnBrk="0" hangingPunct="1">
+              <a:defRPr sz="1800" kern="1200">
+                <a:solidFill>
+                  <a:schemeClr val="dk1"/>
+                </a:solidFill>
+                <a:latin typeface="+mn-lt"/>
+                <a:ea typeface="+mn-ea"/>
+                <a:cs typeface="+mn-cs"/>
+              </a:defRPr>
+            </a:lvl2pPr>
+            <a:lvl3pPr marL="914400" algn="l" defTabSz="914400" rtl="0" eaLnBrk="1" latinLnBrk="0" hangingPunct="1">
+              <a:defRPr sz="1800" kern="1200">
+                <a:solidFill>
+                  <a:schemeClr val="dk1"/>
+                </a:solidFill>
+                <a:latin typeface="+mn-lt"/>
+                <a:ea typeface="+mn-ea"/>
+                <a:cs typeface="+mn-cs"/>
+              </a:defRPr>
+            </a:lvl3pPr>
+            <a:lvl4pPr marL="1371600" algn="l" defTabSz="914400" rtl="0" eaLnBrk="1" latinLnBrk="0" hangingPunct="1">
+              <a:defRPr sz="1800" kern="1200">
+                <a:solidFill>
+                  <a:schemeClr val="dk1"/>
+                </a:solidFill>
+                <a:latin typeface="+mn-lt"/>
+                <a:ea typeface="+mn-ea"/>
+                <a:cs typeface="+mn-cs"/>
+              </a:defRPr>
+            </a:lvl4pPr>
+            <a:lvl5pPr marL="1828800" algn="l" defTabSz="914400" rtl="0" eaLnBrk="1" latinLnBrk="0" hangingPunct="1">
+              <a:defRPr sz="1800" kern="1200">
+                <a:solidFill>
+                  <a:schemeClr val="dk1"/>
+                </a:solidFill>
+                <a:latin typeface="+mn-lt"/>
+                <a:ea typeface="+mn-ea"/>
+                <a:cs typeface="+mn-cs"/>
+              </a:defRPr>
+            </a:lvl5pPr>
+            <a:lvl6pPr marL="2286000" algn="l" defTabSz="914400" rtl="0" eaLnBrk="1" latinLnBrk="0" hangingPunct="1">
+              <a:defRPr sz="1800" kern="1200">
+                <a:solidFill>
+                  <a:schemeClr val="dk1"/>
+                </a:solidFill>
+                <a:latin typeface="+mn-lt"/>
+                <a:ea typeface="+mn-ea"/>
+                <a:cs typeface="+mn-cs"/>
+              </a:defRPr>
+            </a:lvl6pPr>
+            <a:lvl7pPr marL="2743200" algn="l" defTabSz="914400" rtl="0" eaLnBrk="1" latinLnBrk="0" hangingPunct="1">
+              <a:defRPr sz="1800" kern="1200">
+                <a:solidFill>
+                  <a:schemeClr val="dk1"/>
+                </a:solidFill>
+                <a:latin typeface="+mn-lt"/>
+                <a:ea typeface="+mn-ea"/>
+                <a:cs typeface="+mn-cs"/>
+              </a:defRPr>
+            </a:lvl7pPr>
+            <a:lvl8pPr marL="3200400" algn="l" defTabSz="914400" rtl="0" eaLnBrk="1" latinLnBrk="0" hangingPunct="1">
+              <a:defRPr sz="1800" kern="1200">
+                <a:solidFill>
+                  <a:schemeClr val="dk1"/>
+                </a:solidFill>
+                <a:latin typeface="+mn-lt"/>
+                <a:ea typeface="+mn-ea"/>
+                <a:cs typeface="+mn-cs"/>
+              </a:defRPr>
+            </a:lvl8pPr>
+            <a:lvl9pPr marL="3657600" algn="l" defTabSz="914400" rtl="0" eaLnBrk="1" latinLnBrk="0" hangingPunct="1">
+              <a:defRPr sz="1800" kern="1200">
+                <a:solidFill>
+                  <a:schemeClr val="dk1"/>
+                </a:solidFill>
+                <a:latin typeface="+mn-lt"/>
+                <a:ea typeface="+mn-ea"/>
+                <a:cs typeface="+mn-cs"/>
+              </a:defRPr>
+            </a:lvl9pPr>
+          </a:lstStyle>
+          <a:p>
+            <a:pPr algn="ctr"/>
+            <a:r>
+              <a:rPr lang="en-US" dirty="0" smtClean="0"/>
+              <a:t>Factory</a:t>
+            </a:r>
+            <a:endParaRPr lang="en-US" dirty="0"/>
+          </a:p>
+        </p:txBody>
+      </p:sp>
+      <p:sp>
+        <p:nvSpPr>
+          <p:cNvPr id="30" name="TextBox 15"/>
+          <p:cNvSpPr txBox="1"/>
+          <p:nvPr/>
+        </p:nvSpPr>
+        <p:spPr>
+          <a:xfrm>
+            <a:off x="4606292" y="3793808"/>
+            <a:ext cx="1776548" cy="369332"/>
+          </a:xfrm>
+          <a:prstGeom prst="rect">
+            <a:avLst/>
+          </a:prstGeom>
+          <a:noFill/>
+        </p:spPr>
+        <p:txBody>
+          <a:bodyPr wrap="square" rtlCol="0">
+            <a:spAutoFit/>
+          </a:bodyPr>
+          <a:lstStyle>
+            <a:defPPr>
+              <a:defRPr lang="en-US"/>
+            </a:defPPr>
+            <a:lvl1pPr marL="0" algn="l" defTabSz="914400" rtl="0" eaLnBrk="1" latinLnBrk="0" hangingPunct="1">
+              <a:defRPr sz="1800" kern="1200">
+                <a:solidFill>
+                  <a:schemeClr val="tx1"/>
+                </a:solidFill>
+                <a:latin typeface="+mn-lt"/>
+                <a:ea typeface="+mn-ea"/>
+                <a:cs typeface="+mn-cs"/>
+              </a:defRPr>
+            </a:lvl1pPr>
+            <a:lvl2pPr marL="457200" algn="l" defTabSz="914400" rtl="0" eaLnBrk="1" latinLnBrk="0" hangingPunct="1">
+              <a:defRPr sz="1800" kern="1200">
+                <a:solidFill>
+                  <a:schemeClr val="tx1"/>
+                </a:solidFill>
+                <a:latin typeface="+mn-lt"/>
+                <a:ea typeface="+mn-ea"/>
+                <a:cs typeface="+mn-cs"/>
+              </a:defRPr>
+            </a:lvl2pPr>
+            <a:lvl3pPr marL="914400" algn="l" defTabSz="914400" rtl="0" eaLnBrk="1" latinLnBrk="0" hangingPunct="1">
+              <a:defRPr sz="1800" kern="1200">
+                <a:solidFill>
+                  <a:schemeClr val="tx1"/>
+                </a:solidFill>
+                <a:latin typeface="+mn-lt"/>
+                <a:ea typeface="+mn-ea"/>
+                <a:cs typeface="+mn-cs"/>
+              </a:defRPr>
+            </a:lvl3pPr>
+            <a:lvl4pPr marL="1371600" algn="l" defTabSz="914400" rtl="0" eaLnBrk="1" latinLnBrk="0" hangingPunct="1">
+              <a:defRPr sz="1800" kern="1200">
+                <a:solidFill>
+                  <a:schemeClr val="tx1"/>
+                </a:solidFill>
+                <a:latin typeface="+mn-lt"/>
+                <a:ea typeface="+mn-ea"/>
+                <a:cs typeface="+mn-cs"/>
+              </a:defRPr>
+            </a:lvl4pPr>
+            <a:lvl5pPr marL="1828800" algn="l" defTabSz="914400" rtl="0" eaLnBrk="1" latinLnBrk="0" hangingPunct="1">
+              <a:defRPr sz="1800" kern="1200">
+                <a:solidFill>
+                  <a:schemeClr val="tx1"/>
+                </a:solidFill>
+                <a:latin typeface="+mn-lt"/>
+                <a:ea typeface="+mn-ea"/>
+                <a:cs typeface="+mn-cs"/>
+              </a:defRPr>
+            </a:lvl5pPr>
+            <a:lvl6pPr marL="2286000" algn="l" defTabSz="914400" rtl="0" eaLnBrk="1" latinLnBrk="0" hangingPunct="1">
+              <a:defRPr sz="1800" kern="1200">
+                <a:solidFill>
+                  <a:schemeClr val="tx1"/>
+                </a:solidFill>
+                <a:latin typeface="+mn-lt"/>
+                <a:ea typeface="+mn-ea"/>
+                <a:cs typeface="+mn-cs"/>
+              </a:defRPr>
+            </a:lvl6pPr>
+            <a:lvl7pPr marL="2743200" algn="l" defTabSz="914400" rtl="0" eaLnBrk="1" latinLnBrk="0" hangingPunct="1">
+              <a:defRPr sz="1800" kern="1200">
+                <a:solidFill>
+                  <a:schemeClr val="tx1"/>
+                </a:solidFill>
+                <a:latin typeface="+mn-lt"/>
+                <a:ea typeface="+mn-ea"/>
+                <a:cs typeface="+mn-cs"/>
+              </a:defRPr>
+            </a:lvl7pPr>
+            <a:lvl8pPr marL="3200400" algn="l" defTabSz="914400" rtl="0" eaLnBrk="1" latinLnBrk="0" hangingPunct="1">
+              <a:defRPr sz="1800" kern="1200">
+                <a:solidFill>
+                  <a:schemeClr val="tx1"/>
+                </a:solidFill>
+                <a:latin typeface="+mn-lt"/>
+                <a:ea typeface="+mn-ea"/>
+                <a:cs typeface="+mn-cs"/>
+              </a:defRPr>
+            </a:lvl8pPr>
+            <a:lvl9pPr marL="3657600" algn="l" defTabSz="914400" rtl="0" eaLnBrk="1" latinLnBrk="0" hangingPunct="1">
+              <a:defRPr sz="1800" kern="1200">
+                <a:solidFill>
+                  <a:schemeClr val="tx1"/>
+                </a:solidFill>
+                <a:latin typeface="+mn-lt"/>
+                <a:ea typeface="+mn-ea"/>
+                <a:cs typeface="+mn-cs"/>
+              </a:defRPr>
+            </a:lvl9pPr>
+          </a:lstStyle>
+          <a:p>
+            <a:r>
+              <a:rPr lang="en-US" dirty="0" smtClean="0"/>
+              <a:t>Kafka’s property</a:t>
+            </a:r>
+            <a:endParaRPr lang="en-US" dirty="0"/>
+          </a:p>
+        </p:txBody>
+      </p:sp>
+      <p:sp>
+        <p:nvSpPr>
+          <p:cNvPr id="33" name="TextBox 32"/>
+          <p:cNvSpPr txBox="1"/>
+          <p:nvPr/>
+        </p:nvSpPr>
+        <p:spPr>
+          <a:xfrm>
+            <a:off x="7275194" y="4185024"/>
+            <a:ext cx="1518557" cy="369332"/>
+          </a:xfrm>
+          <a:prstGeom prst="rect">
+            <a:avLst/>
+          </a:prstGeom>
+          <a:noFill/>
+        </p:spPr>
+        <p:txBody>
+          <a:bodyPr wrap="square" rtlCol="0">
+            <a:spAutoFit/>
+          </a:bodyPr>
+          <a:lstStyle/>
+          <a:p>
+            <a:r>
+              <a:rPr lang="en-US" dirty="0"/>
+              <a:t>…</a:t>
+            </a:r>
+            <a:r>
+              <a:rPr lang="en-US" dirty="0" smtClean="0"/>
+              <a:t> </a:t>
+            </a:r>
+            <a:endParaRPr lang="en-US" dirty="0"/>
+          </a:p>
+        </p:txBody>
+      </p:sp>
+      <p:sp>
+        <p:nvSpPr>
+          <p:cNvPr id="34" name="Rectangle 33"/>
+          <p:cNvSpPr/>
+          <p:nvPr/>
+        </p:nvSpPr>
+        <p:spPr>
+          <a:xfrm>
+            <a:off x="5323116" y="4140926"/>
+            <a:ext cx="1727562" cy="548640"/>
+          </a:xfrm>
+          <a:prstGeom prst="rect">
+            <a:avLst/>
+          </a:prstGeom>
+        </p:spPr>
+        <p:style>
+          <a:lnRef idx="2">
+            <a:schemeClr val="accent1"/>
+          </a:lnRef>
+          <a:fillRef idx="1">
+            <a:schemeClr val="lt1"/>
+          </a:fillRef>
+          <a:effectRef idx="0">
+            <a:schemeClr val="accent1"/>
+          </a:effectRef>
+          <a:fontRef idx="minor">
+            <a:schemeClr val="dk1"/>
+          </a:fontRef>
+        </p:style>
+        <p:txBody>
+          <a:bodyPr rot="0" spcFirstLastPara="0" vert="horz" wrap="square" lIns="91440" tIns="45720" rIns="91440" bIns="45720" numCol="1" spcCol="0" rtlCol="0" fromWordArt="0" anchor="ctr" anchorCtr="0" forceAA="0" compatLnSpc="1">
+            <a:prstTxWarp prst="textNoShape">
+              <a:avLst/>
+            </a:prstTxWarp>
+            <a:noAutofit/>
+          </a:bodyPr>
+          <a:lstStyle>
+            <a:defPPr>
+              <a:defRPr lang="en-US"/>
+            </a:defPPr>
+            <a:lvl1pPr marL="0" algn="l" defTabSz="914400" rtl="0" eaLnBrk="1" latinLnBrk="0" hangingPunct="1">
+              <a:defRPr sz="1800" kern="1200">
+                <a:solidFill>
+                  <a:schemeClr val="dk1"/>
+                </a:solidFill>
+                <a:latin typeface="+mn-lt"/>
+                <a:ea typeface="+mn-ea"/>
+                <a:cs typeface="+mn-cs"/>
+              </a:defRPr>
+            </a:lvl1pPr>
+            <a:lvl2pPr marL="457200" algn="l" defTabSz="914400" rtl="0" eaLnBrk="1" latinLnBrk="0" hangingPunct="1">
+              <a:defRPr sz="1800" kern="1200">
+                <a:solidFill>
+                  <a:schemeClr val="dk1"/>
+                </a:solidFill>
+                <a:latin typeface="+mn-lt"/>
+                <a:ea typeface="+mn-ea"/>
+                <a:cs typeface="+mn-cs"/>
+              </a:defRPr>
+            </a:lvl2pPr>
+            <a:lvl3pPr marL="914400" algn="l" defTabSz="914400" rtl="0" eaLnBrk="1" latinLnBrk="0" hangingPunct="1">
+              <a:defRPr sz="1800" kern="1200">
+                <a:solidFill>
+                  <a:schemeClr val="dk1"/>
+                </a:solidFill>
+                <a:latin typeface="+mn-lt"/>
+                <a:ea typeface="+mn-ea"/>
+                <a:cs typeface="+mn-cs"/>
+              </a:defRPr>
+            </a:lvl3pPr>
+            <a:lvl4pPr marL="1371600" algn="l" defTabSz="914400" rtl="0" eaLnBrk="1" latinLnBrk="0" hangingPunct="1">
+              <a:defRPr sz="1800" kern="1200">
+                <a:solidFill>
+                  <a:schemeClr val="dk1"/>
+                </a:solidFill>
+                <a:latin typeface="+mn-lt"/>
+                <a:ea typeface="+mn-ea"/>
+                <a:cs typeface="+mn-cs"/>
+              </a:defRPr>
+            </a:lvl4pPr>
+            <a:lvl5pPr marL="1828800" algn="l" defTabSz="914400" rtl="0" eaLnBrk="1" latinLnBrk="0" hangingPunct="1">
+              <a:defRPr sz="1800" kern="1200">
+                <a:solidFill>
+                  <a:schemeClr val="dk1"/>
+                </a:solidFill>
+                <a:latin typeface="+mn-lt"/>
+                <a:ea typeface="+mn-ea"/>
+                <a:cs typeface="+mn-cs"/>
+              </a:defRPr>
+            </a:lvl5pPr>
+            <a:lvl6pPr marL="2286000" algn="l" defTabSz="914400" rtl="0" eaLnBrk="1" latinLnBrk="0" hangingPunct="1">
+              <a:defRPr sz="1800" kern="1200">
+                <a:solidFill>
+                  <a:schemeClr val="dk1"/>
+                </a:solidFill>
+                <a:latin typeface="+mn-lt"/>
+                <a:ea typeface="+mn-ea"/>
+                <a:cs typeface="+mn-cs"/>
+              </a:defRPr>
+            </a:lvl6pPr>
+            <a:lvl7pPr marL="2743200" algn="l" defTabSz="914400" rtl="0" eaLnBrk="1" latinLnBrk="0" hangingPunct="1">
+              <a:defRPr sz="1800" kern="1200">
+                <a:solidFill>
+                  <a:schemeClr val="dk1"/>
+                </a:solidFill>
+                <a:latin typeface="+mn-lt"/>
+                <a:ea typeface="+mn-ea"/>
+                <a:cs typeface="+mn-cs"/>
+              </a:defRPr>
+            </a:lvl7pPr>
+            <a:lvl8pPr marL="3200400" algn="l" defTabSz="914400" rtl="0" eaLnBrk="1" latinLnBrk="0" hangingPunct="1">
+              <a:defRPr sz="1800" kern="1200">
+                <a:solidFill>
+                  <a:schemeClr val="dk1"/>
+                </a:solidFill>
+                <a:latin typeface="+mn-lt"/>
+                <a:ea typeface="+mn-ea"/>
+                <a:cs typeface="+mn-cs"/>
+              </a:defRPr>
+            </a:lvl8pPr>
+            <a:lvl9pPr marL="3657600" algn="l" defTabSz="914400" rtl="0" eaLnBrk="1" latinLnBrk="0" hangingPunct="1">
+              <a:defRPr sz="1800" kern="1200">
+                <a:solidFill>
+                  <a:schemeClr val="dk1"/>
+                </a:solidFill>
+                <a:latin typeface="+mn-lt"/>
+                <a:ea typeface="+mn-ea"/>
+                <a:cs typeface="+mn-cs"/>
+              </a:defRPr>
+            </a:lvl9pPr>
+          </a:lstStyle>
+          <a:p>
+            <a:pPr algn="ctr"/>
+            <a:r>
+              <a:rPr lang="en-US" dirty="0" smtClean="0"/>
+              <a:t>Servers address</a:t>
+            </a:r>
+            <a:endParaRPr lang="en-US" dirty="0"/>
+          </a:p>
+        </p:txBody>
+      </p:sp>
+      <p:sp>
+        <p:nvSpPr>
+          <p:cNvPr id="35" name="Rectangle 34"/>
+          <p:cNvSpPr/>
+          <p:nvPr/>
+        </p:nvSpPr>
+        <p:spPr>
+          <a:xfrm>
+            <a:off x="999921" y="5319370"/>
+            <a:ext cx="6863306" cy="767981"/>
+          </a:xfrm>
+          <a:prstGeom prst="rect">
+            <a:avLst/>
+          </a:prstGeom>
+          <a:ln>
+            <a:prstDash val="dash"/>
+          </a:ln>
+        </p:spPr>
+        <p:style>
+          <a:lnRef idx="2">
+            <a:schemeClr val="accent1"/>
+          </a:lnRef>
+          <a:fillRef idx="1">
+            <a:schemeClr val="lt1"/>
+          </a:fillRef>
+          <a:effectRef idx="0">
+            <a:schemeClr val="accent1"/>
+          </a:effectRef>
+          <a:fontRef idx="minor">
+            <a:schemeClr val="dk1"/>
+          </a:fontRef>
+        </p:style>
+        <p:txBody>
+          <a:bodyPr rtlCol="0" anchor="ctr"/>
+          <a:lstStyle/>
+          <a:p>
+            <a:pPr algn="ctr"/>
+            <a:endParaRPr lang="en-US"/>
+          </a:p>
+        </p:txBody>
+      </p:sp>
+      <p:sp>
+        <p:nvSpPr>
+          <p:cNvPr id="36" name="TextBox 35"/>
+          <p:cNvSpPr txBox="1"/>
+          <p:nvPr/>
+        </p:nvSpPr>
+        <p:spPr>
+          <a:xfrm>
+            <a:off x="3097530" y="5355238"/>
+            <a:ext cx="2449287" cy="380488"/>
+          </a:xfrm>
+          <a:prstGeom prst="rect">
+            <a:avLst/>
+          </a:prstGeom>
+          <a:noFill/>
+        </p:spPr>
+        <p:txBody>
+          <a:bodyPr wrap="square" rtlCol="0">
+            <a:spAutoFit/>
+          </a:bodyPr>
+          <a:lstStyle/>
+          <a:p>
+            <a:r>
+              <a:rPr lang="en-US" dirty="0" smtClean="0"/>
+              <a:t>Other system’s property</a:t>
+            </a:r>
+            <a:endParaRPr lang="en-US" dirty="0"/>
+          </a:p>
+        </p:txBody>
+      </p:sp>
+      <p:sp>
+        <p:nvSpPr>
+          <p:cNvPr id="37" name="TextBox 36"/>
+          <p:cNvSpPr txBox="1"/>
+          <p:nvPr/>
+        </p:nvSpPr>
+        <p:spPr>
+          <a:xfrm>
+            <a:off x="4099717" y="5009999"/>
+            <a:ext cx="615553" cy="245344"/>
+          </a:xfrm>
+          <a:prstGeom prst="rect">
+            <a:avLst/>
+          </a:prstGeom>
+          <a:noFill/>
+        </p:spPr>
+        <p:txBody>
+          <a:bodyPr vert="eaVert" wrap="square" rtlCol="0">
+            <a:spAutoFit/>
+          </a:bodyPr>
+          <a:lstStyle/>
+          <a:p>
+            <a:r>
+              <a:rPr lang="en-US" sz="2800" dirty="0" smtClean="0"/>
+              <a:t>…</a:t>
+            </a:r>
+            <a:endParaRPr lang="en-US" sz="2800" dirty="0"/>
+          </a:p>
+        </p:txBody>
+      </p:sp>
+    </p:spTree>
+    <p:extLst>
+      <p:ext uri="{BB962C8B-B14F-4D97-AF65-F5344CB8AC3E}">
+        <p14:creationId xmlns:p14="http://schemas.microsoft.com/office/powerpoint/2010/main" val="3245442243"/>
       </p:ext>
     </p:extLst>
   </p:cSld>

</xml_diff>